<commit_message>
Sprint 1 Backlog - PP - Mockups hinzugefügt
</commit_message>
<xml_diff>
--- a/Dokumente/Sprint-Backlog/Sprint-Backlog1.pptx
+++ b/Dokumente/Sprint-Backlog/Sprint-Backlog1.pptx
@@ -5,7 +5,7 @@
     <p:sldMasterId id="2147483751" r:id="rId1"/>
   </p:sldMasterIdLst>
   <p:notesMasterIdLst>
-    <p:notesMasterId r:id="rId11"/>
+    <p:notesMasterId r:id="rId13"/>
   </p:notesMasterIdLst>
   <p:sldIdLst>
     <p:sldId id="256" r:id="rId2"/>
@@ -13,10 +13,12 @@
     <p:sldId id="257" r:id="rId4"/>
     <p:sldId id="259" r:id="rId5"/>
     <p:sldId id="260" r:id="rId6"/>
-    <p:sldId id="261" r:id="rId7"/>
-    <p:sldId id="262" r:id="rId8"/>
-    <p:sldId id="263" r:id="rId9"/>
-    <p:sldId id="264" r:id="rId10"/>
+    <p:sldId id="265" r:id="rId7"/>
+    <p:sldId id="266" r:id="rId8"/>
+    <p:sldId id="261" r:id="rId9"/>
+    <p:sldId id="262" r:id="rId10"/>
+    <p:sldId id="263" r:id="rId11"/>
+    <p:sldId id="264" r:id="rId12"/>
   </p:sldIdLst>
   <p:sldSz cx="12192000" cy="6858000"/>
   <p:notesSz cx="6858000" cy="9144000"/>
@@ -4941,6 +4943,487 @@
 </p:sld>
 </file>
 
+<file path=ppt/slides/slide10.xml><?xml version="1.0" encoding="utf-8"?>
+<p:sld xmlns:a="http://schemas.openxmlformats.org/drawingml/2006/main" xmlns:r="http://schemas.openxmlformats.org/officeDocument/2006/relationships" xmlns:p="http://schemas.openxmlformats.org/presentationml/2006/main">
+  <p:cSld>
+    <p:spTree>
+      <p:nvGrpSpPr>
+        <p:cNvPr id="1" name=""/>
+        <p:cNvGrpSpPr/>
+        <p:nvPr/>
+      </p:nvGrpSpPr>
+      <p:grpSpPr>
+        <a:xfrm>
+          <a:off x="0" y="0"/>
+          <a:ext cx="0" cy="0"/>
+          <a:chOff x="0" y="0"/>
+          <a:chExt cx="0" cy="0"/>
+        </a:xfrm>
+      </p:grpSpPr>
+      <p:sp>
+        <p:nvSpPr>
+          <p:cNvPr id="2" name="Titel 1">
+            <a:extLst>
+              <a:ext uri="{FF2B5EF4-FFF2-40B4-BE49-F238E27FC236}">
+                <a16:creationId xmlns:a16="http://schemas.microsoft.com/office/drawing/2014/main" id="{A075FF74-E5D2-1C9F-1DF3-DCD54EF547E9}"/>
+              </a:ext>
+            </a:extLst>
+          </p:cNvPr>
+          <p:cNvSpPr>
+            <a:spLocks noGrp="1"/>
+          </p:cNvSpPr>
+          <p:nvPr>
+            <p:ph type="title"/>
+          </p:nvPr>
+        </p:nvSpPr>
+        <p:spPr/>
+        <p:txBody>
+          <a:bodyPr/>
+          <a:lstStyle/>
+          <a:p>
+            <a:r>
+              <a:rPr lang="de-DE" dirty="0"/>
+              <a:t>6. Software-Tools</a:t>
+            </a:r>
+          </a:p>
+        </p:txBody>
+      </p:sp>
+      <p:sp>
+        <p:nvSpPr>
+          <p:cNvPr id="3" name="Inhaltsplatzhalter 2">
+            <a:extLst>
+              <a:ext uri="{FF2B5EF4-FFF2-40B4-BE49-F238E27FC236}">
+                <a16:creationId xmlns:a16="http://schemas.microsoft.com/office/drawing/2014/main" id="{E627C203-A1B7-383D-97A8-56B3248A1E83}"/>
+              </a:ext>
+            </a:extLst>
+          </p:cNvPr>
+          <p:cNvSpPr>
+            <a:spLocks noGrp="1"/>
+          </p:cNvSpPr>
+          <p:nvPr>
+            <p:ph sz="half" idx="1"/>
+          </p:nvPr>
+        </p:nvSpPr>
+        <p:spPr/>
+        <p:txBody>
+          <a:bodyPr>
+            <a:normAutofit/>
+          </a:bodyPr>
+          <a:lstStyle/>
+          <a:p>
+            <a:r>
+              <a:rPr lang="de-DE" dirty="0"/>
+              <a:t>Programmiersprache:</a:t>
+            </a:r>
+          </a:p>
+          <a:p>
+            <a:pPr lvl="1"/>
+            <a:r>
+              <a:rPr lang="de-DE" dirty="0"/>
+              <a:t>C#</a:t>
+            </a:r>
+          </a:p>
+          <a:p>
+            <a:r>
+              <a:rPr lang="de-DE" dirty="0"/>
+              <a:t>Framework:</a:t>
+            </a:r>
+          </a:p>
+          <a:p>
+            <a:pPr lvl="1"/>
+            <a:r>
+              <a:rPr lang="de-DE" dirty="0" err="1"/>
+              <a:t>Blazor</a:t>
+            </a:r>
+            <a:endParaRPr lang="de-DE" dirty="0"/>
+          </a:p>
+          <a:p>
+            <a:r>
+              <a:rPr lang="de-DE" dirty="0"/>
+              <a:t>IDE:</a:t>
+            </a:r>
+          </a:p>
+          <a:p>
+            <a:pPr lvl="1"/>
+            <a:r>
+              <a:rPr lang="de-DE" dirty="0"/>
+              <a:t>Visual Studio</a:t>
+            </a:r>
+          </a:p>
+        </p:txBody>
+      </p:sp>
+      <p:sp>
+        <p:nvSpPr>
+          <p:cNvPr id="6" name="Inhaltsplatzhalter 5">
+            <a:extLst>
+              <a:ext uri="{FF2B5EF4-FFF2-40B4-BE49-F238E27FC236}">
+                <a16:creationId xmlns:a16="http://schemas.microsoft.com/office/drawing/2014/main" id="{7185288F-FFC3-A9CF-5040-625A8A619580}"/>
+              </a:ext>
+            </a:extLst>
+          </p:cNvPr>
+          <p:cNvSpPr>
+            <a:spLocks noGrp="1"/>
+          </p:cNvSpPr>
+          <p:nvPr>
+            <p:ph sz="half" idx="2"/>
+          </p:nvPr>
+        </p:nvSpPr>
+        <p:spPr/>
+        <p:txBody>
+          <a:bodyPr>
+            <a:normAutofit/>
+          </a:bodyPr>
+          <a:lstStyle/>
+          <a:p>
+            <a:r>
+              <a:rPr lang="de-DE" dirty="0"/>
+              <a:t>Datenbank:</a:t>
+            </a:r>
+          </a:p>
+          <a:p>
+            <a:pPr lvl="1"/>
+            <a:r>
+              <a:rPr lang="de-DE" dirty="0"/>
+              <a:t>SQLite</a:t>
+            </a:r>
+          </a:p>
+          <a:p>
+            <a:r>
+              <a:rPr lang="de-DE" dirty="0"/>
+              <a:t>Weitere Tools:</a:t>
+            </a:r>
+          </a:p>
+          <a:p>
+            <a:pPr lvl="1"/>
+            <a:r>
+              <a:rPr lang="de-DE" dirty="0"/>
+              <a:t>Git (Versionierung)</a:t>
+            </a:r>
+          </a:p>
+          <a:p>
+            <a:pPr lvl="1"/>
+            <a:r>
+              <a:rPr lang="de-DE" dirty="0"/>
+              <a:t>Docker (</a:t>
+            </a:r>
+            <a:r>
+              <a:rPr lang="de-DE" dirty="0" err="1"/>
+              <a:t>Deployment</a:t>
+            </a:r>
+            <a:r>
+              <a:rPr lang="de-DE" dirty="0"/>
+              <a:t>)</a:t>
+            </a:r>
+          </a:p>
+        </p:txBody>
+      </p:sp>
+      <p:sp>
+        <p:nvSpPr>
+          <p:cNvPr id="4" name="Datumsplatzhalter 3">
+            <a:extLst>
+              <a:ext uri="{FF2B5EF4-FFF2-40B4-BE49-F238E27FC236}">
+                <a16:creationId xmlns:a16="http://schemas.microsoft.com/office/drawing/2014/main" id="{F5985418-FDA1-F1A7-80E8-C25C6BAC324B}"/>
+              </a:ext>
+            </a:extLst>
+          </p:cNvPr>
+          <p:cNvSpPr>
+            <a:spLocks noGrp="1"/>
+          </p:cNvSpPr>
+          <p:nvPr>
+            <p:ph type="dt" sz="half" idx="10"/>
+          </p:nvPr>
+        </p:nvSpPr>
+        <p:spPr/>
+        <p:txBody>
+          <a:bodyPr/>
+          <a:lstStyle/>
+          <a:p>
+            <a:fld id="{42B45B56-1D88-4042-8DF0-EB6B41B710D3}" type="datetime1">
+              <a:rPr lang="de-DE" smtClean="0"/>
+              <a:t>23.11.2024</a:t>
+            </a:fld>
+            <a:endParaRPr lang="en-US"/>
+          </a:p>
+        </p:txBody>
+      </p:sp>
+      <p:sp>
+        <p:nvSpPr>
+          <p:cNvPr id="5" name="Foliennummernplatzhalter 4">
+            <a:extLst>
+              <a:ext uri="{FF2B5EF4-FFF2-40B4-BE49-F238E27FC236}">
+                <a16:creationId xmlns:a16="http://schemas.microsoft.com/office/drawing/2014/main" id="{6A7A11C6-83C4-FA07-F8C7-F2826F8F22B6}"/>
+              </a:ext>
+            </a:extLst>
+          </p:cNvPr>
+          <p:cNvSpPr>
+            <a:spLocks noGrp="1"/>
+          </p:cNvSpPr>
+          <p:nvPr>
+            <p:ph type="sldNum" sz="quarter" idx="12"/>
+          </p:nvPr>
+        </p:nvSpPr>
+        <p:spPr/>
+        <p:txBody>
+          <a:bodyPr/>
+          <a:lstStyle/>
+          <a:p>
+            <a:fld id="{07CE569E-9B7C-4CB9-AB80-C0841F922CFF}" type="slidenum">
+              <a:rPr lang="en-US" smtClean="0"/>
+              <a:t>10</a:t>
+            </a:fld>
+            <a:endParaRPr lang="en-US"/>
+          </a:p>
+        </p:txBody>
+      </p:sp>
+    </p:spTree>
+    <p:extLst>
+      <p:ext uri="{BB962C8B-B14F-4D97-AF65-F5344CB8AC3E}">
+        <p14:creationId xmlns:p14="http://schemas.microsoft.com/office/powerpoint/2010/main" val="1367875186"/>
+      </p:ext>
+    </p:extLst>
+  </p:cSld>
+  <p:clrMapOvr>
+    <a:masterClrMapping/>
+  </p:clrMapOvr>
+</p:sld>
+</file>
+
+<file path=ppt/slides/slide11.xml><?xml version="1.0" encoding="utf-8"?>
+<p:sld xmlns:a="http://schemas.openxmlformats.org/drawingml/2006/main" xmlns:r="http://schemas.openxmlformats.org/officeDocument/2006/relationships" xmlns:p="http://schemas.openxmlformats.org/presentationml/2006/main">
+  <p:cSld>
+    <p:spTree>
+      <p:nvGrpSpPr>
+        <p:cNvPr id="1" name=""/>
+        <p:cNvGrpSpPr/>
+        <p:nvPr/>
+      </p:nvGrpSpPr>
+      <p:grpSpPr>
+        <a:xfrm>
+          <a:off x="0" y="0"/>
+          <a:ext cx="0" cy="0"/>
+          <a:chOff x="0" y="0"/>
+          <a:chExt cx="0" cy="0"/>
+        </a:xfrm>
+      </p:grpSpPr>
+      <p:sp>
+        <p:nvSpPr>
+          <p:cNvPr id="2" name="Titel 1">
+            <a:extLst>
+              <a:ext uri="{FF2B5EF4-FFF2-40B4-BE49-F238E27FC236}">
+                <a16:creationId xmlns:a16="http://schemas.microsoft.com/office/drawing/2014/main" id="{32CCE440-A4CB-26A7-5B3F-3F9D4B878A95}"/>
+              </a:ext>
+            </a:extLst>
+          </p:cNvPr>
+          <p:cNvSpPr>
+            <a:spLocks noGrp="1"/>
+          </p:cNvSpPr>
+          <p:nvPr>
+            <p:ph type="title"/>
+          </p:nvPr>
+        </p:nvSpPr>
+        <p:spPr/>
+        <p:txBody>
+          <a:bodyPr/>
+          <a:lstStyle/>
+          <a:p>
+            <a:r>
+              <a:rPr lang="de-DE" dirty="0"/>
+              <a:t>7. SOUPs/OTS</a:t>
+            </a:r>
+          </a:p>
+        </p:txBody>
+      </p:sp>
+      <p:sp>
+        <p:nvSpPr>
+          <p:cNvPr id="6" name="Inhaltsplatzhalter 5">
+            <a:extLst>
+              <a:ext uri="{FF2B5EF4-FFF2-40B4-BE49-F238E27FC236}">
+                <a16:creationId xmlns:a16="http://schemas.microsoft.com/office/drawing/2014/main" id="{AF37E05B-D1E7-D5BB-3AA4-0CBC94340331}"/>
+              </a:ext>
+            </a:extLst>
+          </p:cNvPr>
+          <p:cNvSpPr>
+            <a:spLocks noGrp="1"/>
+          </p:cNvSpPr>
+          <p:nvPr>
+            <p:ph sz="half" idx="1"/>
+          </p:nvPr>
+        </p:nvSpPr>
+        <p:spPr/>
+        <p:txBody>
+          <a:bodyPr>
+            <a:normAutofit lnSpcReduction="10000"/>
+          </a:bodyPr>
+          <a:lstStyle/>
+          <a:p>
+            <a:r>
+              <a:rPr lang="de-DE" dirty="0"/>
+              <a:t>Eingesetzte SOUPs:</a:t>
+            </a:r>
+          </a:p>
+          <a:p>
+            <a:pPr lvl="1"/>
+            <a:r>
+              <a:rPr lang="de-DE" dirty="0"/>
+              <a:t>Docker-Container für Hosting der Anwendung</a:t>
+            </a:r>
+          </a:p>
+          <a:p>
+            <a:r>
+              <a:rPr lang="de-DE" dirty="0"/>
+              <a:t>Bibliotheken: </a:t>
+            </a:r>
+          </a:p>
+          <a:p>
+            <a:pPr lvl="1"/>
+            <a:r>
+              <a:rPr lang="de-DE" dirty="0"/>
+              <a:t>[z. B. </a:t>
+            </a:r>
+            <a:r>
+              <a:rPr lang="de-DE" dirty="0" err="1"/>
+              <a:t>Newtonsoft.Json</a:t>
+            </a:r>
+            <a:r>
+              <a:rPr lang="de-DE" dirty="0"/>
+              <a:t>]</a:t>
+            </a:r>
+          </a:p>
+          <a:p>
+            <a:r>
+              <a:rPr lang="de-DE" dirty="0"/>
+              <a:t>Eingesetzte OTS:</a:t>
+            </a:r>
+          </a:p>
+          <a:p>
+            <a:pPr lvl="1"/>
+            <a:r>
+              <a:rPr lang="de-DE" dirty="0"/>
+              <a:t>.NET 5.0 Framework</a:t>
+            </a:r>
+          </a:p>
+        </p:txBody>
+      </p:sp>
+      <p:sp>
+        <p:nvSpPr>
+          <p:cNvPr id="7" name="Inhaltsplatzhalter 6">
+            <a:extLst>
+              <a:ext uri="{FF2B5EF4-FFF2-40B4-BE49-F238E27FC236}">
+                <a16:creationId xmlns:a16="http://schemas.microsoft.com/office/drawing/2014/main" id="{3BFD40B0-F7F1-F960-F8BC-73901AB54EC1}"/>
+              </a:ext>
+            </a:extLst>
+          </p:cNvPr>
+          <p:cNvSpPr>
+            <a:spLocks noGrp="1"/>
+          </p:cNvSpPr>
+          <p:nvPr>
+            <p:ph sz="half" idx="2"/>
+          </p:nvPr>
+        </p:nvSpPr>
+        <p:spPr/>
+        <p:txBody>
+          <a:bodyPr>
+            <a:normAutofit lnSpcReduction="10000"/>
+          </a:bodyPr>
+          <a:lstStyle/>
+          <a:p>
+            <a:r>
+              <a:rPr lang="de-DE" dirty="0"/>
+              <a:t>SQLite-Datenbank</a:t>
+            </a:r>
+          </a:p>
+          <a:p>
+            <a:r>
+              <a:rPr lang="de-DE" dirty="0"/>
+              <a:t>Visual Studio IDE</a:t>
+            </a:r>
+          </a:p>
+          <a:p>
+            <a:r>
+              <a:rPr lang="de-DE" dirty="0"/>
+              <a:t>Maßnahmen zur Validierung und Sicherstellung:</a:t>
+            </a:r>
+          </a:p>
+          <a:p>
+            <a:pPr lvl="1"/>
+            <a:r>
+              <a:rPr lang="de-DE" dirty="0"/>
+              <a:t>Security-Scans, regelmäßige Updates</a:t>
+            </a:r>
+          </a:p>
+        </p:txBody>
+      </p:sp>
+      <p:sp>
+        <p:nvSpPr>
+          <p:cNvPr id="4" name="Datumsplatzhalter 3">
+            <a:extLst>
+              <a:ext uri="{FF2B5EF4-FFF2-40B4-BE49-F238E27FC236}">
+                <a16:creationId xmlns:a16="http://schemas.microsoft.com/office/drawing/2014/main" id="{02CC40AD-91C3-625D-A10C-F9A7627732C1}"/>
+              </a:ext>
+            </a:extLst>
+          </p:cNvPr>
+          <p:cNvSpPr>
+            <a:spLocks noGrp="1"/>
+          </p:cNvSpPr>
+          <p:nvPr>
+            <p:ph type="dt" sz="half" idx="10"/>
+          </p:nvPr>
+        </p:nvSpPr>
+        <p:spPr/>
+        <p:txBody>
+          <a:bodyPr/>
+          <a:lstStyle/>
+          <a:p>
+            <a:fld id="{42B45B56-1D88-4042-8DF0-EB6B41B710D3}" type="datetime1">
+              <a:rPr lang="de-DE" smtClean="0"/>
+              <a:t>23.11.2024</a:t>
+            </a:fld>
+            <a:endParaRPr lang="en-US"/>
+          </a:p>
+        </p:txBody>
+      </p:sp>
+      <p:sp>
+        <p:nvSpPr>
+          <p:cNvPr id="5" name="Foliennummernplatzhalter 4">
+            <a:extLst>
+              <a:ext uri="{FF2B5EF4-FFF2-40B4-BE49-F238E27FC236}">
+                <a16:creationId xmlns:a16="http://schemas.microsoft.com/office/drawing/2014/main" id="{C09C3547-5BE9-9D3D-0D06-22EA64B7A6ED}"/>
+              </a:ext>
+            </a:extLst>
+          </p:cNvPr>
+          <p:cNvSpPr>
+            <a:spLocks noGrp="1"/>
+          </p:cNvSpPr>
+          <p:nvPr>
+            <p:ph type="sldNum" sz="quarter" idx="12"/>
+          </p:nvPr>
+        </p:nvSpPr>
+        <p:spPr/>
+        <p:txBody>
+          <a:bodyPr/>
+          <a:lstStyle/>
+          <a:p>
+            <a:fld id="{07CE569E-9B7C-4CB9-AB80-C0841F922CFF}" type="slidenum">
+              <a:rPr lang="en-US" smtClean="0"/>
+              <a:t>11</a:t>
+            </a:fld>
+            <a:endParaRPr lang="en-US"/>
+          </a:p>
+        </p:txBody>
+      </p:sp>
+    </p:spTree>
+    <p:extLst>
+      <p:ext uri="{BB962C8B-B14F-4D97-AF65-F5344CB8AC3E}">
+        <p14:creationId xmlns:p14="http://schemas.microsoft.com/office/powerpoint/2010/main" val="3169394714"/>
+      </p:ext>
+    </p:extLst>
+  </p:cSld>
+  <p:clrMapOvr>
+    <a:masterClrMapping/>
+  </p:clrMapOvr>
+</p:sld>
+</file>
+
 <file path=ppt/slides/slide2.xml><?xml version="1.0" encoding="utf-8"?>
 <p:sld xmlns:a="http://schemas.openxmlformats.org/drawingml/2006/main" xmlns:r="http://schemas.openxmlformats.org/officeDocument/2006/relationships" xmlns:p="http://schemas.openxmlformats.org/presentationml/2006/main">
   <p:cSld>
@@ -5575,12 +6058,35 @@
             <p:ph idx="1"/>
           </p:nvPr>
         </p:nvSpPr>
-        <p:spPr/>
-        <p:txBody>
-          <a:bodyPr/>
-          <a:lstStyle/>
-          <a:p>
-            <a:endParaRPr lang="de-DE"/>
+        <p:spPr>
+          <a:xfrm>
+            <a:off x="762000" y="2286001"/>
+            <a:ext cx="10668000" cy="622896"/>
+          </a:xfrm>
+        </p:spPr>
+        <p:txBody>
+          <a:bodyPr>
+            <a:normAutofit/>
+          </a:bodyPr>
+          <a:lstStyle/>
+          <a:p>
+            <a:r>
+              <a:rPr lang="en-US" dirty="0" err="1"/>
+              <a:t>Planung</a:t>
+            </a:r>
+            <a:r>
+              <a:rPr lang="en-US" dirty="0"/>
+              <a:t> </a:t>
+            </a:r>
+            <a:r>
+              <a:rPr lang="en-US" dirty="0" err="1"/>
+              <a:t>mit</a:t>
+            </a:r>
+            <a:r>
+              <a:rPr lang="en-US" dirty="0"/>
+              <a:t> Wireframes:</a:t>
+            </a:r>
+            <a:endParaRPr lang="de-DE" dirty="0"/>
           </a:p>
         </p:txBody>
       </p:sp>
@@ -5639,6 +6145,256 @@
               <a:t>5</a:t>
             </a:fld>
             <a:endParaRPr lang="en-US"/>
+          </a:p>
+        </p:txBody>
+      </p:sp>
+      <p:pic>
+        <p:nvPicPr>
+          <p:cNvPr id="7" name="Grafik 6">
+            <a:extLst>
+              <a:ext uri="{FF2B5EF4-FFF2-40B4-BE49-F238E27FC236}">
+                <a16:creationId xmlns:a16="http://schemas.microsoft.com/office/drawing/2014/main" id="{BD93C44F-7B63-1D66-9D33-5E51FBBFE79C}"/>
+              </a:ext>
+            </a:extLst>
+          </p:cNvPr>
+          <p:cNvPicPr>
+            <a:picLocks noChangeAspect="1"/>
+          </p:cNvPicPr>
+          <p:nvPr/>
+        </p:nvPicPr>
+        <p:blipFill>
+          <a:blip r:embed="rId2"/>
+          <a:stretch>
+            <a:fillRect/>
+          </a:stretch>
+        </p:blipFill>
+        <p:spPr>
+          <a:xfrm>
+            <a:off x="3306419" y="3092450"/>
+            <a:ext cx="5869694" cy="3765550"/>
+          </a:xfrm>
+          <a:prstGeom prst="rect">
+            <a:avLst/>
+          </a:prstGeom>
+        </p:spPr>
+      </p:pic>
+      <p:sp>
+        <p:nvSpPr>
+          <p:cNvPr id="9" name="Inhaltsplatzhalter 2">
+            <a:extLst>
+              <a:ext uri="{FF2B5EF4-FFF2-40B4-BE49-F238E27FC236}">
+                <a16:creationId xmlns:a16="http://schemas.microsoft.com/office/drawing/2014/main" id="{1C72A664-9ECA-AD6E-36BF-7F0C6B194CA3}"/>
+              </a:ext>
+            </a:extLst>
+          </p:cNvPr>
+          <p:cNvSpPr txBox="1">
+            <a:spLocks/>
+          </p:cNvSpPr>
+          <p:nvPr/>
+        </p:nvSpPr>
+        <p:spPr>
+          <a:xfrm>
+            <a:off x="1071535" y="3320454"/>
+            <a:ext cx="4364182" cy="1257299"/>
+          </a:xfrm>
+          <a:prstGeom prst="rect">
+            <a:avLst/>
+          </a:prstGeom>
+        </p:spPr>
+        <p:txBody>
+          <a:bodyPr vert="horz" lIns="91440" tIns="45720" rIns="91440" bIns="45720" rtlCol="0">
+            <a:normAutofit/>
+          </a:bodyPr>
+          <a:lstStyle>
+            <a:lvl1pPr marL="228600" indent="-228600" algn="l" defTabSz="914400" rtl="0" eaLnBrk="1" latinLnBrk="0" hangingPunct="1">
+              <a:lnSpc>
+                <a:spcPct val="125000"/>
+              </a:lnSpc>
+              <a:spcBef>
+                <a:spcPts val="1000"/>
+              </a:spcBef>
+              <a:buFont typeface="Arial" panose="020B0604020202020204" pitchFamily="34" charset="0"/>
+              <a:buChar char="•"/>
+              <a:defRPr sz="2800" kern="1200">
+                <a:solidFill>
+                  <a:schemeClr val="tx1">
+                    <a:alpha val="70000"/>
+                  </a:schemeClr>
+                </a:solidFill>
+                <a:latin typeface="+mn-lt"/>
+                <a:ea typeface="+mn-ea"/>
+                <a:cs typeface="+mn-cs"/>
+              </a:defRPr>
+            </a:lvl1pPr>
+            <a:lvl2pPr marL="685800" indent="-228600" algn="l" defTabSz="914400" rtl="0" eaLnBrk="1" latinLnBrk="0" hangingPunct="1">
+              <a:lnSpc>
+                <a:spcPct val="125000"/>
+              </a:lnSpc>
+              <a:spcBef>
+                <a:spcPts val="500"/>
+              </a:spcBef>
+              <a:buFont typeface="Arial" panose="020B0604020202020204" pitchFamily="34" charset="0"/>
+              <a:buChar char="•"/>
+              <a:defRPr sz="2400" kern="1200">
+                <a:solidFill>
+                  <a:schemeClr val="tx1">
+                    <a:alpha val="70000"/>
+                  </a:schemeClr>
+                </a:solidFill>
+                <a:latin typeface="+mn-lt"/>
+                <a:ea typeface="+mn-ea"/>
+                <a:cs typeface="+mn-cs"/>
+              </a:defRPr>
+            </a:lvl2pPr>
+            <a:lvl3pPr marL="1143000" indent="-228600" algn="l" defTabSz="914400" rtl="0" eaLnBrk="1" latinLnBrk="0" hangingPunct="1">
+              <a:lnSpc>
+                <a:spcPct val="125000"/>
+              </a:lnSpc>
+              <a:spcBef>
+                <a:spcPts val="500"/>
+              </a:spcBef>
+              <a:buFont typeface="Arial" panose="020B0604020202020204" pitchFamily="34" charset="0"/>
+              <a:buChar char="•"/>
+              <a:defRPr sz="2000" kern="1200">
+                <a:solidFill>
+                  <a:schemeClr val="tx1">
+                    <a:alpha val="70000"/>
+                  </a:schemeClr>
+                </a:solidFill>
+                <a:latin typeface="+mn-lt"/>
+                <a:ea typeface="+mn-ea"/>
+                <a:cs typeface="+mn-cs"/>
+              </a:defRPr>
+            </a:lvl3pPr>
+            <a:lvl4pPr marL="1600200" indent="-228600" algn="l" defTabSz="914400" rtl="0" eaLnBrk="1" latinLnBrk="0" hangingPunct="1">
+              <a:lnSpc>
+                <a:spcPct val="125000"/>
+              </a:lnSpc>
+              <a:spcBef>
+                <a:spcPts val="500"/>
+              </a:spcBef>
+              <a:buFont typeface="Arial" panose="020B0604020202020204" pitchFamily="34" charset="0"/>
+              <a:buChar char="•"/>
+              <a:defRPr sz="1800" kern="1200">
+                <a:solidFill>
+                  <a:schemeClr val="tx1">
+                    <a:alpha val="70000"/>
+                  </a:schemeClr>
+                </a:solidFill>
+                <a:latin typeface="+mn-lt"/>
+                <a:ea typeface="+mn-ea"/>
+                <a:cs typeface="+mn-cs"/>
+              </a:defRPr>
+            </a:lvl4pPr>
+            <a:lvl5pPr marL="2057400" indent="-228600" algn="l" defTabSz="914400" rtl="0" eaLnBrk="1" latinLnBrk="0" hangingPunct="1">
+              <a:lnSpc>
+                <a:spcPct val="125000"/>
+              </a:lnSpc>
+              <a:spcBef>
+                <a:spcPts val="500"/>
+              </a:spcBef>
+              <a:buFont typeface="Arial" panose="020B0604020202020204" pitchFamily="34" charset="0"/>
+              <a:buChar char="•"/>
+              <a:defRPr sz="1800" kern="1200">
+                <a:solidFill>
+                  <a:schemeClr val="tx1">
+                    <a:alpha val="70000"/>
+                  </a:schemeClr>
+                </a:solidFill>
+                <a:latin typeface="+mn-lt"/>
+                <a:ea typeface="+mn-ea"/>
+                <a:cs typeface="+mn-cs"/>
+              </a:defRPr>
+            </a:lvl5pPr>
+            <a:lvl6pPr marL="2514600" indent="-228600" algn="l" defTabSz="914400" rtl="0" eaLnBrk="1" latinLnBrk="0" hangingPunct="1">
+              <a:lnSpc>
+                <a:spcPct val="90000"/>
+              </a:lnSpc>
+              <a:spcBef>
+                <a:spcPts val="500"/>
+              </a:spcBef>
+              <a:buFont typeface="Arial" panose="020B0604020202020204" pitchFamily="34" charset="0"/>
+              <a:buChar char="•"/>
+              <a:defRPr sz="1800" kern="1200">
+                <a:solidFill>
+                  <a:schemeClr val="tx1"/>
+                </a:solidFill>
+                <a:latin typeface="+mn-lt"/>
+                <a:ea typeface="+mn-ea"/>
+                <a:cs typeface="+mn-cs"/>
+              </a:defRPr>
+            </a:lvl6pPr>
+            <a:lvl7pPr marL="2971800" indent="-228600" algn="l" defTabSz="914400" rtl="0" eaLnBrk="1" latinLnBrk="0" hangingPunct="1">
+              <a:lnSpc>
+                <a:spcPct val="90000"/>
+              </a:lnSpc>
+              <a:spcBef>
+                <a:spcPts val="500"/>
+              </a:spcBef>
+              <a:buFont typeface="Arial" panose="020B0604020202020204" pitchFamily="34" charset="0"/>
+              <a:buChar char="•"/>
+              <a:defRPr sz="1800" kern="1200">
+                <a:solidFill>
+                  <a:schemeClr val="tx1"/>
+                </a:solidFill>
+                <a:latin typeface="+mn-lt"/>
+                <a:ea typeface="+mn-ea"/>
+                <a:cs typeface="+mn-cs"/>
+              </a:defRPr>
+            </a:lvl7pPr>
+            <a:lvl8pPr marL="3429000" indent="-228600" algn="l" defTabSz="914400" rtl="0" eaLnBrk="1" latinLnBrk="0" hangingPunct="1">
+              <a:lnSpc>
+                <a:spcPct val="90000"/>
+              </a:lnSpc>
+              <a:spcBef>
+                <a:spcPts val="500"/>
+              </a:spcBef>
+              <a:buFont typeface="Arial" panose="020B0604020202020204" pitchFamily="34" charset="0"/>
+              <a:buChar char="•"/>
+              <a:defRPr sz="1800" kern="1200">
+                <a:solidFill>
+                  <a:schemeClr val="tx1"/>
+                </a:solidFill>
+                <a:latin typeface="+mn-lt"/>
+                <a:ea typeface="+mn-ea"/>
+                <a:cs typeface="+mn-cs"/>
+              </a:defRPr>
+            </a:lvl8pPr>
+            <a:lvl9pPr marL="3886200" indent="-228600" algn="l" defTabSz="914400" rtl="0" eaLnBrk="1" latinLnBrk="0" hangingPunct="1">
+              <a:lnSpc>
+                <a:spcPct val="90000"/>
+              </a:lnSpc>
+              <a:spcBef>
+                <a:spcPts val="500"/>
+              </a:spcBef>
+              <a:buFont typeface="Arial" panose="020B0604020202020204" pitchFamily="34" charset="0"/>
+              <a:buChar char="•"/>
+              <a:defRPr sz="1800" kern="1200">
+                <a:solidFill>
+                  <a:schemeClr val="tx1"/>
+                </a:solidFill>
+                <a:latin typeface="+mn-lt"/>
+                <a:ea typeface="+mn-ea"/>
+                <a:cs typeface="+mn-cs"/>
+              </a:defRPr>
+            </a:lvl9pPr>
+          </a:lstStyle>
+          <a:p>
+            <a:pPr marL="0" indent="0">
+              <a:lnSpc>
+                <a:spcPct val="50000"/>
+              </a:lnSpc>
+              <a:buNone/>
+            </a:pPr>
+            <a:r>
+              <a:rPr lang="en-US" sz="2400" dirty="0" err="1"/>
+              <a:t>Menü</a:t>
+            </a:r>
+            <a:r>
+              <a:rPr lang="en-US" sz="2400" dirty="0"/>
+              <a:t>-Karte</a:t>
+            </a:r>
+            <a:endParaRPr lang="de-DE" sz="2400" dirty="0"/>
           </a:p>
         </p:txBody>
       </p:sp>
@@ -5660,7 +6416,13 @@
   <p:cSld>
     <p:spTree>
       <p:nvGrpSpPr>
-        <p:cNvPr id="1" name=""/>
+        <p:cNvPr id="1" name="">
+          <a:extLst>
+            <a:ext uri="{FF2B5EF4-FFF2-40B4-BE49-F238E27FC236}">
+              <a16:creationId xmlns:a16="http://schemas.microsoft.com/office/drawing/2014/main" id="{D8889CD4-8059-5D74-7351-9B227FD0B554}"/>
+            </a:ext>
+          </a:extLst>
+        </p:cNvPr>
         <p:cNvGrpSpPr/>
         <p:nvPr/>
       </p:nvGrpSpPr>
@@ -5677,7 +6439,7 @@
           <p:cNvPr id="2" name="Titel 1">
             <a:extLst>
               <a:ext uri="{FF2B5EF4-FFF2-40B4-BE49-F238E27FC236}">
-                <a16:creationId xmlns:a16="http://schemas.microsoft.com/office/drawing/2014/main" id="{B4E9E59E-8BEF-E219-1B63-247630B68760}"/>
+                <a16:creationId xmlns:a16="http://schemas.microsoft.com/office/drawing/2014/main" id="{18DC0984-4AB0-AC31-E174-88D83A13127C}"/>
               </a:ext>
             </a:extLst>
           </p:cNvPr>
@@ -5695,7 +6457,7 @@
           <a:p>
             <a:r>
               <a:rPr lang="de-DE" dirty="0"/>
-              <a:t>4. Detailplanung</a:t>
+              <a:t>3. Produktzwischenstand</a:t>
             </a:r>
           </a:p>
         </p:txBody>
@@ -5705,7 +6467,7 @@
           <p:cNvPr id="3" name="Inhaltsplatzhalter 2">
             <a:extLst>
               <a:ext uri="{FF2B5EF4-FFF2-40B4-BE49-F238E27FC236}">
-                <a16:creationId xmlns:a16="http://schemas.microsoft.com/office/drawing/2014/main" id="{C77C4CF4-DB37-281A-EA30-8A6074C874A3}"/>
+                <a16:creationId xmlns:a16="http://schemas.microsoft.com/office/drawing/2014/main" id="{AC0876FA-F290-0A20-93A9-651169FE65E3}"/>
               </a:ext>
             </a:extLst>
           </p:cNvPr>
@@ -5716,12 +6478,35 @@
             <p:ph idx="1"/>
           </p:nvPr>
         </p:nvSpPr>
-        <p:spPr/>
-        <p:txBody>
-          <a:bodyPr/>
-          <a:lstStyle/>
-          <a:p>
-            <a:endParaRPr lang="de-DE"/>
+        <p:spPr>
+          <a:xfrm>
+            <a:off x="762000" y="2286001"/>
+            <a:ext cx="4800600" cy="622896"/>
+          </a:xfrm>
+        </p:spPr>
+        <p:txBody>
+          <a:bodyPr>
+            <a:normAutofit/>
+          </a:bodyPr>
+          <a:lstStyle/>
+          <a:p>
+            <a:r>
+              <a:rPr lang="en-US" dirty="0" err="1"/>
+              <a:t>Planung</a:t>
+            </a:r>
+            <a:r>
+              <a:rPr lang="en-US" dirty="0"/>
+              <a:t> </a:t>
+            </a:r>
+            <a:r>
+              <a:rPr lang="en-US" dirty="0" err="1"/>
+              <a:t>mit</a:t>
+            </a:r>
+            <a:r>
+              <a:rPr lang="en-US" dirty="0"/>
+              <a:t> Wireframes:</a:t>
+            </a:r>
+            <a:endParaRPr lang="de-DE" dirty="0"/>
           </a:p>
         </p:txBody>
       </p:sp>
@@ -5730,7 +6515,7 @@
           <p:cNvPr id="4" name="Datumsplatzhalter 3">
             <a:extLst>
               <a:ext uri="{FF2B5EF4-FFF2-40B4-BE49-F238E27FC236}">
-                <a16:creationId xmlns:a16="http://schemas.microsoft.com/office/drawing/2014/main" id="{8C8D5428-903D-063F-D2B8-8AA97F0DBDC4}"/>
+                <a16:creationId xmlns:a16="http://schemas.microsoft.com/office/drawing/2014/main" id="{0CD7E650-39E5-BD93-7437-DB0DED26A14B}"/>
               </a:ext>
             </a:extLst>
           </p:cNvPr>
@@ -5759,7 +6544,7 @@
           <p:cNvPr id="5" name="Foliennummernplatzhalter 4">
             <a:extLst>
               <a:ext uri="{FF2B5EF4-FFF2-40B4-BE49-F238E27FC236}">
-                <a16:creationId xmlns:a16="http://schemas.microsoft.com/office/drawing/2014/main" id="{FDE19446-3B39-C275-0CB6-43F8F4CF86D1}"/>
+                <a16:creationId xmlns:a16="http://schemas.microsoft.com/office/drawing/2014/main" id="{2795E6C4-AE15-46B6-34B1-7A6ADE65ECFD}"/>
               </a:ext>
             </a:extLst>
           </p:cNvPr>
@@ -5783,10 +6568,256 @@
           </a:p>
         </p:txBody>
       </p:sp>
+      <p:pic>
+        <p:nvPicPr>
+          <p:cNvPr id="8" name="Grafik 7">
+            <a:extLst>
+              <a:ext uri="{FF2B5EF4-FFF2-40B4-BE49-F238E27FC236}">
+                <a16:creationId xmlns:a16="http://schemas.microsoft.com/office/drawing/2014/main" id="{73BFF1C1-DEB6-27C9-A84E-837B5C689BA4}"/>
+              </a:ext>
+            </a:extLst>
+          </p:cNvPr>
+          <p:cNvPicPr>
+            <a:picLocks noChangeAspect="1"/>
+          </p:cNvPicPr>
+          <p:nvPr/>
+        </p:nvPicPr>
+        <p:blipFill>
+          <a:blip r:embed="rId2"/>
+          <a:stretch>
+            <a:fillRect/>
+          </a:stretch>
+        </p:blipFill>
+        <p:spPr>
+          <a:xfrm>
+            <a:off x="3162300" y="3042046"/>
+            <a:ext cx="4667250" cy="3815954"/>
+          </a:xfrm>
+          <a:prstGeom prst="rect">
+            <a:avLst/>
+          </a:prstGeom>
+        </p:spPr>
+      </p:pic>
+      <p:sp>
+        <p:nvSpPr>
+          <p:cNvPr id="9" name="Inhaltsplatzhalter 2">
+            <a:extLst>
+              <a:ext uri="{FF2B5EF4-FFF2-40B4-BE49-F238E27FC236}">
+                <a16:creationId xmlns:a16="http://schemas.microsoft.com/office/drawing/2014/main" id="{DD75F4C4-43E2-58AE-D31E-082A425E9778}"/>
+              </a:ext>
+            </a:extLst>
+          </p:cNvPr>
+          <p:cNvSpPr txBox="1">
+            <a:spLocks/>
+          </p:cNvSpPr>
+          <p:nvPr/>
+        </p:nvSpPr>
+        <p:spPr>
+          <a:xfrm>
+            <a:off x="1071535" y="3320454"/>
+            <a:ext cx="4364182" cy="1257299"/>
+          </a:xfrm>
+          <a:prstGeom prst="rect">
+            <a:avLst/>
+          </a:prstGeom>
+        </p:spPr>
+        <p:txBody>
+          <a:bodyPr vert="horz" lIns="91440" tIns="45720" rIns="91440" bIns="45720" rtlCol="0">
+            <a:normAutofit/>
+          </a:bodyPr>
+          <a:lstStyle>
+            <a:lvl1pPr marL="228600" indent="-228600" algn="l" defTabSz="914400" rtl="0" eaLnBrk="1" latinLnBrk="0" hangingPunct="1">
+              <a:lnSpc>
+                <a:spcPct val="125000"/>
+              </a:lnSpc>
+              <a:spcBef>
+                <a:spcPts val="1000"/>
+              </a:spcBef>
+              <a:buFont typeface="Arial" panose="020B0604020202020204" pitchFamily="34" charset="0"/>
+              <a:buChar char="•"/>
+              <a:defRPr sz="2800" kern="1200">
+                <a:solidFill>
+                  <a:schemeClr val="tx1">
+                    <a:alpha val="70000"/>
+                  </a:schemeClr>
+                </a:solidFill>
+                <a:latin typeface="+mn-lt"/>
+                <a:ea typeface="+mn-ea"/>
+                <a:cs typeface="+mn-cs"/>
+              </a:defRPr>
+            </a:lvl1pPr>
+            <a:lvl2pPr marL="685800" indent="-228600" algn="l" defTabSz="914400" rtl="0" eaLnBrk="1" latinLnBrk="0" hangingPunct="1">
+              <a:lnSpc>
+                <a:spcPct val="125000"/>
+              </a:lnSpc>
+              <a:spcBef>
+                <a:spcPts val="500"/>
+              </a:spcBef>
+              <a:buFont typeface="Arial" panose="020B0604020202020204" pitchFamily="34" charset="0"/>
+              <a:buChar char="•"/>
+              <a:defRPr sz="2400" kern="1200">
+                <a:solidFill>
+                  <a:schemeClr val="tx1">
+                    <a:alpha val="70000"/>
+                  </a:schemeClr>
+                </a:solidFill>
+                <a:latin typeface="+mn-lt"/>
+                <a:ea typeface="+mn-ea"/>
+                <a:cs typeface="+mn-cs"/>
+              </a:defRPr>
+            </a:lvl2pPr>
+            <a:lvl3pPr marL="1143000" indent="-228600" algn="l" defTabSz="914400" rtl="0" eaLnBrk="1" latinLnBrk="0" hangingPunct="1">
+              <a:lnSpc>
+                <a:spcPct val="125000"/>
+              </a:lnSpc>
+              <a:spcBef>
+                <a:spcPts val="500"/>
+              </a:spcBef>
+              <a:buFont typeface="Arial" panose="020B0604020202020204" pitchFamily="34" charset="0"/>
+              <a:buChar char="•"/>
+              <a:defRPr sz="2000" kern="1200">
+                <a:solidFill>
+                  <a:schemeClr val="tx1">
+                    <a:alpha val="70000"/>
+                  </a:schemeClr>
+                </a:solidFill>
+                <a:latin typeface="+mn-lt"/>
+                <a:ea typeface="+mn-ea"/>
+                <a:cs typeface="+mn-cs"/>
+              </a:defRPr>
+            </a:lvl3pPr>
+            <a:lvl4pPr marL="1600200" indent="-228600" algn="l" defTabSz="914400" rtl="0" eaLnBrk="1" latinLnBrk="0" hangingPunct="1">
+              <a:lnSpc>
+                <a:spcPct val="125000"/>
+              </a:lnSpc>
+              <a:spcBef>
+                <a:spcPts val="500"/>
+              </a:spcBef>
+              <a:buFont typeface="Arial" panose="020B0604020202020204" pitchFamily="34" charset="0"/>
+              <a:buChar char="•"/>
+              <a:defRPr sz="1800" kern="1200">
+                <a:solidFill>
+                  <a:schemeClr val="tx1">
+                    <a:alpha val="70000"/>
+                  </a:schemeClr>
+                </a:solidFill>
+                <a:latin typeface="+mn-lt"/>
+                <a:ea typeface="+mn-ea"/>
+                <a:cs typeface="+mn-cs"/>
+              </a:defRPr>
+            </a:lvl4pPr>
+            <a:lvl5pPr marL="2057400" indent="-228600" algn="l" defTabSz="914400" rtl="0" eaLnBrk="1" latinLnBrk="0" hangingPunct="1">
+              <a:lnSpc>
+                <a:spcPct val="125000"/>
+              </a:lnSpc>
+              <a:spcBef>
+                <a:spcPts val="500"/>
+              </a:spcBef>
+              <a:buFont typeface="Arial" panose="020B0604020202020204" pitchFamily="34" charset="0"/>
+              <a:buChar char="•"/>
+              <a:defRPr sz="1800" kern="1200">
+                <a:solidFill>
+                  <a:schemeClr val="tx1">
+                    <a:alpha val="70000"/>
+                  </a:schemeClr>
+                </a:solidFill>
+                <a:latin typeface="+mn-lt"/>
+                <a:ea typeface="+mn-ea"/>
+                <a:cs typeface="+mn-cs"/>
+              </a:defRPr>
+            </a:lvl5pPr>
+            <a:lvl6pPr marL="2514600" indent="-228600" algn="l" defTabSz="914400" rtl="0" eaLnBrk="1" latinLnBrk="0" hangingPunct="1">
+              <a:lnSpc>
+                <a:spcPct val="90000"/>
+              </a:lnSpc>
+              <a:spcBef>
+                <a:spcPts val="500"/>
+              </a:spcBef>
+              <a:buFont typeface="Arial" panose="020B0604020202020204" pitchFamily="34" charset="0"/>
+              <a:buChar char="•"/>
+              <a:defRPr sz="1800" kern="1200">
+                <a:solidFill>
+                  <a:schemeClr val="tx1"/>
+                </a:solidFill>
+                <a:latin typeface="+mn-lt"/>
+                <a:ea typeface="+mn-ea"/>
+                <a:cs typeface="+mn-cs"/>
+              </a:defRPr>
+            </a:lvl6pPr>
+            <a:lvl7pPr marL="2971800" indent="-228600" algn="l" defTabSz="914400" rtl="0" eaLnBrk="1" latinLnBrk="0" hangingPunct="1">
+              <a:lnSpc>
+                <a:spcPct val="90000"/>
+              </a:lnSpc>
+              <a:spcBef>
+                <a:spcPts val="500"/>
+              </a:spcBef>
+              <a:buFont typeface="Arial" panose="020B0604020202020204" pitchFamily="34" charset="0"/>
+              <a:buChar char="•"/>
+              <a:defRPr sz="1800" kern="1200">
+                <a:solidFill>
+                  <a:schemeClr val="tx1"/>
+                </a:solidFill>
+                <a:latin typeface="+mn-lt"/>
+                <a:ea typeface="+mn-ea"/>
+                <a:cs typeface="+mn-cs"/>
+              </a:defRPr>
+            </a:lvl7pPr>
+            <a:lvl8pPr marL="3429000" indent="-228600" algn="l" defTabSz="914400" rtl="0" eaLnBrk="1" latinLnBrk="0" hangingPunct="1">
+              <a:lnSpc>
+                <a:spcPct val="90000"/>
+              </a:lnSpc>
+              <a:spcBef>
+                <a:spcPts val="500"/>
+              </a:spcBef>
+              <a:buFont typeface="Arial" panose="020B0604020202020204" pitchFamily="34" charset="0"/>
+              <a:buChar char="•"/>
+              <a:defRPr sz="1800" kern="1200">
+                <a:solidFill>
+                  <a:schemeClr val="tx1"/>
+                </a:solidFill>
+                <a:latin typeface="+mn-lt"/>
+                <a:ea typeface="+mn-ea"/>
+                <a:cs typeface="+mn-cs"/>
+              </a:defRPr>
+            </a:lvl8pPr>
+            <a:lvl9pPr marL="3886200" indent="-228600" algn="l" defTabSz="914400" rtl="0" eaLnBrk="1" latinLnBrk="0" hangingPunct="1">
+              <a:lnSpc>
+                <a:spcPct val="90000"/>
+              </a:lnSpc>
+              <a:spcBef>
+                <a:spcPts val="500"/>
+              </a:spcBef>
+              <a:buFont typeface="Arial" panose="020B0604020202020204" pitchFamily="34" charset="0"/>
+              <a:buChar char="•"/>
+              <a:defRPr sz="1800" kern="1200">
+                <a:solidFill>
+                  <a:schemeClr val="tx1"/>
+                </a:solidFill>
+                <a:latin typeface="+mn-lt"/>
+                <a:ea typeface="+mn-ea"/>
+                <a:cs typeface="+mn-cs"/>
+              </a:defRPr>
+            </a:lvl9pPr>
+          </a:lstStyle>
+          <a:p>
+            <a:pPr marL="0" indent="0">
+              <a:lnSpc>
+                <a:spcPct val="50000"/>
+              </a:lnSpc>
+              <a:buNone/>
+            </a:pPr>
+            <a:r>
+              <a:rPr lang="en-US" sz="2400" dirty="0" err="1"/>
+              <a:t>Warenkorb</a:t>
+            </a:r>
+            <a:endParaRPr lang="de-DE" sz="2400" dirty="0"/>
+          </a:p>
+        </p:txBody>
+      </p:sp>
     </p:spTree>
     <p:extLst>
       <p:ext uri="{BB962C8B-B14F-4D97-AF65-F5344CB8AC3E}">
-        <p14:creationId xmlns:p14="http://schemas.microsoft.com/office/powerpoint/2010/main" val="3847697158"/>
+        <p14:creationId xmlns:p14="http://schemas.microsoft.com/office/powerpoint/2010/main" val="3434106846"/>
       </p:ext>
     </p:extLst>
   </p:cSld>
@@ -5801,7 +6832,13 @@
   <p:cSld>
     <p:spTree>
       <p:nvGrpSpPr>
-        <p:cNvPr id="1" name=""/>
+        <p:cNvPr id="1" name="">
+          <a:extLst>
+            <a:ext uri="{FF2B5EF4-FFF2-40B4-BE49-F238E27FC236}">
+              <a16:creationId xmlns:a16="http://schemas.microsoft.com/office/drawing/2014/main" id="{28C3A99D-E74E-A36E-819C-A08213D021AC}"/>
+            </a:ext>
+          </a:extLst>
+        </p:cNvPr>
         <p:cNvGrpSpPr/>
         <p:nvPr/>
       </p:nvGrpSpPr>
@@ -5818,7 +6855,7 @@
           <p:cNvPr id="2" name="Titel 1">
             <a:extLst>
               <a:ext uri="{FF2B5EF4-FFF2-40B4-BE49-F238E27FC236}">
-                <a16:creationId xmlns:a16="http://schemas.microsoft.com/office/drawing/2014/main" id="{86AADDDC-CD07-D152-F98D-6AA7ABFFAE93}"/>
+                <a16:creationId xmlns:a16="http://schemas.microsoft.com/office/drawing/2014/main" id="{75B38650-47B4-4DC2-85C9-959E5C771BB0}"/>
               </a:ext>
             </a:extLst>
           </p:cNvPr>
@@ -5836,7 +6873,7 @@
           <a:p>
             <a:r>
               <a:rPr lang="de-DE" dirty="0"/>
-              <a:t>5. Ausblick auf den folgenden Sprint</a:t>
+              <a:t>3. Produktzwischenstand</a:t>
             </a:r>
           </a:p>
         </p:txBody>
@@ -5846,7 +6883,7 @@
           <p:cNvPr id="3" name="Inhaltsplatzhalter 2">
             <a:extLst>
               <a:ext uri="{FF2B5EF4-FFF2-40B4-BE49-F238E27FC236}">
-                <a16:creationId xmlns:a16="http://schemas.microsoft.com/office/drawing/2014/main" id="{5E854AF4-9867-751A-7A8B-348123EF4C14}"/>
+                <a16:creationId xmlns:a16="http://schemas.microsoft.com/office/drawing/2014/main" id="{75494CD1-D179-C7F0-9DD5-61B9A75A93DF}"/>
               </a:ext>
             </a:extLst>
           </p:cNvPr>
@@ -5857,12 +6894,35 @@
             <p:ph idx="1"/>
           </p:nvPr>
         </p:nvSpPr>
-        <p:spPr/>
-        <p:txBody>
-          <a:bodyPr/>
-          <a:lstStyle/>
-          <a:p>
-            <a:endParaRPr lang="de-DE"/>
+        <p:spPr>
+          <a:xfrm>
+            <a:off x="762000" y="2286001"/>
+            <a:ext cx="4800600" cy="622896"/>
+          </a:xfrm>
+        </p:spPr>
+        <p:txBody>
+          <a:bodyPr>
+            <a:normAutofit/>
+          </a:bodyPr>
+          <a:lstStyle/>
+          <a:p>
+            <a:r>
+              <a:rPr lang="en-US" dirty="0" err="1"/>
+              <a:t>Planung</a:t>
+            </a:r>
+            <a:r>
+              <a:rPr lang="en-US" dirty="0"/>
+              <a:t> </a:t>
+            </a:r>
+            <a:r>
+              <a:rPr lang="en-US" dirty="0" err="1"/>
+              <a:t>mit</a:t>
+            </a:r>
+            <a:r>
+              <a:rPr lang="en-US" dirty="0"/>
+              <a:t> Wireframes:</a:t>
+            </a:r>
+            <a:endParaRPr lang="de-DE" dirty="0"/>
           </a:p>
         </p:txBody>
       </p:sp>
@@ -5871,7 +6931,7 @@
           <p:cNvPr id="4" name="Datumsplatzhalter 3">
             <a:extLst>
               <a:ext uri="{FF2B5EF4-FFF2-40B4-BE49-F238E27FC236}">
-                <a16:creationId xmlns:a16="http://schemas.microsoft.com/office/drawing/2014/main" id="{305A6BE5-5A63-7D28-E770-729A20618D33}"/>
+                <a16:creationId xmlns:a16="http://schemas.microsoft.com/office/drawing/2014/main" id="{C9708BED-3805-244B-70DF-BE68280280C6}"/>
               </a:ext>
             </a:extLst>
           </p:cNvPr>
@@ -5900,7 +6960,7 @@
           <p:cNvPr id="5" name="Foliennummernplatzhalter 4">
             <a:extLst>
               <a:ext uri="{FF2B5EF4-FFF2-40B4-BE49-F238E27FC236}">
-                <a16:creationId xmlns:a16="http://schemas.microsoft.com/office/drawing/2014/main" id="{E28ABC24-8900-E378-E502-62B817D571F6}"/>
+                <a16:creationId xmlns:a16="http://schemas.microsoft.com/office/drawing/2014/main" id="{203353F4-4482-371A-2E66-8CEABDDD2A53}"/>
               </a:ext>
             </a:extLst>
           </p:cNvPr>
@@ -5924,10 +6984,256 @@
           </a:p>
         </p:txBody>
       </p:sp>
+      <p:sp>
+        <p:nvSpPr>
+          <p:cNvPr id="9" name="Inhaltsplatzhalter 2">
+            <a:extLst>
+              <a:ext uri="{FF2B5EF4-FFF2-40B4-BE49-F238E27FC236}">
+                <a16:creationId xmlns:a16="http://schemas.microsoft.com/office/drawing/2014/main" id="{42BCE908-ED5D-0CB1-E295-28DAE4D70666}"/>
+              </a:ext>
+            </a:extLst>
+          </p:cNvPr>
+          <p:cNvSpPr txBox="1">
+            <a:spLocks/>
+          </p:cNvSpPr>
+          <p:nvPr/>
+        </p:nvSpPr>
+        <p:spPr>
+          <a:xfrm>
+            <a:off x="1071535" y="3320454"/>
+            <a:ext cx="4364182" cy="1257299"/>
+          </a:xfrm>
+          <a:prstGeom prst="rect">
+            <a:avLst/>
+          </a:prstGeom>
+        </p:spPr>
+        <p:txBody>
+          <a:bodyPr vert="horz" lIns="91440" tIns="45720" rIns="91440" bIns="45720" rtlCol="0">
+            <a:normAutofit/>
+          </a:bodyPr>
+          <a:lstStyle>
+            <a:lvl1pPr marL="228600" indent="-228600" algn="l" defTabSz="914400" rtl="0" eaLnBrk="1" latinLnBrk="0" hangingPunct="1">
+              <a:lnSpc>
+                <a:spcPct val="125000"/>
+              </a:lnSpc>
+              <a:spcBef>
+                <a:spcPts val="1000"/>
+              </a:spcBef>
+              <a:buFont typeface="Arial" panose="020B0604020202020204" pitchFamily="34" charset="0"/>
+              <a:buChar char="•"/>
+              <a:defRPr sz="2800" kern="1200">
+                <a:solidFill>
+                  <a:schemeClr val="tx1">
+                    <a:alpha val="70000"/>
+                  </a:schemeClr>
+                </a:solidFill>
+                <a:latin typeface="+mn-lt"/>
+                <a:ea typeface="+mn-ea"/>
+                <a:cs typeface="+mn-cs"/>
+              </a:defRPr>
+            </a:lvl1pPr>
+            <a:lvl2pPr marL="685800" indent="-228600" algn="l" defTabSz="914400" rtl="0" eaLnBrk="1" latinLnBrk="0" hangingPunct="1">
+              <a:lnSpc>
+                <a:spcPct val="125000"/>
+              </a:lnSpc>
+              <a:spcBef>
+                <a:spcPts val="500"/>
+              </a:spcBef>
+              <a:buFont typeface="Arial" panose="020B0604020202020204" pitchFamily="34" charset="0"/>
+              <a:buChar char="•"/>
+              <a:defRPr sz="2400" kern="1200">
+                <a:solidFill>
+                  <a:schemeClr val="tx1">
+                    <a:alpha val="70000"/>
+                  </a:schemeClr>
+                </a:solidFill>
+                <a:latin typeface="+mn-lt"/>
+                <a:ea typeface="+mn-ea"/>
+                <a:cs typeface="+mn-cs"/>
+              </a:defRPr>
+            </a:lvl2pPr>
+            <a:lvl3pPr marL="1143000" indent="-228600" algn="l" defTabSz="914400" rtl="0" eaLnBrk="1" latinLnBrk="0" hangingPunct="1">
+              <a:lnSpc>
+                <a:spcPct val="125000"/>
+              </a:lnSpc>
+              <a:spcBef>
+                <a:spcPts val="500"/>
+              </a:spcBef>
+              <a:buFont typeface="Arial" panose="020B0604020202020204" pitchFamily="34" charset="0"/>
+              <a:buChar char="•"/>
+              <a:defRPr sz="2000" kern="1200">
+                <a:solidFill>
+                  <a:schemeClr val="tx1">
+                    <a:alpha val="70000"/>
+                  </a:schemeClr>
+                </a:solidFill>
+                <a:latin typeface="+mn-lt"/>
+                <a:ea typeface="+mn-ea"/>
+                <a:cs typeface="+mn-cs"/>
+              </a:defRPr>
+            </a:lvl3pPr>
+            <a:lvl4pPr marL="1600200" indent="-228600" algn="l" defTabSz="914400" rtl="0" eaLnBrk="1" latinLnBrk="0" hangingPunct="1">
+              <a:lnSpc>
+                <a:spcPct val="125000"/>
+              </a:lnSpc>
+              <a:spcBef>
+                <a:spcPts val="500"/>
+              </a:spcBef>
+              <a:buFont typeface="Arial" panose="020B0604020202020204" pitchFamily="34" charset="0"/>
+              <a:buChar char="•"/>
+              <a:defRPr sz="1800" kern="1200">
+                <a:solidFill>
+                  <a:schemeClr val="tx1">
+                    <a:alpha val="70000"/>
+                  </a:schemeClr>
+                </a:solidFill>
+                <a:latin typeface="+mn-lt"/>
+                <a:ea typeface="+mn-ea"/>
+                <a:cs typeface="+mn-cs"/>
+              </a:defRPr>
+            </a:lvl4pPr>
+            <a:lvl5pPr marL="2057400" indent="-228600" algn="l" defTabSz="914400" rtl="0" eaLnBrk="1" latinLnBrk="0" hangingPunct="1">
+              <a:lnSpc>
+                <a:spcPct val="125000"/>
+              </a:lnSpc>
+              <a:spcBef>
+                <a:spcPts val="500"/>
+              </a:spcBef>
+              <a:buFont typeface="Arial" panose="020B0604020202020204" pitchFamily="34" charset="0"/>
+              <a:buChar char="•"/>
+              <a:defRPr sz="1800" kern="1200">
+                <a:solidFill>
+                  <a:schemeClr val="tx1">
+                    <a:alpha val="70000"/>
+                  </a:schemeClr>
+                </a:solidFill>
+                <a:latin typeface="+mn-lt"/>
+                <a:ea typeface="+mn-ea"/>
+                <a:cs typeface="+mn-cs"/>
+              </a:defRPr>
+            </a:lvl5pPr>
+            <a:lvl6pPr marL="2514600" indent="-228600" algn="l" defTabSz="914400" rtl="0" eaLnBrk="1" latinLnBrk="0" hangingPunct="1">
+              <a:lnSpc>
+                <a:spcPct val="90000"/>
+              </a:lnSpc>
+              <a:spcBef>
+                <a:spcPts val="500"/>
+              </a:spcBef>
+              <a:buFont typeface="Arial" panose="020B0604020202020204" pitchFamily="34" charset="0"/>
+              <a:buChar char="•"/>
+              <a:defRPr sz="1800" kern="1200">
+                <a:solidFill>
+                  <a:schemeClr val="tx1"/>
+                </a:solidFill>
+                <a:latin typeface="+mn-lt"/>
+                <a:ea typeface="+mn-ea"/>
+                <a:cs typeface="+mn-cs"/>
+              </a:defRPr>
+            </a:lvl6pPr>
+            <a:lvl7pPr marL="2971800" indent="-228600" algn="l" defTabSz="914400" rtl="0" eaLnBrk="1" latinLnBrk="0" hangingPunct="1">
+              <a:lnSpc>
+                <a:spcPct val="90000"/>
+              </a:lnSpc>
+              <a:spcBef>
+                <a:spcPts val="500"/>
+              </a:spcBef>
+              <a:buFont typeface="Arial" panose="020B0604020202020204" pitchFamily="34" charset="0"/>
+              <a:buChar char="•"/>
+              <a:defRPr sz="1800" kern="1200">
+                <a:solidFill>
+                  <a:schemeClr val="tx1"/>
+                </a:solidFill>
+                <a:latin typeface="+mn-lt"/>
+                <a:ea typeface="+mn-ea"/>
+                <a:cs typeface="+mn-cs"/>
+              </a:defRPr>
+            </a:lvl7pPr>
+            <a:lvl8pPr marL="3429000" indent="-228600" algn="l" defTabSz="914400" rtl="0" eaLnBrk="1" latinLnBrk="0" hangingPunct="1">
+              <a:lnSpc>
+                <a:spcPct val="90000"/>
+              </a:lnSpc>
+              <a:spcBef>
+                <a:spcPts val="500"/>
+              </a:spcBef>
+              <a:buFont typeface="Arial" panose="020B0604020202020204" pitchFamily="34" charset="0"/>
+              <a:buChar char="•"/>
+              <a:defRPr sz="1800" kern="1200">
+                <a:solidFill>
+                  <a:schemeClr val="tx1"/>
+                </a:solidFill>
+                <a:latin typeface="+mn-lt"/>
+                <a:ea typeface="+mn-ea"/>
+                <a:cs typeface="+mn-cs"/>
+              </a:defRPr>
+            </a:lvl8pPr>
+            <a:lvl9pPr marL="3886200" indent="-228600" algn="l" defTabSz="914400" rtl="0" eaLnBrk="1" latinLnBrk="0" hangingPunct="1">
+              <a:lnSpc>
+                <a:spcPct val="90000"/>
+              </a:lnSpc>
+              <a:spcBef>
+                <a:spcPts val="500"/>
+              </a:spcBef>
+              <a:buFont typeface="Arial" panose="020B0604020202020204" pitchFamily="34" charset="0"/>
+              <a:buChar char="•"/>
+              <a:defRPr sz="1800" kern="1200">
+                <a:solidFill>
+                  <a:schemeClr val="tx1"/>
+                </a:solidFill>
+                <a:latin typeface="+mn-lt"/>
+                <a:ea typeface="+mn-ea"/>
+                <a:cs typeface="+mn-cs"/>
+              </a:defRPr>
+            </a:lvl9pPr>
+          </a:lstStyle>
+          <a:p>
+            <a:pPr marL="0" indent="0">
+              <a:lnSpc>
+                <a:spcPct val="50000"/>
+              </a:lnSpc>
+              <a:buNone/>
+            </a:pPr>
+            <a:r>
+              <a:rPr lang="en-US" sz="2400" dirty="0" err="1"/>
+              <a:t>Warenkorb</a:t>
+            </a:r>
+            <a:endParaRPr lang="de-DE" sz="2400" dirty="0"/>
+          </a:p>
+        </p:txBody>
+      </p:sp>
+      <p:pic>
+        <p:nvPicPr>
+          <p:cNvPr id="7" name="Grafik 6">
+            <a:extLst>
+              <a:ext uri="{FF2B5EF4-FFF2-40B4-BE49-F238E27FC236}">
+                <a16:creationId xmlns:a16="http://schemas.microsoft.com/office/drawing/2014/main" id="{39BBA7F6-5C15-6851-4CAF-87DA3BDA1BA0}"/>
+              </a:ext>
+            </a:extLst>
+          </p:cNvPr>
+          <p:cNvPicPr>
+            <a:picLocks noChangeAspect="1"/>
+          </p:cNvPicPr>
+          <p:nvPr/>
+        </p:nvPicPr>
+        <p:blipFill>
+          <a:blip r:embed="rId2"/>
+          <a:stretch>
+            <a:fillRect/>
+          </a:stretch>
+        </p:blipFill>
+        <p:spPr>
+          <a:xfrm>
+            <a:off x="3043396" y="3152775"/>
+            <a:ext cx="5701024" cy="3819525"/>
+          </a:xfrm>
+          <a:prstGeom prst="rect">
+            <a:avLst/>
+          </a:prstGeom>
+        </p:spPr>
+      </p:pic>
     </p:spTree>
     <p:extLst>
       <p:ext uri="{BB962C8B-B14F-4D97-AF65-F5344CB8AC3E}">
-        <p14:creationId xmlns:p14="http://schemas.microsoft.com/office/powerpoint/2010/main" val="3562051256"/>
+        <p14:creationId xmlns:p14="http://schemas.microsoft.com/office/powerpoint/2010/main" val="2769863488"/>
       </p:ext>
     </p:extLst>
   </p:cSld>
@@ -5959,7 +7265,7 @@
           <p:cNvPr id="2" name="Titel 1">
             <a:extLst>
               <a:ext uri="{FF2B5EF4-FFF2-40B4-BE49-F238E27FC236}">
-                <a16:creationId xmlns:a16="http://schemas.microsoft.com/office/drawing/2014/main" id="{A075FF74-E5D2-1C9F-1DF3-DCD54EF547E9}"/>
+                <a16:creationId xmlns:a16="http://schemas.microsoft.com/office/drawing/2014/main" id="{B4E9E59E-8BEF-E219-1B63-247630B68760}"/>
               </a:ext>
             </a:extLst>
           </p:cNvPr>
@@ -5977,7 +7283,7 @@
           <a:p>
             <a:r>
               <a:rPr lang="de-DE" dirty="0"/>
-              <a:t>6. Software-Tools</a:t>
+              <a:t>4. Detailplanung</a:t>
             </a:r>
           </a:p>
         </p:txBody>
@@ -5987,127 +7293,23 @@
           <p:cNvPr id="3" name="Inhaltsplatzhalter 2">
             <a:extLst>
               <a:ext uri="{FF2B5EF4-FFF2-40B4-BE49-F238E27FC236}">
-                <a16:creationId xmlns:a16="http://schemas.microsoft.com/office/drawing/2014/main" id="{E627C203-A1B7-383D-97A8-56B3248A1E83}"/>
-              </a:ext>
-            </a:extLst>
-          </p:cNvPr>
-          <p:cNvSpPr>
-            <a:spLocks noGrp="1"/>
-          </p:cNvSpPr>
-          <p:nvPr>
-            <p:ph sz="half" idx="1"/>
+                <a16:creationId xmlns:a16="http://schemas.microsoft.com/office/drawing/2014/main" id="{C77C4CF4-DB37-281A-EA30-8A6074C874A3}"/>
+              </a:ext>
+            </a:extLst>
+          </p:cNvPr>
+          <p:cNvSpPr>
+            <a:spLocks noGrp="1"/>
+          </p:cNvSpPr>
+          <p:nvPr>
+            <p:ph idx="1"/>
           </p:nvPr>
         </p:nvSpPr>
         <p:spPr/>
         <p:txBody>
-          <a:bodyPr>
-            <a:normAutofit/>
-          </a:bodyPr>
-          <a:lstStyle/>
-          <a:p>
-            <a:r>
-              <a:rPr lang="de-DE" dirty="0"/>
-              <a:t>Programmiersprache:</a:t>
-            </a:r>
-          </a:p>
-          <a:p>
-            <a:pPr lvl="1"/>
-            <a:r>
-              <a:rPr lang="de-DE" dirty="0"/>
-              <a:t>C#</a:t>
-            </a:r>
-          </a:p>
-          <a:p>
-            <a:r>
-              <a:rPr lang="de-DE" dirty="0"/>
-              <a:t>Framework:</a:t>
-            </a:r>
-          </a:p>
-          <a:p>
-            <a:pPr lvl="1"/>
-            <a:r>
-              <a:rPr lang="de-DE" dirty="0" err="1"/>
-              <a:t>Blazor</a:t>
-            </a:r>
-            <a:endParaRPr lang="de-DE" dirty="0"/>
-          </a:p>
-          <a:p>
-            <a:r>
-              <a:rPr lang="de-DE" dirty="0"/>
-              <a:t>IDE:</a:t>
-            </a:r>
-          </a:p>
-          <a:p>
-            <a:pPr lvl="1"/>
-            <a:r>
-              <a:rPr lang="de-DE" dirty="0"/>
-              <a:t>Visual Studio</a:t>
-            </a:r>
-          </a:p>
-        </p:txBody>
-      </p:sp>
-      <p:sp>
-        <p:nvSpPr>
-          <p:cNvPr id="6" name="Inhaltsplatzhalter 5">
-            <a:extLst>
-              <a:ext uri="{FF2B5EF4-FFF2-40B4-BE49-F238E27FC236}">
-                <a16:creationId xmlns:a16="http://schemas.microsoft.com/office/drawing/2014/main" id="{7185288F-FFC3-A9CF-5040-625A8A619580}"/>
-              </a:ext>
-            </a:extLst>
-          </p:cNvPr>
-          <p:cNvSpPr>
-            <a:spLocks noGrp="1"/>
-          </p:cNvSpPr>
-          <p:nvPr>
-            <p:ph sz="half" idx="2"/>
-          </p:nvPr>
-        </p:nvSpPr>
-        <p:spPr/>
-        <p:txBody>
-          <a:bodyPr>
-            <a:normAutofit/>
-          </a:bodyPr>
-          <a:lstStyle/>
-          <a:p>
-            <a:r>
-              <a:rPr lang="de-DE" dirty="0"/>
-              <a:t>Datenbank:</a:t>
-            </a:r>
-          </a:p>
-          <a:p>
-            <a:pPr lvl="1"/>
-            <a:r>
-              <a:rPr lang="de-DE" dirty="0"/>
-              <a:t>SQLite</a:t>
-            </a:r>
-          </a:p>
-          <a:p>
-            <a:r>
-              <a:rPr lang="de-DE" dirty="0"/>
-              <a:t>Weitere Tools:</a:t>
-            </a:r>
-          </a:p>
-          <a:p>
-            <a:pPr lvl="1"/>
-            <a:r>
-              <a:rPr lang="de-DE" dirty="0"/>
-              <a:t>Git (Versionierung)</a:t>
-            </a:r>
-          </a:p>
-          <a:p>
-            <a:pPr lvl="1"/>
-            <a:r>
-              <a:rPr lang="de-DE" dirty="0"/>
-              <a:t>Docker (</a:t>
-            </a:r>
-            <a:r>
-              <a:rPr lang="de-DE" dirty="0" err="1"/>
-              <a:t>Deployment</a:t>
-            </a:r>
-            <a:r>
-              <a:rPr lang="de-DE" dirty="0"/>
-              <a:t>)</a:t>
-            </a:r>
+          <a:bodyPr/>
+          <a:lstStyle/>
+          <a:p>
+            <a:endParaRPr lang="de-DE"/>
           </a:p>
         </p:txBody>
       </p:sp>
@@ -6116,7 +7318,7 @@
           <p:cNvPr id="4" name="Datumsplatzhalter 3">
             <a:extLst>
               <a:ext uri="{FF2B5EF4-FFF2-40B4-BE49-F238E27FC236}">
-                <a16:creationId xmlns:a16="http://schemas.microsoft.com/office/drawing/2014/main" id="{F5985418-FDA1-F1A7-80E8-C25C6BAC324B}"/>
+                <a16:creationId xmlns:a16="http://schemas.microsoft.com/office/drawing/2014/main" id="{8C8D5428-903D-063F-D2B8-8AA97F0DBDC4}"/>
               </a:ext>
             </a:extLst>
           </p:cNvPr>
@@ -6145,7 +7347,7 @@
           <p:cNvPr id="5" name="Foliennummernplatzhalter 4">
             <a:extLst>
               <a:ext uri="{FF2B5EF4-FFF2-40B4-BE49-F238E27FC236}">
-                <a16:creationId xmlns:a16="http://schemas.microsoft.com/office/drawing/2014/main" id="{6A7A11C6-83C4-FA07-F8C7-F2826F8F22B6}"/>
+                <a16:creationId xmlns:a16="http://schemas.microsoft.com/office/drawing/2014/main" id="{FDE19446-3B39-C275-0CB6-43F8F4CF86D1}"/>
               </a:ext>
             </a:extLst>
           </p:cNvPr>
@@ -6172,7 +7374,7 @@
     </p:spTree>
     <p:extLst>
       <p:ext uri="{BB962C8B-B14F-4D97-AF65-F5344CB8AC3E}">
-        <p14:creationId xmlns:p14="http://schemas.microsoft.com/office/powerpoint/2010/main" val="1367875186"/>
+        <p14:creationId xmlns:p14="http://schemas.microsoft.com/office/powerpoint/2010/main" val="3847697158"/>
       </p:ext>
     </p:extLst>
   </p:cSld>
@@ -6204,7 +7406,7 @@
           <p:cNvPr id="2" name="Titel 1">
             <a:extLst>
               <a:ext uri="{FF2B5EF4-FFF2-40B4-BE49-F238E27FC236}">
-                <a16:creationId xmlns:a16="http://schemas.microsoft.com/office/drawing/2014/main" id="{32CCE440-A4CB-26A7-5B3F-3F9D4B878A95}"/>
+                <a16:creationId xmlns:a16="http://schemas.microsoft.com/office/drawing/2014/main" id="{86AADDDC-CD07-D152-F98D-6AA7ABFFAE93}"/>
               </a:ext>
             </a:extLst>
           </p:cNvPr>
@@ -6222,128 +7424,33 @@
           <a:p>
             <a:r>
               <a:rPr lang="de-DE" dirty="0"/>
-              <a:t>7. SOUPs/OTS</a:t>
-            </a:r>
-          </a:p>
-        </p:txBody>
-      </p:sp>
-      <p:sp>
-        <p:nvSpPr>
-          <p:cNvPr id="6" name="Inhaltsplatzhalter 5">
-            <a:extLst>
-              <a:ext uri="{FF2B5EF4-FFF2-40B4-BE49-F238E27FC236}">
-                <a16:creationId xmlns:a16="http://schemas.microsoft.com/office/drawing/2014/main" id="{AF37E05B-D1E7-D5BB-3AA4-0CBC94340331}"/>
-              </a:ext>
-            </a:extLst>
-          </p:cNvPr>
-          <p:cNvSpPr>
-            <a:spLocks noGrp="1"/>
-          </p:cNvSpPr>
-          <p:nvPr>
-            <p:ph sz="half" idx="1"/>
+              <a:t>5. Ausblick auf den folgenden Sprint</a:t>
+            </a:r>
+          </a:p>
+        </p:txBody>
+      </p:sp>
+      <p:sp>
+        <p:nvSpPr>
+          <p:cNvPr id="3" name="Inhaltsplatzhalter 2">
+            <a:extLst>
+              <a:ext uri="{FF2B5EF4-FFF2-40B4-BE49-F238E27FC236}">
+                <a16:creationId xmlns:a16="http://schemas.microsoft.com/office/drawing/2014/main" id="{5E854AF4-9867-751A-7A8B-348123EF4C14}"/>
+              </a:ext>
+            </a:extLst>
+          </p:cNvPr>
+          <p:cNvSpPr>
+            <a:spLocks noGrp="1"/>
+          </p:cNvSpPr>
+          <p:nvPr>
+            <p:ph idx="1"/>
           </p:nvPr>
         </p:nvSpPr>
         <p:spPr/>
         <p:txBody>
-          <a:bodyPr>
-            <a:normAutofit lnSpcReduction="10000"/>
-          </a:bodyPr>
-          <a:lstStyle/>
-          <a:p>
-            <a:r>
-              <a:rPr lang="de-DE" dirty="0"/>
-              <a:t>Eingesetzte SOUPs:</a:t>
-            </a:r>
-          </a:p>
-          <a:p>
-            <a:pPr lvl="1"/>
-            <a:r>
-              <a:rPr lang="de-DE" dirty="0"/>
-              <a:t>Docker-Container für Hosting der Anwendung</a:t>
-            </a:r>
-          </a:p>
-          <a:p>
-            <a:r>
-              <a:rPr lang="de-DE" dirty="0"/>
-              <a:t>Bibliotheken: </a:t>
-            </a:r>
-          </a:p>
-          <a:p>
-            <a:pPr lvl="1"/>
-            <a:r>
-              <a:rPr lang="de-DE" dirty="0"/>
-              <a:t>[z. B. </a:t>
-            </a:r>
-            <a:r>
-              <a:rPr lang="de-DE" dirty="0" err="1"/>
-              <a:t>Newtonsoft.Json</a:t>
-            </a:r>
-            <a:r>
-              <a:rPr lang="de-DE" dirty="0"/>
-              <a:t>]</a:t>
-            </a:r>
-          </a:p>
-          <a:p>
-            <a:r>
-              <a:rPr lang="de-DE" dirty="0"/>
-              <a:t>Eingesetzte OTS:</a:t>
-            </a:r>
-          </a:p>
-          <a:p>
-            <a:pPr lvl="1"/>
-            <a:r>
-              <a:rPr lang="de-DE" dirty="0"/>
-              <a:t>.NET 5.0 Framework</a:t>
-            </a:r>
-          </a:p>
-        </p:txBody>
-      </p:sp>
-      <p:sp>
-        <p:nvSpPr>
-          <p:cNvPr id="7" name="Inhaltsplatzhalter 6">
-            <a:extLst>
-              <a:ext uri="{FF2B5EF4-FFF2-40B4-BE49-F238E27FC236}">
-                <a16:creationId xmlns:a16="http://schemas.microsoft.com/office/drawing/2014/main" id="{3BFD40B0-F7F1-F960-F8BC-73901AB54EC1}"/>
-              </a:ext>
-            </a:extLst>
-          </p:cNvPr>
-          <p:cNvSpPr>
-            <a:spLocks noGrp="1"/>
-          </p:cNvSpPr>
-          <p:nvPr>
-            <p:ph sz="half" idx="2"/>
-          </p:nvPr>
-        </p:nvSpPr>
-        <p:spPr/>
-        <p:txBody>
-          <a:bodyPr>
-            <a:normAutofit lnSpcReduction="10000"/>
-          </a:bodyPr>
-          <a:lstStyle/>
-          <a:p>
-            <a:r>
-              <a:rPr lang="de-DE" dirty="0"/>
-              <a:t>SQLite-Datenbank</a:t>
-            </a:r>
-          </a:p>
-          <a:p>
-            <a:r>
-              <a:rPr lang="de-DE" dirty="0"/>
-              <a:t>Visual Studio IDE</a:t>
-            </a:r>
-          </a:p>
-          <a:p>
-            <a:r>
-              <a:rPr lang="de-DE" dirty="0"/>
-              <a:t>Maßnahmen zur Validierung und Sicherstellung:</a:t>
-            </a:r>
-          </a:p>
-          <a:p>
-            <a:pPr lvl="1"/>
-            <a:r>
-              <a:rPr lang="de-DE" dirty="0"/>
-              <a:t>Security-Scans, regelmäßige Updates</a:t>
-            </a:r>
+          <a:bodyPr/>
+          <a:lstStyle/>
+          <a:p>
+            <a:endParaRPr lang="de-DE"/>
           </a:p>
         </p:txBody>
       </p:sp>
@@ -6352,7 +7459,7 @@
           <p:cNvPr id="4" name="Datumsplatzhalter 3">
             <a:extLst>
               <a:ext uri="{FF2B5EF4-FFF2-40B4-BE49-F238E27FC236}">
-                <a16:creationId xmlns:a16="http://schemas.microsoft.com/office/drawing/2014/main" id="{02CC40AD-91C3-625D-A10C-F9A7627732C1}"/>
+                <a16:creationId xmlns:a16="http://schemas.microsoft.com/office/drawing/2014/main" id="{305A6BE5-5A63-7D28-E770-729A20618D33}"/>
               </a:ext>
             </a:extLst>
           </p:cNvPr>
@@ -6381,7 +7488,7 @@
           <p:cNvPr id="5" name="Foliennummernplatzhalter 4">
             <a:extLst>
               <a:ext uri="{FF2B5EF4-FFF2-40B4-BE49-F238E27FC236}">
-                <a16:creationId xmlns:a16="http://schemas.microsoft.com/office/drawing/2014/main" id="{C09C3547-5BE9-9D3D-0D06-22EA64B7A6ED}"/>
+                <a16:creationId xmlns:a16="http://schemas.microsoft.com/office/drawing/2014/main" id="{E28ABC24-8900-E378-E502-62B817D571F6}"/>
               </a:ext>
             </a:extLst>
           </p:cNvPr>
@@ -6408,7 +7515,7 @@
     </p:spTree>
     <p:extLst>
       <p:ext uri="{BB962C8B-B14F-4D97-AF65-F5344CB8AC3E}">
-        <p14:creationId xmlns:p14="http://schemas.microsoft.com/office/powerpoint/2010/main" val="3169394714"/>
+        <p14:creationId xmlns:p14="http://schemas.microsoft.com/office/powerpoint/2010/main" val="3562051256"/>
       </p:ext>
     </p:extLst>
   </p:cSld>

</xml_diff>

<commit_message>
Anpassung PowerPoint Sprint 1 + Erstellung Excels für Planung der Sprints
</commit_message>
<xml_diff>
--- a/Dokumente/Sprint-Backlog/Sprint-Backlog1.pptx
+++ b/Dokumente/Sprint-Backlog/Sprint-Backlog1.pptx
@@ -5,7 +5,7 @@
     <p:sldMasterId id="2147483751" r:id="rId1"/>
   </p:sldMasterIdLst>
   <p:notesMasterIdLst>
-    <p:notesMasterId r:id="rId13"/>
+    <p:notesMasterId r:id="rId18"/>
   </p:notesMasterIdLst>
   <p:sldIdLst>
     <p:sldId id="256" r:id="rId2"/>
@@ -16,9 +16,14 @@
     <p:sldId id="265" r:id="rId7"/>
     <p:sldId id="266" r:id="rId8"/>
     <p:sldId id="261" r:id="rId9"/>
-    <p:sldId id="262" r:id="rId10"/>
-    <p:sldId id="263" r:id="rId11"/>
-    <p:sldId id="264" r:id="rId12"/>
+    <p:sldId id="267" r:id="rId10"/>
+    <p:sldId id="268" r:id="rId11"/>
+    <p:sldId id="269" r:id="rId12"/>
+    <p:sldId id="270" r:id="rId13"/>
+    <p:sldId id="271" r:id="rId14"/>
+    <p:sldId id="262" r:id="rId15"/>
+    <p:sldId id="263" r:id="rId16"/>
+    <p:sldId id="264" r:id="rId17"/>
   </p:sldIdLst>
   <p:sldSz cx="12192000" cy="6858000"/>
   <p:notesSz cx="6858000" cy="9144000"/>
@@ -123,6 +128,849 @@
     </p:ext>
   </p:extLst>
 </p:presentation>
+</file>
+
+<file path=ppt/charts/chart1.xml><?xml version="1.0" encoding="utf-8"?>
+<c:chartSpace xmlns:c="http://schemas.openxmlformats.org/drawingml/2006/chart" xmlns:a="http://schemas.openxmlformats.org/drawingml/2006/main" xmlns:r="http://schemas.openxmlformats.org/officeDocument/2006/relationships" xmlns:c16r2="http://schemas.microsoft.com/office/drawing/2015/06/chart">
+  <c:date1904 val="0"/>
+  <c:lang val="de-DE"/>
+  <c:roundedCorners val="0"/>
+  <mc:AlternateContent xmlns:mc="http://schemas.openxmlformats.org/markup-compatibility/2006">
+    <mc:Choice xmlns:c14="http://schemas.microsoft.com/office/drawing/2007/8/2/chart" Requires="c14">
+      <c14:style val="102"/>
+    </mc:Choice>
+    <mc:Fallback>
+      <c:style val="2"/>
+    </mc:Fallback>
+  </mc:AlternateContent>
+  <c:chart>
+    <c:title>
+      <c:tx>
+        <c:rich>
+          <a:bodyPr rot="0" spcFirstLastPara="1" vertOverflow="ellipsis" vert="horz" wrap="square" anchor="ctr" anchorCtr="1"/>
+          <a:lstStyle/>
+          <a:p>
+            <a:pPr>
+              <a:defRPr sz="1400" b="0" i="0" u="none" strike="noStrike" kern="1200" spc="0" baseline="0">
+                <a:solidFill>
+                  <a:schemeClr val="tx1">
+                    <a:lumMod val="65000"/>
+                    <a:lumOff val="35000"/>
+                  </a:schemeClr>
+                </a:solidFill>
+                <a:latin typeface="+mn-lt"/>
+                <a:ea typeface="+mn-ea"/>
+                <a:cs typeface="+mn-cs"/>
+              </a:defRPr>
+            </a:pPr>
+            <a:r>
+              <a:rPr lang="de-DE"/>
+              <a:t>Aufwandsverteilung</a:t>
+            </a:r>
+          </a:p>
+        </c:rich>
+      </c:tx>
+      <c:overlay val="0"/>
+      <c:spPr>
+        <a:noFill/>
+        <a:ln>
+          <a:noFill/>
+        </a:ln>
+        <a:effectLst/>
+      </c:spPr>
+      <c:txPr>
+        <a:bodyPr rot="0" spcFirstLastPara="1" vertOverflow="ellipsis" vert="horz" wrap="square" anchor="ctr" anchorCtr="1"/>
+        <a:lstStyle/>
+        <a:p>
+          <a:pPr>
+            <a:defRPr sz="1400" b="0" i="0" u="none" strike="noStrike" kern="1200" spc="0" baseline="0">
+              <a:solidFill>
+                <a:schemeClr val="tx1">
+                  <a:lumMod val="65000"/>
+                  <a:lumOff val="35000"/>
+                </a:schemeClr>
+              </a:solidFill>
+              <a:latin typeface="+mn-lt"/>
+              <a:ea typeface="+mn-ea"/>
+              <a:cs typeface="+mn-cs"/>
+            </a:defRPr>
+          </a:pPr>
+          <a:endParaRPr lang="de-DE"/>
+        </a:p>
+      </c:txPr>
+    </c:title>
+    <c:autoTitleDeleted val="0"/>
+    <c:plotArea>
+      <c:layout/>
+      <c:barChart>
+        <c:barDir val="col"/>
+        <c:grouping val="stacked"/>
+        <c:varyColors val="0"/>
+        <c:ser>
+          <c:idx val="0"/>
+          <c:order val="0"/>
+          <c:spPr>
+            <a:solidFill>
+              <a:schemeClr val="accent1"/>
+            </a:solidFill>
+            <a:ln>
+              <a:noFill/>
+            </a:ln>
+            <a:effectLst/>
+          </c:spPr>
+          <c:invertIfNegative val="0"/>
+          <c:cat>
+            <c:strRef>
+              <c:f>Tabelle1!$A$7:$D$7</c:f>
+              <c:strCache>
+                <c:ptCount val="4"/>
+                <c:pt idx="0">
+                  <c:v>Rene</c:v>
+                </c:pt>
+                <c:pt idx="1">
+                  <c:v>Dennis</c:v>
+                </c:pt>
+                <c:pt idx="2">
+                  <c:v>Hans</c:v>
+                </c:pt>
+                <c:pt idx="3">
+                  <c:v>Vincent</c:v>
+                </c:pt>
+              </c:strCache>
+            </c:strRef>
+          </c:cat>
+          <c:val>
+            <c:numRef>
+              <c:f>Tabelle1!$A$8:$D$8</c:f>
+              <c:numCache>
+                <c:formatCode>General</c:formatCode>
+                <c:ptCount val="4"/>
+                <c:pt idx="0">
+                  <c:v>13</c:v>
+                </c:pt>
+                <c:pt idx="1">
+                  <c:v>10</c:v>
+                </c:pt>
+                <c:pt idx="2">
+                  <c:v>13</c:v>
+                </c:pt>
+                <c:pt idx="3">
+                  <c:v>12</c:v>
+                </c:pt>
+              </c:numCache>
+            </c:numRef>
+          </c:val>
+          <c:extLst>
+            <c:ext xmlns:c16="http://schemas.microsoft.com/office/drawing/2014/chart" uri="{C3380CC4-5D6E-409C-BE32-E72D297353CC}">
+              <c16:uniqueId val="{00000000-FA2F-4567-A336-028964AED735}"/>
+            </c:ext>
+          </c:extLst>
+        </c:ser>
+        <c:dLbls>
+          <c:showLegendKey val="0"/>
+          <c:showVal val="0"/>
+          <c:showCatName val="0"/>
+          <c:showSerName val="0"/>
+          <c:showPercent val="0"/>
+          <c:showBubbleSize val="0"/>
+        </c:dLbls>
+        <c:gapWidth val="150"/>
+        <c:overlap val="100"/>
+        <c:axId val="75355759"/>
+        <c:axId val="78129967"/>
+      </c:barChart>
+      <c:catAx>
+        <c:axId val="75355759"/>
+        <c:scaling>
+          <c:orientation val="minMax"/>
+        </c:scaling>
+        <c:delete val="0"/>
+        <c:axPos val="b"/>
+        <c:numFmt formatCode="General" sourceLinked="1"/>
+        <c:majorTickMark val="none"/>
+        <c:minorTickMark val="none"/>
+        <c:tickLblPos val="nextTo"/>
+        <c:spPr>
+          <a:noFill/>
+          <a:ln w="9525" cap="flat" cmpd="sng" algn="ctr">
+            <a:solidFill>
+              <a:schemeClr val="tx1">
+                <a:lumMod val="15000"/>
+                <a:lumOff val="85000"/>
+              </a:schemeClr>
+            </a:solidFill>
+            <a:round/>
+          </a:ln>
+          <a:effectLst/>
+        </c:spPr>
+        <c:txPr>
+          <a:bodyPr rot="-60000000" spcFirstLastPara="1" vertOverflow="ellipsis" vert="horz" wrap="square" anchor="ctr" anchorCtr="1"/>
+          <a:lstStyle/>
+          <a:p>
+            <a:pPr>
+              <a:defRPr sz="900" b="0" i="0" u="none" strike="noStrike" kern="1200" baseline="0">
+                <a:solidFill>
+                  <a:schemeClr val="tx1">
+                    <a:lumMod val="65000"/>
+                    <a:lumOff val="35000"/>
+                  </a:schemeClr>
+                </a:solidFill>
+                <a:latin typeface="+mn-lt"/>
+                <a:ea typeface="+mn-ea"/>
+                <a:cs typeface="+mn-cs"/>
+              </a:defRPr>
+            </a:pPr>
+            <a:endParaRPr lang="de-DE"/>
+          </a:p>
+        </c:txPr>
+        <c:crossAx val="78129967"/>
+        <c:crosses val="autoZero"/>
+        <c:auto val="1"/>
+        <c:lblAlgn val="ctr"/>
+        <c:lblOffset val="100"/>
+        <c:noMultiLvlLbl val="0"/>
+      </c:catAx>
+      <c:valAx>
+        <c:axId val="78129967"/>
+        <c:scaling>
+          <c:orientation val="minMax"/>
+        </c:scaling>
+        <c:delete val="0"/>
+        <c:axPos val="l"/>
+        <c:majorGridlines>
+          <c:spPr>
+            <a:ln w="9525" cap="flat" cmpd="sng" algn="ctr">
+              <a:solidFill>
+                <a:schemeClr val="tx1">
+                  <a:lumMod val="15000"/>
+                  <a:lumOff val="85000"/>
+                </a:schemeClr>
+              </a:solidFill>
+              <a:round/>
+            </a:ln>
+            <a:effectLst/>
+          </c:spPr>
+        </c:majorGridlines>
+        <c:numFmt formatCode="General" sourceLinked="1"/>
+        <c:majorTickMark val="none"/>
+        <c:minorTickMark val="none"/>
+        <c:tickLblPos val="nextTo"/>
+        <c:spPr>
+          <a:noFill/>
+          <a:ln>
+            <a:noFill/>
+          </a:ln>
+          <a:effectLst/>
+        </c:spPr>
+        <c:txPr>
+          <a:bodyPr rot="-60000000" spcFirstLastPara="1" vertOverflow="ellipsis" vert="horz" wrap="square" anchor="ctr" anchorCtr="1"/>
+          <a:lstStyle/>
+          <a:p>
+            <a:pPr>
+              <a:defRPr sz="900" b="0" i="0" u="none" strike="noStrike" kern="1200" baseline="0">
+                <a:solidFill>
+                  <a:schemeClr val="tx1">
+                    <a:lumMod val="65000"/>
+                    <a:lumOff val="35000"/>
+                  </a:schemeClr>
+                </a:solidFill>
+                <a:latin typeface="+mn-lt"/>
+                <a:ea typeface="+mn-ea"/>
+                <a:cs typeface="+mn-cs"/>
+              </a:defRPr>
+            </a:pPr>
+            <a:endParaRPr lang="de-DE"/>
+          </a:p>
+        </c:txPr>
+        <c:crossAx val="75355759"/>
+        <c:crosses val="autoZero"/>
+        <c:crossBetween val="between"/>
+      </c:valAx>
+      <c:spPr>
+        <a:noFill/>
+        <a:ln>
+          <a:noFill/>
+        </a:ln>
+        <a:effectLst/>
+      </c:spPr>
+    </c:plotArea>
+    <c:plotVisOnly val="1"/>
+    <c:dispBlanksAs val="gap"/>
+    <c:extLst>
+      <c:ext xmlns:c16r3="http://schemas.microsoft.com/office/drawing/2017/03/chart" uri="{56B9EC1D-385E-4148-901F-78D8002777C0}">
+        <c16r3:dataDisplayOptions16>
+          <c16r3:dispNaAsBlank val="1"/>
+        </c16r3:dataDisplayOptions16>
+      </c:ext>
+    </c:extLst>
+    <c:showDLblsOverMax val="0"/>
+  </c:chart>
+  <c:spPr>
+    <a:noFill/>
+    <a:ln>
+      <a:noFill/>
+    </a:ln>
+    <a:effectLst/>
+  </c:spPr>
+  <c:txPr>
+    <a:bodyPr/>
+    <a:lstStyle/>
+    <a:p>
+      <a:pPr>
+        <a:defRPr/>
+      </a:pPr>
+      <a:endParaRPr lang="de-DE"/>
+    </a:p>
+  </c:txPr>
+  <c:externalData r:id="rId3">
+    <c:autoUpdate val="0"/>
+  </c:externalData>
+</c:chartSpace>
+</file>
+
+<file path=ppt/charts/colors1.xml><?xml version="1.0" encoding="utf-8"?>
+<cs:colorStyle xmlns:cs="http://schemas.microsoft.com/office/drawing/2012/chartStyle" xmlns:a="http://schemas.openxmlformats.org/drawingml/2006/main" meth="cycle" id="10">
+  <a:schemeClr val="accent1"/>
+  <a:schemeClr val="accent2"/>
+  <a:schemeClr val="accent3"/>
+  <a:schemeClr val="accent4"/>
+  <a:schemeClr val="accent5"/>
+  <a:schemeClr val="accent6"/>
+  <cs:variation/>
+  <cs:variation>
+    <a:lumMod val="60000"/>
+  </cs:variation>
+  <cs:variation>
+    <a:lumMod val="80000"/>
+    <a:lumOff val="20000"/>
+  </cs:variation>
+  <cs:variation>
+    <a:lumMod val="80000"/>
+  </cs:variation>
+  <cs:variation>
+    <a:lumMod val="60000"/>
+    <a:lumOff val="40000"/>
+  </cs:variation>
+  <cs:variation>
+    <a:lumMod val="50000"/>
+  </cs:variation>
+  <cs:variation>
+    <a:lumMod val="70000"/>
+    <a:lumOff val="30000"/>
+  </cs:variation>
+  <cs:variation>
+    <a:lumMod val="70000"/>
+  </cs:variation>
+  <cs:variation>
+    <a:lumMod val="50000"/>
+    <a:lumOff val="50000"/>
+  </cs:variation>
+</cs:colorStyle>
+</file>
+
+<file path=ppt/charts/style1.xml><?xml version="1.0" encoding="utf-8"?>
+<cs:chartStyle xmlns:cs="http://schemas.microsoft.com/office/drawing/2012/chartStyle" xmlns:a="http://schemas.openxmlformats.org/drawingml/2006/main" id="297">
+  <cs:axisTitle>
+    <cs:lnRef idx="0"/>
+    <cs:fillRef idx="0"/>
+    <cs:effectRef idx="0"/>
+    <cs:fontRef idx="minor">
+      <a:schemeClr val="tx1">
+        <a:lumMod val="65000"/>
+        <a:lumOff val="35000"/>
+      </a:schemeClr>
+    </cs:fontRef>
+    <cs:defRPr sz="1000" kern="1200"/>
+  </cs:axisTitle>
+  <cs:categoryAxis>
+    <cs:lnRef idx="0"/>
+    <cs:fillRef idx="0"/>
+    <cs:effectRef idx="0"/>
+    <cs:fontRef idx="minor">
+      <a:schemeClr val="tx1">
+        <a:lumMod val="65000"/>
+        <a:lumOff val="35000"/>
+      </a:schemeClr>
+    </cs:fontRef>
+    <cs:spPr>
+      <a:ln w="9525" cap="flat" cmpd="sng" algn="ctr">
+        <a:solidFill>
+          <a:schemeClr val="tx1">
+            <a:lumMod val="15000"/>
+            <a:lumOff val="85000"/>
+          </a:schemeClr>
+        </a:solidFill>
+        <a:round/>
+      </a:ln>
+    </cs:spPr>
+    <cs:defRPr sz="900" kern="1200"/>
+  </cs:categoryAxis>
+  <cs:chartArea mods="allowNoFillOverride allowNoLineOverride">
+    <cs:lnRef idx="0"/>
+    <cs:fillRef idx="0"/>
+    <cs:effectRef idx="0"/>
+    <cs:fontRef idx="minor">
+      <a:schemeClr val="tx1"/>
+    </cs:fontRef>
+    <cs:spPr>
+      <a:solidFill>
+        <a:schemeClr val="bg1"/>
+      </a:solidFill>
+      <a:ln w="9525" cap="flat" cmpd="sng" algn="ctr">
+        <a:solidFill>
+          <a:schemeClr val="tx1">
+            <a:lumMod val="15000"/>
+            <a:lumOff val="85000"/>
+          </a:schemeClr>
+        </a:solidFill>
+        <a:round/>
+      </a:ln>
+    </cs:spPr>
+    <cs:defRPr sz="1000" kern="1200"/>
+  </cs:chartArea>
+  <cs:dataLabel>
+    <cs:lnRef idx="0"/>
+    <cs:fillRef idx="0"/>
+    <cs:effectRef idx="0"/>
+    <cs:fontRef idx="minor">
+      <a:schemeClr val="tx1">
+        <a:lumMod val="75000"/>
+        <a:lumOff val="25000"/>
+      </a:schemeClr>
+    </cs:fontRef>
+    <cs:defRPr sz="900" kern="1200"/>
+  </cs:dataLabel>
+  <cs:dataLabelCallout>
+    <cs:lnRef idx="0"/>
+    <cs:fillRef idx="0"/>
+    <cs:effectRef idx="0"/>
+    <cs:fontRef idx="minor">
+      <a:schemeClr val="dk1">
+        <a:lumMod val="65000"/>
+        <a:lumOff val="35000"/>
+      </a:schemeClr>
+    </cs:fontRef>
+    <cs:spPr>
+      <a:solidFill>
+        <a:schemeClr val="lt1"/>
+      </a:solidFill>
+      <a:ln>
+        <a:solidFill>
+          <a:schemeClr val="dk1">
+            <a:lumMod val="25000"/>
+            <a:lumOff val="75000"/>
+          </a:schemeClr>
+        </a:solidFill>
+      </a:ln>
+    </cs:spPr>
+    <cs:defRPr sz="900" kern="1200"/>
+    <cs:bodyPr rot="0" spcFirstLastPara="1" vertOverflow="clip" horzOverflow="clip" vert="horz" wrap="square" lIns="36576" tIns="18288" rIns="36576" bIns="18288" anchor="ctr" anchorCtr="1">
+      <a:spAutoFit/>
+    </cs:bodyPr>
+  </cs:dataLabelCallout>
+  <cs:dataPoint>
+    <cs:lnRef idx="0"/>
+    <cs:fillRef idx="1">
+      <cs:styleClr val="auto"/>
+    </cs:fillRef>
+    <cs:effectRef idx="0"/>
+    <cs:fontRef idx="minor">
+      <a:schemeClr val="tx1"/>
+    </cs:fontRef>
+  </cs:dataPoint>
+  <cs:dataPoint3D>
+    <cs:lnRef idx="0"/>
+    <cs:fillRef idx="1">
+      <cs:styleClr val="auto"/>
+    </cs:fillRef>
+    <cs:effectRef idx="0"/>
+    <cs:fontRef idx="minor">
+      <a:schemeClr val="tx1"/>
+    </cs:fontRef>
+  </cs:dataPoint3D>
+  <cs:dataPointLine>
+    <cs:lnRef idx="0">
+      <cs:styleClr val="auto"/>
+    </cs:lnRef>
+    <cs:fillRef idx="1"/>
+    <cs:effectRef idx="0"/>
+    <cs:fontRef idx="minor">
+      <a:schemeClr val="tx1"/>
+    </cs:fontRef>
+    <cs:spPr>
+      <a:ln w="28575" cap="rnd">
+        <a:solidFill>
+          <a:schemeClr val="phClr"/>
+        </a:solidFill>
+        <a:round/>
+      </a:ln>
+    </cs:spPr>
+  </cs:dataPointLine>
+  <cs:dataPointMarker>
+    <cs:lnRef idx="0">
+      <cs:styleClr val="auto"/>
+    </cs:lnRef>
+    <cs:fillRef idx="1">
+      <cs:styleClr val="auto"/>
+    </cs:fillRef>
+    <cs:effectRef idx="0"/>
+    <cs:fontRef idx="minor">
+      <a:schemeClr val="tx1"/>
+    </cs:fontRef>
+    <cs:spPr>
+      <a:ln w="9525">
+        <a:solidFill>
+          <a:schemeClr val="phClr"/>
+        </a:solidFill>
+      </a:ln>
+    </cs:spPr>
+  </cs:dataPointMarker>
+  <cs:dataPointMarkerLayout symbol="circle" size="5"/>
+  <cs:dataPointWireframe>
+    <cs:lnRef idx="0">
+      <cs:styleClr val="auto"/>
+    </cs:lnRef>
+    <cs:fillRef idx="1"/>
+    <cs:effectRef idx="0"/>
+    <cs:fontRef idx="minor">
+      <a:schemeClr val="tx1"/>
+    </cs:fontRef>
+    <cs:spPr>
+      <a:ln w="9525" cap="rnd">
+        <a:solidFill>
+          <a:schemeClr val="phClr"/>
+        </a:solidFill>
+        <a:round/>
+      </a:ln>
+    </cs:spPr>
+  </cs:dataPointWireframe>
+  <cs:dataTable>
+    <cs:lnRef idx="0"/>
+    <cs:fillRef idx="0"/>
+    <cs:effectRef idx="0"/>
+    <cs:fontRef idx="minor">
+      <a:schemeClr val="tx1">
+        <a:lumMod val="65000"/>
+        <a:lumOff val="35000"/>
+      </a:schemeClr>
+    </cs:fontRef>
+    <cs:spPr>
+      <a:noFill/>
+      <a:ln w="9525" cap="flat" cmpd="sng" algn="ctr">
+        <a:solidFill>
+          <a:schemeClr val="tx1">
+            <a:lumMod val="15000"/>
+            <a:lumOff val="85000"/>
+          </a:schemeClr>
+        </a:solidFill>
+        <a:round/>
+      </a:ln>
+    </cs:spPr>
+    <cs:defRPr sz="900" kern="1200"/>
+  </cs:dataTable>
+  <cs:downBar>
+    <cs:lnRef idx="0"/>
+    <cs:fillRef idx="0"/>
+    <cs:effectRef idx="0"/>
+    <cs:fontRef idx="minor">
+      <a:schemeClr val="tx1"/>
+    </cs:fontRef>
+    <cs:spPr>
+      <a:solidFill>
+        <a:schemeClr val="dk1">
+          <a:lumMod val="75000"/>
+          <a:lumOff val="25000"/>
+        </a:schemeClr>
+      </a:solidFill>
+      <a:ln w="9525" cap="flat" cmpd="sng" algn="ctr">
+        <a:solidFill>
+          <a:schemeClr val="tx1">
+            <a:lumMod val="65000"/>
+            <a:lumOff val="35000"/>
+          </a:schemeClr>
+        </a:solidFill>
+        <a:round/>
+      </a:ln>
+    </cs:spPr>
+  </cs:downBar>
+  <cs:dropLine>
+    <cs:lnRef idx="0"/>
+    <cs:fillRef idx="0"/>
+    <cs:effectRef idx="0"/>
+    <cs:fontRef idx="minor">
+      <a:schemeClr val="tx1"/>
+    </cs:fontRef>
+    <cs:spPr>
+      <a:ln w="9525" cap="flat" cmpd="sng" algn="ctr">
+        <a:solidFill>
+          <a:schemeClr val="tx1">
+            <a:lumMod val="35000"/>
+            <a:lumOff val="65000"/>
+          </a:schemeClr>
+        </a:solidFill>
+        <a:round/>
+      </a:ln>
+    </cs:spPr>
+  </cs:dropLine>
+  <cs:errorBar>
+    <cs:lnRef idx="0"/>
+    <cs:fillRef idx="0"/>
+    <cs:effectRef idx="0"/>
+    <cs:fontRef idx="minor">
+      <a:schemeClr val="tx1"/>
+    </cs:fontRef>
+    <cs:spPr>
+      <a:ln w="9525" cap="flat" cmpd="sng" algn="ctr">
+        <a:solidFill>
+          <a:schemeClr val="tx1">
+            <a:lumMod val="65000"/>
+            <a:lumOff val="35000"/>
+          </a:schemeClr>
+        </a:solidFill>
+        <a:round/>
+      </a:ln>
+    </cs:spPr>
+  </cs:errorBar>
+  <cs:floor>
+    <cs:lnRef idx="0"/>
+    <cs:fillRef idx="0"/>
+    <cs:effectRef idx="0"/>
+    <cs:fontRef idx="minor">
+      <a:schemeClr val="tx1"/>
+    </cs:fontRef>
+    <cs:spPr>
+      <a:noFill/>
+      <a:ln>
+        <a:noFill/>
+      </a:ln>
+    </cs:spPr>
+  </cs:floor>
+  <cs:gridlineMajor>
+    <cs:lnRef idx="0"/>
+    <cs:fillRef idx="0"/>
+    <cs:effectRef idx="0"/>
+    <cs:fontRef idx="minor">
+      <a:schemeClr val="tx1"/>
+    </cs:fontRef>
+    <cs:spPr>
+      <a:ln w="9525" cap="flat" cmpd="sng" algn="ctr">
+        <a:solidFill>
+          <a:schemeClr val="tx1">
+            <a:lumMod val="15000"/>
+            <a:lumOff val="85000"/>
+          </a:schemeClr>
+        </a:solidFill>
+        <a:round/>
+      </a:ln>
+    </cs:spPr>
+  </cs:gridlineMajor>
+  <cs:gridlineMinor>
+    <cs:lnRef idx="0"/>
+    <cs:fillRef idx="0"/>
+    <cs:effectRef idx="0"/>
+    <cs:fontRef idx="minor">
+      <a:schemeClr val="tx1"/>
+    </cs:fontRef>
+    <cs:spPr>
+      <a:ln w="9525" cap="flat" cmpd="sng" algn="ctr">
+        <a:solidFill>
+          <a:schemeClr val="tx1">
+            <a:lumMod val="5000"/>
+            <a:lumOff val="95000"/>
+          </a:schemeClr>
+        </a:solidFill>
+        <a:round/>
+      </a:ln>
+    </cs:spPr>
+  </cs:gridlineMinor>
+  <cs:hiLoLine>
+    <cs:lnRef idx="0"/>
+    <cs:fillRef idx="0"/>
+    <cs:effectRef idx="0"/>
+    <cs:fontRef idx="minor">
+      <a:schemeClr val="tx1"/>
+    </cs:fontRef>
+    <cs:spPr>
+      <a:ln w="9525" cap="flat" cmpd="sng" algn="ctr">
+        <a:solidFill>
+          <a:schemeClr val="tx1">
+            <a:lumMod val="50000"/>
+            <a:lumOff val="50000"/>
+          </a:schemeClr>
+        </a:solidFill>
+        <a:round/>
+      </a:ln>
+    </cs:spPr>
+  </cs:hiLoLine>
+  <cs:leaderLine>
+    <cs:lnRef idx="0"/>
+    <cs:fillRef idx="0"/>
+    <cs:effectRef idx="0"/>
+    <cs:fontRef idx="minor">
+      <a:schemeClr val="tx1"/>
+    </cs:fontRef>
+    <cs:spPr>
+      <a:ln w="9525" cap="flat" cmpd="sng" algn="ctr">
+        <a:solidFill>
+          <a:schemeClr val="tx1">
+            <a:lumMod val="35000"/>
+            <a:lumOff val="65000"/>
+          </a:schemeClr>
+        </a:solidFill>
+        <a:round/>
+      </a:ln>
+    </cs:spPr>
+  </cs:leaderLine>
+  <cs:legend>
+    <cs:lnRef idx="0"/>
+    <cs:fillRef idx="0"/>
+    <cs:effectRef idx="0"/>
+    <cs:fontRef idx="minor">
+      <a:schemeClr val="tx1">
+        <a:lumMod val="65000"/>
+        <a:lumOff val="35000"/>
+      </a:schemeClr>
+    </cs:fontRef>
+    <cs:defRPr sz="900" kern="1200"/>
+  </cs:legend>
+  <cs:plotArea mods="allowNoFillOverride allowNoLineOverride">
+    <cs:lnRef idx="0"/>
+    <cs:fillRef idx="0"/>
+    <cs:effectRef idx="0"/>
+    <cs:fontRef idx="minor">
+      <a:schemeClr val="tx1"/>
+    </cs:fontRef>
+  </cs:plotArea>
+  <cs:plotArea3D mods="allowNoFillOverride allowNoLineOverride">
+    <cs:lnRef idx="0"/>
+    <cs:fillRef idx="0"/>
+    <cs:effectRef idx="0"/>
+    <cs:fontRef idx="minor">
+      <a:schemeClr val="tx1"/>
+    </cs:fontRef>
+  </cs:plotArea3D>
+  <cs:seriesAxis>
+    <cs:lnRef idx="0"/>
+    <cs:fillRef idx="0"/>
+    <cs:effectRef idx="0"/>
+    <cs:fontRef idx="minor">
+      <a:schemeClr val="tx1">
+        <a:lumMod val="65000"/>
+        <a:lumOff val="35000"/>
+      </a:schemeClr>
+    </cs:fontRef>
+    <cs:defRPr sz="900" kern="1200"/>
+  </cs:seriesAxis>
+  <cs:seriesLine>
+    <cs:lnRef idx="0"/>
+    <cs:fillRef idx="0"/>
+    <cs:effectRef idx="0"/>
+    <cs:fontRef idx="minor">
+      <a:schemeClr val="tx1"/>
+    </cs:fontRef>
+    <cs:spPr>
+      <a:ln w="9525" cap="flat" cmpd="sng" algn="ctr">
+        <a:solidFill>
+          <a:schemeClr val="tx1">
+            <a:lumMod val="35000"/>
+            <a:lumOff val="65000"/>
+          </a:schemeClr>
+        </a:solidFill>
+        <a:round/>
+      </a:ln>
+    </cs:spPr>
+  </cs:seriesLine>
+  <cs:title>
+    <cs:lnRef idx="0"/>
+    <cs:fillRef idx="0"/>
+    <cs:effectRef idx="0"/>
+    <cs:fontRef idx="minor">
+      <a:schemeClr val="tx1">
+        <a:lumMod val="65000"/>
+        <a:lumOff val="35000"/>
+      </a:schemeClr>
+    </cs:fontRef>
+    <cs:defRPr sz="1400" b="0" kern="1200" spc="0" baseline="0"/>
+  </cs:title>
+  <cs:trendline>
+    <cs:lnRef idx="0">
+      <cs:styleClr val="auto"/>
+    </cs:lnRef>
+    <cs:fillRef idx="0"/>
+    <cs:effectRef idx="0"/>
+    <cs:fontRef idx="minor">
+      <a:schemeClr val="tx1"/>
+    </cs:fontRef>
+    <cs:spPr>
+      <a:ln w="19050" cap="rnd">
+        <a:solidFill>
+          <a:schemeClr val="phClr"/>
+        </a:solidFill>
+        <a:prstDash val="sysDot"/>
+      </a:ln>
+    </cs:spPr>
+  </cs:trendline>
+  <cs:trendlineLabel>
+    <cs:lnRef idx="0"/>
+    <cs:fillRef idx="0"/>
+    <cs:effectRef idx="0"/>
+    <cs:fontRef idx="minor">
+      <a:schemeClr val="tx1">
+        <a:lumMod val="65000"/>
+        <a:lumOff val="35000"/>
+      </a:schemeClr>
+    </cs:fontRef>
+    <cs:defRPr sz="900" kern="1200"/>
+  </cs:trendlineLabel>
+  <cs:upBar>
+    <cs:lnRef idx="0"/>
+    <cs:fillRef idx="0"/>
+    <cs:effectRef idx="0"/>
+    <cs:fontRef idx="minor">
+      <a:schemeClr val="tx1"/>
+    </cs:fontRef>
+    <cs:spPr>
+      <a:solidFill>
+        <a:schemeClr val="lt1"/>
+      </a:solidFill>
+      <a:ln w="9525" cap="flat" cmpd="sng" algn="ctr">
+        <a:solidFill>
+          <a:schemeClr val="tx1">
+            <a:lumMod val="65000"/>
+            <a:lumOff val="35000"/>
+          </a:schemeClr>
+        </a:solidFill>
+        <a:round/>
+      </a:ln>
+    </cs:spPr>
+  </cs:upBar>
+  <cs:valueAxis>
+    <cs:lnRef idx="0"/>
+    <cs:fillRef idx="0"/>
+    <cs:effectRef idx="0"/>
+    <cs:fontRef idx="minor">
+      <a:schemeClr val="tx1">
+        <a:lumMod val="65000"/>
+        <a:lumOff val="35000"/>
+      </a:schemeClr>
+    </cs:fontRef>
+    <cs:defRPr sz="900" kern="1200"/>
+  </cs:valueAxis>
+  <cs:wall>
+    <cs:lnRef idx="0"/>
+    <cs:fillRef idx="0"/>
+    <cs:effectRef idx="0"/>
+    <cs:fontRef idx="minor">
+      <a:schemeClr val="tx1"/>
+    </cs:fontRef>
+    <cs:spPr>
+      <a:noFill/>
+      <a:ln>
+        <a:noFill/>
+      </a:ln>
+    </cs:spPr>
+  </cs:wall>
+</cs:chartStyle>
 </file>
 
 <file path=ppt/notesMasters/notesMaster1.xml><?xml version="1.0" encoding="utf-8"?>
@@ -4948,7 +5796,13 @@
   <p:cSld>
     <p:spTree>
       <p:nvGrpSpPr>
-        <p:cNvPr id="1" name=""/>
+        <p:cNvPr id="1" name="">
+          <a:extLst>
+            <a:ext uri="{FF2B5EF4-FFF2-40B4-BE49-F238E27FC236}">
+              <a16:creationId xmlns:a16="http://schemas.microsoft.com/office/drawing/2014/main" id="{0EBAA1BC-5AD6-34B5-08D8-A966BB58FF86}"/>
+            </a:ext>
+          </a:extLst>
+        </p:cNvPr>
         <p:cNvGrpSpPr/>
         <p:nvPr/>
       </p:nvGrpSpPr>
@@ -4965,7 +5819,7 @@
           <p:cNvPr id="2" name="Titel 1">
             <a:extLst>
               <a:ext uri="{FF2B5EF4-FFF2-40B4-BE49-F238E27FC236}">
-                <a16:creationId xmlns:a16="http://schemas.microsoft.com/office/drawing/2014/main" id="{A075FF74-E5D2-1C9F-1DF3-DCD54EF547E9}"/>
+                <a16:creationId xmlns:a16="http://schemas.microsoft.com/office/drawing/2014/main" id="{5F443F45-EA60-0E1C-B6A3-26F565B629C3}"/>
               </a:ext>
             </a:extLst>
           </p:cNvPr>
@@ -4983,136 +5837,7 @@
           <a:p>
             <a:r>
               <a:rPr lang="de-DE" dirty="0"/>
-              <a:t>6. Software-Tools</a:t>
-            </a:r>
-          </a:p>
-        </p:txBody>
-      </p:sp>
-      <p:sp>
-        <p:nvSpPr>
-          <p:cNvPr id="3" name="Inhaltsplatzhalter 2">
-            <a:extLst>
-              <a:ext uri="{FF2B5EF4-FFF2-40B4-BE49-F238E27FC236}">
-                <a16:creationId xmlns:a16="http://schemas.microsoft.com/office/drawing/2014/main" id="{E627C203-A1B7-383D-97A8-56B3248A1E83}"/>
-              </a:ext>
-            </a:extLst>
-          </p:cNvPr>
-          <p:cNvSpPr>
-            <a:spLocks noGrp="1"/>
-          </p:cNvSpPr>
-          <p:nvPr>
-            <p:ph sz="half" idx="1"/>
-          </p:nvPr>
-        </p:nvSpPr>
-        <p:spPr/>
-        <p:txBody>
-          <a:bodyPr>
-            <a:normAutofit/>
-          </a:bodyPr>
-          <a:lstStyle/>
-          <a:p>
-            <a:r>
-              <a:rPr lang="de-DE" dirty="0"/>
-              <a:t>Programmiersprache:</a:t>
-            </a:r>
-          </a:p>
-          <a:p>
-            <a:pPr lvl="1"/>
-            <a:r>
-              <a:rPr lang="de-DE" dirty="0"/>
-              <a:t>C#</a:t>
-            </a:r>
-          </a:p>
-          <a:p>
-            <a:r>
-              <a:rPr lang="de-DE" dirty="0"/>
-              <a:t>Framework:</a:t>
-            </a:r>
-          </a:p>
-          <a:p>
-            <a:pPr lvl="1"/>
-            <a:r>
-              <a:rPr lang="de-DE" dirty="0" err="1"/>
-              <a:t>Blazor</a:t>
-            </a:r>
-            <a:endParaRPr lang="de-DE" dirty="0"/>
-          </a:p>
-          <a:p>
-            <a:r>
-              <a:rPr lang="de-DE" dirty="0"/>
-              <a:t>IDE:</a:t>
-            </a:r>
-          </a:p>
-          <a:p>
-            <a:pPr lvl="1"/>
-            <a:r>
-              <a:rPr lang="de-DE" dirty="0"/>
-              <a:t>Visual Studio</a:t>
-            </a:r>
-          </a:p>
-        </p:txBody>
-      </p:sp>
-      <p:sp>
-        <p:nvSpPr>
-          <p:cNvPr id="6" name="Inhaltsplatzhalter 5">
-            <a:extLst>
-              <a:ext uri="{FF2B5EF4-FFF2-40B4-BE49-F238E27FC236}">
-                <a16:creationId xmlns:a16="http://schemas.microsoft.com/office/drawing/2014/main" id="{7185288F-FFC3-A9CF-5040-625A8A619580}"/>
-              </a:ext>
-            </a:extLst>
-          </p:cNvPr>
-          <p:cNvSpPr>
-            <a:spLocks noGrp="1"/>
-          </p:cNvSpPr>
-          <p:nvPr>
-            <p:ph sz="half" idx="2"/>
-          </p:nvPr>
-        </p:nvSpPr>
-        <p:spPr/>
-        <p:txBody>
-          <a:bodyPr>
-            <a:normAutofit/>
-          </a:bodyPr>
-          <a:lstStyle/>
-          <a:p>
-            <a:r>
-              <a:rPr lang="de-DE" dirty="0"/>
-              <a:t>Datenbank:</a:t>
-            </a:r>
-          </a:p>
-          <a:p>
-            <a:pPr lvl="1"/>
-            <a:r>
-              <a:rPr lang="de-DE" dirty="0"/>
-              <a:t>SQLite</a:t>
-            </a:r>
-          </a:p>
-          <a:p>
-            <a:r>
-              <a:rPr lang="de-DE" dirty="0"/>
-              <a:t>Weitere Tools:</a:t>
-            </a:r>
-          </a:p>
-          <a:p>
-            <a:pPr lvl="1"/>
-            <a:r>
-              <a:rPr lang="de-DE" dirty="0"/>
-              <a:t>Git (Versionierung)</a:t>
-            </a:r>
-          </a:p>
-          <a:p>
-            <a:pPr lvl="1"/>
-            <a:r>
-              <a:rPr lang="de-DE" dirty="0"/>
-              <a:t>Docker (</a:t>
-            </a:r>
-            <a:r>
-              <a:rPr lang="de-DE" dirty="0" err="1"/>
-              <a:t>Deployment</a:t>
-            </a:r>
-            <a:r>
-              <a:rPr lang="de-DE" dirty="0"/>
-              <a:t>)</a:t>
+              <a:t>4. Detailplanung</a:t>
             </a:r>
           </a:p>
         </p:txBody>
@@ -5122,7 +5847,7 @@
           <p:cNvPr id="4" name="Datumsplatzhalter 3">
             <a:extLst>
               <a:ext uri="{FF2B5EF4-FFF2-40B4-BE49-F238E27FC236}">
-                <a16:creationId xmlns:a16="http://schemas.microsoft.com/office/drawing/2014/main" id="{F5985418-FDA1-F1A7-80E8-C25C6BAC324B}"/>
+                <a16:creationId xmlns:a16="http://schemas.microsoft.com/office/drawing/2014/main" id="{395E7399-B3E0-7EB3-D3E1-7C84C88418D1}"/>
               </a:ext>
             </a:extLst>
           </p:cNvPr>
@@ -5151,7 +5876,7 @@
           <p:cNvPr id="5" name="Foliennummernplatzhalter 4">
             <a:extLst>
               <a:ext uri="{FF2B5EF4-FFF2-40B4-BE49-F238E27FC236}">
-                <a16:creationId xmlns:a16="http://schemas.microsoft.com/office/drawing/2014/main" id="{6A7A11C6-83C4-FA07-F8C7-F2826F8F22B6}"/>
+                <a16:creationId xmlns:a16="http://schemas.microsoft.com/office/drawing/2014/main" id="{EC166D74-F411-B20C-059E-DADE72619AAF}"/>
               </a:ext>
             </a:extLst>
           </p:cNvPr>
@@ -5175,10 +5900,40 @@
           </a:p>
         </p:txBody>
       </p:sp>
+      <p:graphicFrame>
+        <p:nvGraphicFramePr>
+          <p:cNvPr id="10" name="Diagramm 9">
+            <a:extLst>
+              <a:ext uri="{FF2B5EF4-FFF2-40B4-BE49-F238E27FC236}">
+                <a16:creationId xmlns:a16="http://schemas.microsoft.com/office/drawing/2014/main" id="{33E7D1FF-F8D0-F6A6-E3F2-5DB3E10D3BE4}"/>
+              </a:ext>
+            </a:extLst>
+          </p:cNvPr>
+          <p:cNvGraphicFramePr>
+            <a:graphicFrameLocks/>
+          </p:cNvGraphicFramePr>
+          <p:nvPr>
+            <p:extLst>
+              <p:ext uri="{D42A27DB-BD31-4B8C-83A1-F6EECF244321}">
+                <p14:modId xmlns:p14="http://schemas.microsoft.com/office/powerpoint/2010/main" val="3149356319"/>
+              </p:ext>
+            </p:extLst>
+          </p:nvPr>
+        </p:nvGraphicFramePr>
+        <p:xfrm>
+          <a:off x="1406308" y="2084532"/>
+          <a:ext cx="6204456" cy="4271818"/>
+        </p:xfrm>
+        <a:graphic>
+          <a:graphicData uri="http://schemas.openxmlformats.org/drawingml/2006/chart">
+            <c:chart xmlns:c="http://schemas.openxmlformats.org/drawingml/2006/chart" xmlns:r="http://schemas.openxmlformats.org/officeDocument/2006/relationships" r:id="rId2"/>
+          </a:graphicData>
+        </a:graphic>
+      </p:graphicFrame>
     </p:spTree>
     <p:extLst>
       <p:ext uri="{BB962C8B-B14F-4D97-AF65-F5344CB8AC3E}">
-        <p14:creationId xmlns:p14="http://schemas.microsoft.com/office/powerpoint/2010/main" val="1367875186"/>
+        <p14:creationId xmlns:p14="http://schemas.microsoft.com/office/powerpoint/2010/main" val="1336503190"/>
       </p:ext>
     </p:extLst>
   </p:cSld>
@@ -5189,6 +5944,1828 @@
 </file>
 
 <file path=ppt/slides/slide11.xml><?xml version="1.0" encoding="utf-8"?>
+<p:sld xmlns:a="http://schemas.openxmlformats.org/drawingml/2006/main" xmlns:r="http://schemas.openxmlformats.org/officeDocument/2006/relationships" xmlns:p="http://schemas.openxmlformats.org/presentationml/2006/main">
+  <p:cSld>
+    <p:spTree>
+      <p:nvGrpSpPr>
+        <p:cNvPr id="1" name="">
+          <a:extLst>
+            <a:ext uri="{FF2B5EF4-FFF2-40B4-BE49-F238E27FC236}">
+              <a16:creationId xmlns:a16="http://schemas.microsoft.com/office/drawing/2014/main" id="{C1327A56-8803-8690-2656-DFE7A3F768B5}"/>
+            </a:ext>
+          </a:extLst>
+        </p:cNvPr>
+        <p:cNvGrpSpPr/>
+        <p:nvPr/>
+      </p:nvGrpSpPr>
+      <p:grpSpPr>
+        <a:xfrm>
+          <a:off x="0" y="0"/>
+          <a:ext cx="0" cy="0"/>
+          <a:chOff x="0" y="0"/>
+          <a:chExt cx="0" cy="0"/>
+        </a:xfrm>
+      </p:grpSpPr>
+      <p:sp>
+        <p:nvSpPr>
+          <p:cNvPr id="2" name="Titel 1">
+            <a:extLst>
+              <a:ext uri="{FF2B5EF4-FFF2-40B4-BE49-F238E27FC236}">
+                <a16:creationId xmlns:a16="http://schemas.microsoft.com/office/drawing/2014/main" id="{0A864DA5-00F2-B462-5059-ED63FF59DB1A}"/>
+              </a:ext>
+            </a:extLst>
+          </p:cNvPr>
+          <p:cNvSpPr>
+            <a:spLocks noGrp="1"/>
+          </p:cNvSpPr>
+          <p:nvPr>
+            <p:ph type="title"/>
+          </p:nvPr>
+        </p:nvSpPr>
+        <p:spPr/>
+        <p:txBody>
+          <a:bodyPr/>
+          <a:lstStyle/>
+          <a:p>
+            <a:r>
+              <a:rPr lang="de-DE" dirty="0"/>
+              <a:t>4. Detailplanung</a:t>
+            </a:r>
+          </a:p>
+        </p:txBody>
+      </p:sp>
+      <p:sp>
+        <p:nvSpPr>
+          <p:cNvPr id="4" name="Datumsplatzhalter 3">
+            <a:extLst>
+              <a:ext uri="{FF2B5EF4-FFF2-40B4-BE49-F238E27FC236}">
+                <a16:creationId xmlns:a16="http://schemas.microsoft.com/office/drawing/2014/main" id="{D5956103-E0B1-94D3-AA92-F9B93F440033}"/>
+              </a:ext>
+            </a:extLst>
+          </p:cNvPr>
+          <p:cNvSpPr>
+            <a:spLocks noGrp="1"/>
+          </p:cNvSpPr>
+          <p:nvPr>
+            <p:ph type="dt" sz="half" idx="10"/>
+          </p:nvPr>
+        </p:nvSpPr>
+        <p:spPr/>
+        <p:txBody>
+          <a:bodyPr/>
+          <a:lstStyle/>
+          <a:p>
+            <a:fld id="{42B45B56-1D88-4042-8DF0-EB6B41B710D3}" type="datetime1">
+              <a:rPr lang="de-DE" smtClean="0"/>
+              <a:t>23.11.2024</a:t>
+            </a:fld>
+            <a:endParaRPr lang="en-US"/>
+          </a:p>
+        </p:txBody>
+      </p:sp>
+      <p:sp>
+        <p:nvSpPr>
+          <p:cNvPr id="5" name="Foliennummernplatzhalter 4">
+            <a:extLst>
+              <a:ext uri="{FF2B5EF4-FFF2-40B4-BE49-F238E27FC236}">
+                <a16:creationId xmlns:a16="http://schemas.microsoft.com/office/drawing/2014/main" id="{978AA4DA-49E4-BCC5-53AE-89AEF02600C9}"/>
+              </a:ext>
+            </a:extLst>
+          </p:cNvPr>
+          <p:cNvSpPr>
+            <a:spLocks noGrp="1"/>
+          </p:cNvSpPr>
+          <p:nvPr>
+            <p:ph type="sldNum" sz="quarter" idx="12"/>
+          </p:nvPr>
+        </p:nvSpPr>
+        <p:spPr/>
+        <p:txBody>
+          <a:bodyPr/>
+          <a:lstStyle/>
+          <a:p>
+            <a:fld id="{07CE569E-9B7C-4CB9-AB80-C0841F922CFF}" type="slidenum">
+              <a:rPr lang="en-US" smtClean="0"/>
+              <a:t>11</a:t>
+            </a:fld>
+            <a:endParaRPr lang="en-US"/>
+          </a:p>
+        </p:txBody>
+      </p:sp>
+      <p:pic>
+        <p:nvPicPr>
+          <p:cNvPr id="7" name="Grafik 6">
+            <a:extLst>
+              <a:ext uri="{FF2B5EF4-FFF2-40B4-BE49-F238E27FC236}">
+                <a16:creationId xmlns:a16="http://schemas.microsoft.com/office/drawing/2014/main" id="{819AB691-D2DA-B0AA-EE22-8C598AF8EE14}"/>
+              </a:ext>
+            </a:extLst>
+          </p:cNvPr>
+          <p:cNvPicPr>
+            <a:picLocks noChangeAspect="1"/>
+          </p:cNvPicPr>
+          <p:nvPr/>
+        </p:nvPicPr>
+        <p:blipFill>
+          <a:blip r:embed="rId2"/>
+          <a:stretch>
+            <a:fillRect/>
+          </a:stretch>
+        </p:blipFill>
+        <p:spPr>
+          <a:xfrm>
+            <a:off x="6888985" y="5804040"/>
+            <a:ext cx="1738967" cy="451906"/>
+          </a:xfrm>
+          <a:prstGeom prst="rect">
+            <a:avLst/>
+          </a:prstGeom>
+        </p:spPr>
+      </p:pic>
+      <p:sp>
+        <p:nvSpPr>
+          <p:cNvPr id="12" name="Textfeld 11">
+            <a:extLst>
+              <a:ext uri="{FF2B5EF4-FFF2-40B4-BE49-F238E27FC236}">
+                <a16:creationId xmlns:a16="http://schemas.microsoft.com/office/drawing/2014/main" id="{4E62AC30-F4D6-5400-C0D8-8E1650F3D06C}"/>
+              </a:ext>
+            </a:extLst>
+          </p:cNvPr>
+          <p:cNvSpPr txBox="1"/>
+          <p:nvPr/>
+        </p:nvSpPr>
+        <p:spPr>
+          <a:xfrm>
+            <a:off x="6889688" y="5845327"/>
+            <a:ext cx="1524000" cy="369332"/>
+          </a:xfrm>
+          <a:prstGeom prst="rect">
+            <a:avLst/>
+          </a:prstGeom>
+          <a:noFill/>
+        </p:spPr>
+        <p:txBody>
+          <a:bodyPr wrap="square" rtlCol="0">
+            <a:spAutoFit/>
+          </a:bodyPr>
+          <a:lstStyle/>
+          <a:p>
+            <a:r>
+              <a:rPr lang="en-US" dirty="0">
+                <a:solidFill>
+                  <a:schemeClr val="bg1"/>
+                </a:solidFill>
+              </a:rPr>
+              <a:t>46</a:t>
+            </a:r>
+            <a:endParaRPr lang="de-DE" dirty="0">
+              <a:solidFill>
+                <a:schemeClr val="bg1"/>
+              </a:solidFill>
+            </a:endParaRPr>
+          </a:p>
+        </p:txBody>
+      </p:sp>
+      <p:pic>
+        <p:nvPicPr>
+          <p:cNvPr id="10" name="Grafik 9">
+            <a:extLst>
+              <a:ext uri="{FF2B5EF4-FFF2-40B4-BE49-F238E27FC236}">
+                <a16:creationId xmlns:a16="http://schemas.microsoft.com/office/drawing/2014/main" id="{CA6DDC0B-0274-D1AA-72FE-7ABE596AB171}"/>
+              </a:ext>
+            </a:extLst>
+          </p:cNvPr>
+          <p:cNvPicPr>
+            <a:picLocks noChangeAspect="1"/>
+          </p:cNvPicPr>
+          <p:nvPr/>
+        </p:nvPicPr>
+        <p:blipFill>
+          <a:blip r:embed="rId3"/>
+          <a:stretch>
+            <a:fillRect/>
+          </a:stretch>
+        </p:blipFill>
+        <p:spPr>
+          <a:xfrm>
+            <a:off x="427604" y="2219241"/>
+            <a:ext cx="9981978" cy="4036705"/>
+          </a:xfrm>
+          <a:prstGeom prst="rect">
+            <a:avLst/>
+          </a:prstGeom>
+        </p:spPr>
+      </p:pic>
+    </p:spTree>
+    <p:extLst>
+      <p:ext uri="{BB962C8B-B14F-4D97-AF65-F5344CB8AC3E}">
+        <p14:creationId xmlns:p14="http://schemas.microsoft.com/office/powerpoint/2010/main" val="4250882649"/>
+      </p:ext>
+    </p:extLst>
+  </p:cSld>
+  <p:clrMapOvr>
+    <a:masterClrMapping/>
+  </p:clrMapOvr>
+</p:sld>
+</file>
+
+<file path=ppt/slides/slide12.xml><?xml version="1.0" encoding="utf-8"?>
+<p:sld xmlns:a="http://schemas.openxmlformats.org/drawingml/2006/main" xmlns:r="http://schemas.openxmlformats.org/officeDocument/2006/relationships" xmlns:p="http://schemas.openxmlformats.org/presentationml/2006/main">
+  <p:cSld>
+    <p:spTree>
+      <p:nvGrpSpPr>
+        <p:cNvPr id="1" name="">
+          <a:extLst>
+            <a:ext uri="{FF2B5EF4-FFF2-40B4-BE49-F238E27FC236}">
+              <a16:creationId xmlns:a16="http://schemas.microsoft.com/office/drawing/2014/main" id="{40351EEA-BA7C-3B90-561D-0D11492BE107}"/>
+            </a:ext>
+          </a:extLst>
+        </p:cNvPr>
+        <p:cNvGrpSpPr/>
+        <p:nvPr/>
+      </p:nvGrpSpPr>
+      <p:grpSpPr>
+        <a:xfrm>
+          <a:off x="0" y="0"/>
+          <a:ext cx="0" cy="0"/>
+          <a:chOff x="0" y="0"/>
+          <a:chExt cx="0" cy="0"/>
+        </a:xfrm>
+      </p:grpSpPr>
+      <p:sp>
+        <p:nvSpPr>
+          <p:cNvPr id="2" name="Titel 1">
+            <a:extLst>
+              <a:ext uri="{FF2B5EF4-FFF2-40B4-BE49-F238E27FC236}">
+                <a16:creationId xmlns:a16="http://schemas.microsoft.com/office/drawing/2014/main" id="{908A1978-E453-21F5-A750-26DEAE0EE0B6}"/>
+              </a:ext>
+            </a:extLst>
+          </p:cNvPr>
+          <p:cNvSpPr>
+            <a:spLocks noGrp="1"/>
+          </p:cNvSpPr>
+          <p:nvPr>
+            <p:ph type="title"/>
+          </p:nvPr>
+        </p:nvSpPr>
+        <p:spPr/>
+        <p:txBody>
+          <a:bodyPr/>
+          <a:lstStyle/>
+          <a:p>
+            <a:r>
+              <a:rPr lang="de-DE" dirty="0"/>
+              <a:t>4. Detailplanung</a:t>
+            </a:r>
+          </a:p>
+        </p:txBody>
+      </p:sp>
+      <p:sp>
+        <p:nvSpPr>
+          <p:cNvPr id="4" name="Datumsplatzhalter 3">
+            <a:extLst>
+              <a:ext uri="{FF2B5EF4-FFF2-40B4-BE49-F238E27FC236}">
+                <a16:creationId xmlns:a16="http://schemas.microsoft.com/office/drawing/2014/main" id="{44128699-483C-B676-FF84-71EBEE7465AC}"/>
+              </a:ext>
+            </a:extLst>
+          </p:cNvPr>
+          <p:cNvSpPr>
+            <a:spLocks noGrp="1"/>
+          </p:cNvSpPr>
+          <p:nvPr>
+            <p:ph type="dt" sz="half" idx="10"/>
+          </p:nvPr>
+        </p:nvSpPr>
+        <p:spPr/>
+        <p:txBody>
+          <a:bodyPr/>
+          <a:lstStyle/>
+          <a:p>
+            <a:fld id="{42B45B56-1D88-4042-8DF0-EB6B41B710D3}" type="datetime1">
+              <a:rPr lang="de-DE" smtClean="0"/>
+              <a:t>23.11.2024</a:t>
+            </a:fld>
+            <a:endParaRPr lang="en-US"/>
+          </a:p>
+        </p:txBody>
+      </p:sp>
+      <p:sp>
+        <p:nvSpPr>
+          <p:cNvPr id="5" name="Foliennummernplatzhalter 4">
+            <a:extLst>
+              <a:ext uri="{FF2B5EF4-FFF2-40B4-BE49-F238E27FC236}">
+                <a16:creationId xmlns:a16="http://schemas.microsoft.com/office/drawing/2014/main" id="{E5843F72-DC90-0016-08C4-DE4726BBFC55}"/>
+              </a:ext>
+            </a:extLst>
+          </p:cNvPr>
+          <p:cNvSpPr>
+            <a:spLocks noGrp="1"/>
+          </p:cNvSpPr>
+          <p:nvPr>
+            <p:ph type="sldNum" sz="quarter" idx="12"/>
+          </p:nvPr>
+        </p:nvSpPr>
+        <p:spPr/>
+        <p:txBody>
+          <a:bodyPr/>
+          <a:lstStyle/>
+          <a:p>
+            <a:fld id="{07CE569E-9B7C-4CB9-AB80-C0841F922CFF}" type="slidenum">
+              <a:rPr lang="en-US" smtClean="0"/>
+              <a:t>12</a:t>
+            </a:fld>
+            <a:endParaRPr lang="en-US"/>
+          </a:p>
+        </p:txBody>
+      </p:sp>
+      <p:graphicFrame>
+        <p:nvGraphicFramePr>
+          <p:cNvPr id="3" name="Tabelle 2">
+            <a:extLst>
+              <a:ext uri="{FF2B5EF4-FFF2-40B4-BE49-F238E27FC236}">
+                <a16:creationId xmlns:a16="http://schemas.microsoft.com/office/drawing/2014/main" id="{B2306EE2-63D8-E950-D946-06B2B545E5A7}"/>
+              </a:ext>
+            </a:extLst>
+          </p:cNvPr>
+          <p:cNvGraphicFramePr>
+            <a:graphicFrameLocks noGrp="1"/>
+          </p:cNvGraphicFramePr>
+          <p:nvPr>
+            <p:extLst>
+              <p:ext uri="{D42A27DB-BD31-4B8C-83A1-F6EECF244321}">
+                <p14:modId xmlns:p14="http://schemas.microsoft.com/office/powerpoint/2010/main" val="3530604857"/>
+              </p:ext>
+            </p:extLst>
+          </p:nvPr>
+        </p:nvGraphicFramePr>
+        <p:xfrm>
+          <a:off x="911224" y="2587186"/>
+          <a:ext cx="8718551" cy="3886004"/>
+        </p:xfrm>
+        <a:graphic>
+          <a:graphicData uri="http://schemas.openxmlformats.org/drawingml/2006/table">
+            <a:tbl>
+              <a:tblPr bandRow="1">
+                <a:tableStyleId>{5C22544A-7EE6-4342-B048-85BDC9FD1C3A}</a:tableStyleId>
+              </a:tblPr>
+              <a:tblGrid>
+                <a:gridCol w="3184526">
+                  <a:extLst>
+                    <a:ext uri="{9D8B030D-6E8A-4147-A177-3AD203B41FA5}">
+                      <a16:colId xmlns:a16="http://schemas.microsoft.com/office/drawing/2014/main" val="194438012"/>
+                    </a:ext>
+                  </a:extLst>
+                </a:gridCol>
+                <a:gridCol w="5534025">
+                  <a:extLst>
+                    <a:ext uri="{9D8B030D-6E8A-4147-A177-3AD203B41FA5}">
+                      <a16:colId xmlns:a16="http://schemas.microsoft.com/office/drawing/2014/main" val="2620241848"/>
+                    </a:ext>
+                  </a:extLst>
+                </a:gridCol>
+              </a:tblGrid>
+              <a:tr h="441764">
+                <a:tc>
+                  <a:txBody>
+                    <a:bodyPr/>
+                    <a:lstStyle/>
+                    <a:p>
+                      <a:r>
+                        <a:rPr lang="en-US" sz="1400" dirty="0" err="1"/>
+                        <a:t>Dokumentation</a:t>
+                      </a:r>
+                      <a:r>
+                        <a:rPr lang="en-US" sz="1400" dirty="0"/>
+                        <a:t> + </a:t>
+                      </a:r>
+                      <a:r>
+                        <a:rPr lang="en-US" sz="1400" dirty="0" err="1"/>
+                        <a:t>Organisation</a:t>
+                      </a:r>
+                      <a:endParaRPr lang="de-DE" sz="1400" dirty="0"/>
+                    </a:p>
+                  </a:txBody>
+                  <a:tcPr/>
+                </a:tc>
+                <a:tc>
+                  <a:txBody>
+                    <a:bodyPr/>
+                    <a:lstStyle/>
+                    <a:p>
+                      <a:pPr marL="285750" indent="-285750">
+                        <a:buFont typeface="Arial" panose="020B0604020202020204" pitchFamily="34" charset="0"/>
+                        <a:buChar char="•"/>
+                      </a:pPr>
+                      <a:r>
+                        <a:rPr lang="en-US" sz="1400" dirty="0" err="1"/>
+                        <a:t>Geprüft</a:t>
+                      </a:r>
+                      <a:r>
+                        <a:rPr lang="en-US" sz="1400" dirty="0"/>
+                        <a:t> und </a:t>
+                      </a:r>
+                      <a:r>
+                        <a:rPr lang="en-US" sz="1400" dirty="0" err="1"/>
+                        <a:t>freigegeben</a:t>
+                      </a:r>
+                      <a:r>
+                        <a:rPr lang="en-US" sz="1400" dirty="0"/>
+                        <a:t>.</a:t>
+                      </a:r>
+                      <a:endParaRPr lang="de-DE" sz="1400" dirty="0"/>
+                    </a:p>
+                  </a:txBody>
+                  <a:tcPr/>
+                </a:tc>
+                <a:extLst>
+                  <a:ext uri="{0D108BD9-81ED-4DB2-BD59-A6C34878D82A}">
+                    <a16:rowId xmlns:a16="http://schemas.microsoft.com/office/drawing/2014/main" val="3514348944"/>
+                  </a:ext>
+                </a:extLst>
+              </a:tr>
+              <a:tr h="506337">
+                <a:tc>
+                  <a:txBody>
+                    <a:bodyPr/>
+                    <a:lstStyle/>
+                    <a:p>
+                      <a:pPr marL="0" marR="0" lvl="0" indent="0" algn="l" defTabSz="914400" rtl="0" eaLnBrk="1" fontAlgn="auto" latinLnBrk="0" hangingPunct="1">
+                        <a:lnSpc>
+                          <a:spcPct val="100000"/>
+                        </a:lnSpc>
+                        <a:spcBef>
+                          <a:spcPts val="0"/>
+                        </a:spcBef>
+                        <a:spcAft>
+                          <a:spcPts val="0"/>
+                        </a:spcAft>
+                        <a:buClrTx/>
+                        <a:buSzTx/>
+                        <a:buFontTx/>
+                        <a:buNone/>
+                        <a:tabLst/>
+                        <a:defRPr/>
+                      </a:pPr>
+                      <a:r>
+                        <a:rPr lang="en-US" sz="1400" dirty="0"/>
+                        <a:t>Website “Menu-Karte” </a:t>
+                      </a:r>
+                      <a:r>
+                        <a:rPr lang="en-US" sz="1400" dirty="0" err="1"/>
+                        <a:t>erstellen</a:t>
+                      </a:r>
+                      <a:endParaRPr lang="en-US" sz="1400" dirty="0"/>
+                    </a:p>
+                  </a:txBody>
+                  <a:tcPr/>
+                </a:tc>
+                <a:tc>
+                  <a:txBody>
+                    <a:bodyPr/>
+                    <a:lstStyle/>
+                    <a:p>
+                      <a:pPr marL="285750" marR="0" lvl="0" indent="-285750" algn="l" defTabSz="914400" rtl="0" eaLnBrk="1" fontAlgn="auto" latinLnBrk="0" hangingPunct="1">
+                        <a:lnSpc>
+                          <a:spcPct val="100000"/>
+                        </a:lnSpc>
+                        <a:spcBef>
+                          <a:spcPts val="0"/>
+                        </a:spcBef>
+                        <a:spcAft>
+                          <a:spcPts val="0"/>
+                        </a:spcAft>
+                        <a:buClrTx/>
+                        <a:buSzTx/>
+                        <a:buFont typeface="Arial" panose="020B0604020202020204" pitchFamily="34" charset="0"/>
+                        <a:buChar char="•"/>
+                        <a:tabLst/>
+                        <a:defRPr/>
+                      </a:pPr>
+                      <a:r>
+                        <a:rPr lang="en-US" sz="1400" dirty="0"/>
+                        <a:t>Alle </a:t>
+                      </a:r>
+                      <a:r>
+                        <a:rPr lang="en-US" sz="1400" dirty="0" err="1"/>
+                        <a:t>Speisen</a:t>
+                      </a:r>
+                      <a:r>
+                        <a:rPr lang="en-US" sz="1400" dirty="0"/>
+                        <a:t> </a:t>
+                      </a:r>
+                      <a:r>
+                        <a:rPr lang="en-US" sz="1400" dirty="0" err="1"/>
+                        <a:t>sind</a:t>
+                      </a:r>
+                      <a:r>
+                        <a:rPr lang="en-US" sz="1400" dirty="0"/>
+                        <a:t> </a:t>
+                      </a:r>
+                      <a:r>
+                        <a:rPr lang="en-US" sz="1400" dirty="0" err="1"/>
+                        <a:t>sichtbar</a:t>
+                      </a:r>
+                      <a:r>
+                        <a:rPr lang="en-US" sz="1400" dirty="0"/>
+                        <a:t> und </a:t>
+                      </a:r>
+                      <a:r>
+                        <a:rPr lang="en-US" sz="1400" dirty="0" err="1"/>
+                        <a:t>auswählbar</a:t>
+                      </a:r>
+                      <a:r>
+                        <a:rPr lang="en-US" sz="1400" dirty="0"/>
+                        <a:t>.</a:t>
+                      </a:r>
+                    </a:p>
+                    <a:p>
+                      <a:pPr marL="285750" marR="0" lvl="0" indent="-285750" algn="l" defTabSz="914400" rtl="0" eaLnBrk="1" fontAlgn="auto" latinLnBrk="0" hangingPunct="1">
+                        <a:lnSpc>
+                          <a:spcPct val="100000"/>
+                        </a:lnSpc>
+                        <a:spcBef>
+                          <a:spcPts val="0"/>
+                        </a:spcBef>
+                        <a:spcAft>
+                          <a:spcPts val="0"/>
+                        </a:spcAft>
+                        <a:buClrTx/>
+                        <a:buSzTx/>
+                        <a:buFont typeface="Arial" panose="020B0604020202020204" pitchFamily="34" charset="0"/>
+                        <a:buChar char="•"/>
+                        <a:tabLst/>
+                        <a:defRPr/>
+                      </a:pPr>
+                      <a:r>
+                        <a:rPr lang="en-US" sz="1400" dirty="0"/>
+                        <a:t>Website </a:t>
+                      </a:r>
+                      <a:r>
+                        <a:rPr lang="en-US" sz="1400" dirty="0" err="1"/>
+                        <a:t>läd</a:t>
+                      </a:r>
+                      <a:r>
+                        <a:rPr lang="en-US" sz="1400" dirty="0"/>
+                        <a:t> </a:t>
+                      </a:r>
+                      <a:r>
+                        <a:rPr lang="en-US" sz="1400" dirty="0" err="1"/>
+                        <a:t>dynamisch</a:t>
+                      </a:r>
+                      <a:r>
+                        <a:rPr lang="en-US" sz="1400" dirty="0"/>
+                        <a:t> auf basis der </a:t>
+                      </a:r>
+                      <a:r>
+                        <a:rPr lang="en-US" sz="1400" dirty="0" err="1"/>
+                        <a:t>Speisenanzahl</a:t>
+                      </a:r>
+                      <a:r>
+                        <a:rPr lang="en-US" sz="1400" dirty="0"/>
+                        <a:t>.</a:t>
+                      </a:r>
+                    </a:p>
+                  </a:txBody>
+                  <a:tcPr/>
+                </a:tc>
+                <a:extLst>
+                  <a:ext uri="{0D108BD9-81ED-4DB2-BD59-A6C34878D82A}">
+                    <a16:rowId xmlns:a16="http://schemas.microsoft.com/office/drawing/2014/main" val="3529812188"/>
+                  </a:ext>
+                </a:extLst>
+              </a:tr>
+              <a:tr h="628278">
+                <a:tc>
+                  <a:txBody>
+                    <a:bodyPr/>
+                    <a:lstStyle/>
+                    <a:p>
+                      <a:r>
+                        <a:rPr lang="en-US" sz="1400" dirty="0" err="1"/>
+                        <a:t>Datenbank</a:t>
+                      </a:r>
+                      <a:r>
+                        <a:rPr lang="en-US" sz="1400" dirty="0"/>
+                        <a:t> “Menu-Karte”</a:t>
+                      </a:r>
+                      <a:endParaRPr lang="de-DE" sz="1400" dirty="0"/>
+                    </a:p>
+                  </a:txBody>
+                  <a:tcPr/>
+                </a:tc>
+                <a:tc>
+                  <a:txBody>
+                    <a:bodyPr/>
+                    <a:lstStyle/>
+                    <a:p>
+                      <a:pPr marL="285750" indent="-285750">
+                        <a:buFont typeface="Arial" panose="020B0604020202020204" pitchFamily="34" charset="0"/>
+                        <a:buChar char="•"/>
+                      </a:pPr>
+                      <a:r>
+                        <a:rPr lang="en-US" sz="1400" dirty="0" err="1"/>
+                        <a:t>Entspricht</a:t>
+                      </a:r>
+                      <a:r>
+                        <a:rPr lang="en-US" sz="1400" dirty="0"/>
+                        <a:t> der 3. </a:t>
+                      </a:r>
+                      <a:r>
+                        <a:rPr lang="en-US" sz="1400" dirty="0" err="1"/>
+                        <a:t>Normalform</a:t>
+                      </a:r>
+                      <a:r>
+                        <a:rPr lang="en-US" sz="1400" dirty="0"/>
+                        <a:t>.</a:t>
+                      </a:r>
+                    </a:p>
+                    <a:p>
+                      <a:pPr marL="285750" indent="-285750">
+                        <a:buFont typeface="Arial" panose="020B0604020202020204" pitchFamily="34" charset="0"/>
+                        <a:buChar char="•"/>
+                      </a:pPr>
+                      <a:r>
+                        <a:rPr lang="en-US" sz="1400" dirty="0" err="1"/>
+                        <a:t>Beinhaltet</a:t>
+                      </a:r>
+                      <a:r>
+                        <a:rPr lang="en-US" sz="1400" dirty="0"/>
+                        <a:t> alle </a:t>
+                      </a:r>
+                      <a:r>
+                        <a:rPr lang="en-US" sz="1400" dirty="0" err="1"/>
+                        <a:t>notwendigen</a:t>
+                      </a:r>
+                      <a:r>
+                        <a:rPr lang="en-US" sz="1400" dirty="0"/>
+                        <a:t> Felder + </a:t>
+                      </a:r>
+                      <a:r>
+                        <a:rPr lang="en-US" sz="1400" dirty="0" err="1"/>
+                        <a:t>diese</a:t>
+                      </a:r>
+                      <a:r>
+                        <a:rPr lang="en-US" sz="1400" dirty="0"/>
+                        <a:t> </a:t>
+                      </a:r>
+                      <a:r>
+                        <a:rPr lang="en-US" sz="1400" dirty="0" err="1"/>
+                        <a:t>sind</a:t>
+                      </a:r>
+                      <a:r>
+                        <a:rPr lang="en-US" sz="1400" dirty="0"/>
+                        <a:t> </a:t>
+                      </a:r>
+                      <a:r>
+                        <a:rPr lang="en-US" sz="1400" dirty="0" err="1"/>
+                        <a:t>richtig</a:t>
+                      </a:r>
+                      <a:r>
+                        <a:rPr lang="en-US" sz="1400" dirty="0"/>
+                        <a:t> </a:t>
+                      </a:r>
+                      <a:r>
+                        <a:rPr lang="en-US" sz="1400" dirty="0" err="1"/>
+                        <a:t>konfiguriert</a:t>
+                      </a:r>
+                      <a:r>
+                        <a:rPr lang="en-US" sz="1400" dirty="0"/>
+                        <a:t>.</a:t>
+                      </a:r>
+                      <a:endParaRPr lang="de-DE" sz="1400" dirty="0"/>
+                    </a:p>
+                  </a:txBody>
+                  <a:tcPr/>
+                </a:tc>
+                <a:extLst>
+                  <a:ext uri="{0D108BD9-81ED-4DB2-BD59-A6C34878D82A}">
+                    <a16:rowId xmlns:a16="http://schemas.microsoft.com/office/drawing/2014/main" val="1310199598"/>
+                  </a:ext>
+                </a:extLst>
+              </a:tr>
+              <a:tr h="482529">
+                <a:tc>
+                  <a:txBody>
+                    <a:bodyPr/>
+                    <a:lstStyle/>
+                    <a:p>
+                      <a:r>
+                        <a:rPr lang="en-US" sz="1400" dirty="0" err="1"/>
+                        <a:t>Einführung</a:t>
+                      </a:r>
+                      <a:r>
+                        <a:rPr lang="en-US" sz="1400" dirty="0"/>
+                        <a:t> in </a:t>
+                      </a:r>
+                      <a:r>
+                        <a:rPr lang="en-US" sz="1400" dirty="0" err="1"/>
+                        <a:t>Blazor</a:t>
+                      </a:r>
+                      <a:r>
+                        <a:rPr lang="en-US" sz="1400" dirty="0"/>
+                        <a:t> und C# Coding</a:t>
+                      </a:r>
+                      <a:endParaRPr lang="de-DE" sz="1400" dirty="0"/>
+                    </a:p>
+                  </a:txBody>
+                  <a:tcPr/>
+                </a:tc>
+                <a:tc>
+                  <a:txBody>
+                    <a:bodyPr/>
+                    <a:lstStyle/>
+                    <a:p>
+                      <a:pPr marL="285750" indent="-285750">
+                        <a:buFont typeface="Arial" panose="020B0604020202020204" pitchFamily="34" charset="0"/>
+                        <a:buChar char="•"/>
+                      </a:pPr>
+                      <a:r>
+                        <a:rPr lang="en-US" sz="1400" dirty="0"/>
+                        <a:t>Alle Team-</a:t>
+                      </a:r>
+                      <a:r>
+                        <a:rPr lang="en-US" sz="1400" dirty="0" err="1"/>
+                        <a:t>Mitglieder</a:t>
+                      </a:r>
+                      <a:r>
+                        <a:rPr lang="en-US" sz="1400" dirty="0"/>
+                        <a:t> </a:t>
+                      </a:r>
+                      <a:r>
+                        <a:rPr lang="en-US" sz="1400" dirty="0" err="1"/>
+                        <a:t>können</a:t>
+                      </a:r>
+                      <a:r>
+                        <a:rPr lang="en-US" sz="1400" dirty="0"/>
+                        <a:t> </a:t>
+                      </a:r>
+                      <a:r>
+                        <a:rPr lang="en-US" sz="1400" dirty="0" err="1"/>
+                        <a:t>grundlegende</a:t>
+                      </a:r>
+                      <a:r>
+                        <a:rPr lang="en-US" sz="1400" dirty="0"/>
+                        <a:t> VS </a:t>
+                      </a:r>
+                      <a:r>
+                        <a:rPr lang="en-US" sz="1400" dirty="0" err="1"/>
+                        <a:t>benutzen</a:t>
+                      </a:r>
+                      <a:endParaRPr lang="en-US" sz="1400" dirty="0"/>
+                    </a:p>
+                    <a:p>
+                      <a:pPr marL="285750" indent="-285750">
+                        <a:buFont typeface="Arial" panose="020B0604020202020204" pitchFamily="34" charset="0"/>
+                        <a:buChar char="•"/>
+                      </a:pPr>
+                      <a:r>
+                        <a:rPr lang="en-US" sz="1400" dirty="0"/>
+                        <a:t>Alle Team-</a:t>
+                      </a:r>
+                      <a:r>
+                        <a:rPr lang="en-US" sz="1400" dirty="0" err="1"/>
+                        <a:t>Mitglieder</a:t>
+                      </a:r>
+                      <a:r>
+                        <a:rPr lang="en-US" sz="1400" dirty="0"/>
+                        <a:t> </a:t>
+                      </a:r>
+                      <a:r>
+                        <a:rPr lang="en-US" sz="1400" dirty="0" err="1"/>
+                        <a:t>sind</a:t>
+                      </a:r>
+                      <a:r>
+                        <a:rPr lang="en-US" sz="1400" dirty="0"/>
+                        <a:t> in der Lage </a:t>
+                      </a:r>
+                      <a:r>
+                        <a:rPr lang="en-US" sz="1400" dirty="0" err="1"/>
+                        <a:t>mit</a:t>
+                      </a:r>
+                      <a:r>
+                        <a:rPr lang="en-US" sz="1400" dirty="0"/>
+                        <a:t> </a:t>
+                      </a:r>
+                      <a:r>
+                        <a:rPr lang="en-US" sz="1400" dirty="0" err="1"/>
+                        <a:t>Bazor</a:t>
+                      </a:r>
+                      <a:r>
+                        <a:rPr lang="en-US" sz="1400" dirty="0"/>
+                        <a:t> die Website </a:t>
+                      </a:r>
+                      <a:r>
+                        <a:rPr lang="en-US" sz="1400" dirty="0" err="1"/>
+                        <a:t>zu</a:t>
+                      </a:r>
+                      <a:r>
+                        <a:rPr lang="en-US" sz="1400" dirty="0"/>
+                        <a:t> </a:t>
+                      </a:r>
+                      <a:r>
+                        <a:rPr lang="en-US" sz="1400" dirty="0" err="1"/>
+                        <a:t>entwickeln</a:t>
+                      </a:r>
+                      <a:endParaRPr lang="de-DE" sz="1400" dirty="0"/>
+                    </a:p>
+                  </a:txBody>
+                  <a:tcPr/>
+                </a:tc>
+                <a:extLst>
+                  <a:ext uri="{0D108BD9-81ED-4DB2-BD59-A6C34878D82A}">
+                    <a16:rowId xmlns:a16="http://schemas.microsoft.com/office/drawing/2014/main" val="1027042450"/>
+                  </a:ext>
+                </a:extLst>
+              </a:tr>
+              <a:tr h="488887">
+                <a:tc>
+                  <a:txBody>
+                    <a:bodyPr/>
+                    <a:lstStyle/>
+                    <a:p>
+                      <a:r>
+                        <a:rPr lang="en-US" sz="1400" dirty="0"/>
+                        <a:t>Website “</a:t>
+                      </a:r>
+                      <a:r>
+                        <a:rPr lang="en-US" sz="1400" dirty="0" err="1"/>
+                        <a:t>Warenkorb</a:t>
+                      </a:r>
+                      <a:r>
+                        <a:rPr lang="en-US" sz="1400" dirty="0"/>
+                        <a:t>”</a:t>
+                      </a:r>
+                      <a:endParaRPr lang="de-DE" sz="1400" dirty="0"/>
+                    </a:p>
+                  </a:txBody>
+                  <a:tcPr/>
+                </a:tc>
+                <a:tc>
+                  <a:txBody>
+                    <a:bodyPr/>
+                    <a:lstStyle/>
+                    <a:p>
+                      <a:pPr marL="285750" indent="-285750">
+                        <a:buFont typeface="Arial" panose="020B0604020202020204" pitchFamily="34" charset="0"/>
+                        <a:buChar char="•"/>
+                      </a:pPr>
+                      <a:r>
+                        <a:rPr lang="en-US" sz="1400" dirty="0"/>
+                        <a:t>Alle </a:t>
+                      </a:r>
+                      <a:r>
+                        <a:rPr lang="en-US" sz="1400" dirty="0" err="1"/>
+                        <a:t>selektierten</a:t>
+                      </a:r>
+                      <a:r>
+                        <a:rPr lang="en-US" sz="1400" dirty="0"/>
+                        <a:t> </a:t>
+                      </a:r>
+                      <a:r>
+                        <a:rPr lang="en-US" sz="1400" dirty="0" err="1"/>
+                        <a:t>Speisen</a:t>
+                      </a:r>
+                      <a:r>
+                        <a:rPr lang="en-US" sz="1400" dirty="0"/>
+                        <a:t> </a:t>
+                      </a:r>
+                      <a:r>
+                        <a:rPr lang="en-US" sz="1400" dirty="0" err="1"/>
+                        <a:t>werden</a:t>
+                      </a:r>
+                      <a:r>
+                        <a:rPr lang="en-US" sz="1400" dirty="0"/>
+                        <a:t> </a:t>
+                      </a:r>
+                      <a:r>
+                        <a:rPr lang="en-US" sz="1400" dirty="0" err="1"/>
+                        <a:t>angezeigt</a:t>
+                      </a:r>
+                      <a:r>
+                        <a:rPr lang="en-US" sz="1400" dirty="0"/>
+                        <a:t>.</a:t>
+                      </a:r>
+                    </a:p>
+                    <a:p>
+                      <a:pPr marL="285750" indent="-285750">
+                        <a:buFont typeface="Arial" panose="020B0604020202020204" pitchFamily="34" charset="0"/>
+                        <a:buChar char="•"/>
+                      </a:pPr>
+                      <a:r>
+                        <a:rPr lang="en-US" sz="1400" dirty="0" err="1"/>
+                        <a:t>Anzahl</a:t>
+                      </a:r>
+                      <a:r>
+                        <a:rPr lang="en-US" sz="1400" dirty="0"/>
+                        <a:t> </a:t>
+                      </a:r>
+                      <a:r>
+                        <a:rPr lang="en-US" sz="1400" dirty="0" err="1"/>
+                        <a:t>kann</a:t>
+                      </a:r>
+                      <a:r>
+                        <a:rPr lang="en-US" sz="1400" dirty="0"/>
+                        <a:t> </a:t>
+                      </a:r>
+                      <a:r>
+                        <a:rPr lang="en-US" sz="1400" dirty="0" err="1"/>
+                        <a:t>verändert</a:t>
+                      </a:r>
+                      <a:r>
+                        <a:rPr lang="en-US" sz="1400" dirty="0"/>
+                        <a:t> </a:t>
+                      </a:r>
+                      <a:r>
+                        <a:rPr lang="en-US" sz="1400" dirty="0" err="1"/>
+                        <a:t>werden</a:t>
+                      </a:r>
+                      <a:r>
+                        <a:rPr lang="en-US" sz="1400" dirty="0"/>
+                        <a:t>.</a:t>
+                      </a:r>
+                    </a:p>
+                    <a:p>
+                      <a:pPr marL="285750" indent="-285750">
+                        <a:buFont typeface="Arial" panose="020B0604020202020204" pitchFamily="34" charset="0"/>
+                        <a:buChar char="•"/>
+                      </a:pPr>
+                      <a:r>
+                        <a:rPr lang="en-US" sz="1400" dirty="0" err="1"/>
+                        <a:t>Speisen</a:t>
+                      </a:r>
+                      <a:r>
+                        <a:rPr lang="en-US" sz="1400" dirty="0"/>
+                        <a:t> </a:t>
+                      </a:r>
+                      <a:r>
+                        <a:rPr lang="en-US" sz="1400" dirty="0" err="1"/>
+                        <a:t>können</a:t>
+                      </a:r>
+                      <a:r>
+                        <a:rPr lang="en-US" sz="1400" dirty="0"/>
+                        <a:t> </a:t>
+                      </a:r>
+                      <a:r>
+                        <a:rPr lang="en-US" sz="1400" dirty="0" err="1"/>
+                        <a:t>wieder</a:t>
+                      </a:r>
+                      <a:r>
+                        <a:rPr lang="en-US" sz="1400" dirty="0"/>
+                        <a:t> </a:t>
+                      </a:r>
+                      <a:r>
+                        <a:rPr lang="en-US" sz="1400" dirty="0" err="1"/>
+                        <a:t>entfernt</a:t>
+                      </a:r>
+                      <a:r>
+                        <a:rPr lang="en-US" sz="1400" dirty="0"/>
+                        <a:t> </a:t>
+                      </a:r>
+                      <a:r>
+                        <a:rPr lang="en-US" sz="1400" dirty="0" err="1"/>
+                        <a:t>werden</a:t>
+                      </a:r>
+                      <a:r>
+                        <a:rPr lang="en-US" sz="1400" dirty="0"/>
+                        <a:t>.</a:t>
+                      </a:r>
+                      <a:endParaRPr lang="de-DE" sz="1400" dirty="0"/>
+                    </a:p>
+                  </a:txBody>
+                  <a:tcPr/>
+                </a:tc>
+                <a:extLst>
+                  <a:ext uri="{0D108BD9-81ED-4DB2-BD59-A6C34878D82A}">
+                    <a16:rowId xmlns:a16="http://schemas.microsoft.com/office/drawing/2014/main" val="3357681546"/>
+                  </a:ext>
+                </a:extLst>
+              </a:tr>
+              <a:tr h="450561">
+                <a:tc>
+                  <a:txBody>
+                    <a:bodyPr/>
+                    <a:lstStyle/>
+                    <a:p>
+                      <a:r>
+                        <a:rPr lang="en-US" sz="1400" dirty="0" err="1"/>
+                        <a:t>Datenbank</a:t>
+                      </a:r>
+                      <a:r>
+                        <a:rPr lang="en-US" sz="1400" dirty="0"/>
+                        <a:t> “</a:t>
+                      </a:r>
+                      <a:r>
+                        <a:rPr lang="en-US" sz="1400" dirty="0" err="1"/>
+                        <a:t>Warenkorb</a:t>
+                      </a:r>
+                      <a:r>
+                        <a:rPr lang="en-US" sz="1400" dirty="0"/>
+                        <a:t>”</a:t>
+                      </a:r>
+                      <a:endParaRPr lang="de-DE" sz="1400" dirty="0"/>
+                    </a:p>
+                  </a:txBody>
+                  <a:tcPr/>
+                </a:tc>
+                <a:tc>
+                  <a:txBody>
+                    <a:bodyPr/>
+                    <a:lstStyle/>
+                    <a:p>
+                      <a:pPr marL="285750" indent="-285750">
+                        <a:buFont typeface="Arial" panose="020B0604020202020204" pitchFamily="34" charset="0"/>
+                        <a:buChar char="•"/>
+                      </a:pPr>
+                      <a:r>
+                        <a:rPr lang="en-US" sz="1400" dirty="0" err="1"/>
+                        <a:t>Entspricht</a:t>
+                      </a:r>
+                      <a:r>
+                        <a:rPr lang="en-US" sz="1400" dirty="0"/>
+                        <a:t> der 3. </a:t>
+                      </a:r>
+                      <a:r>
+                        <a:rPr lang="en-US" sz="1400" dirty="0" err="1"/>
+                        <a:t>Normalform</a:t>
+                      </a:r>
+                      <a:r>
+                        <a:rPr lang="en-US" sz="1400" dirty="0"/>
+                        <a:t>.</a:t>
+                      </a:r>
+                    </a:p>
+                    <a:p>
+                      <a:pPr marL="285750" indent="-285750">
+                        <a:buFont typeface="Arial" panose="020B0604020202020204" pitchFamily="34" charset="0"/>
+                        <a:buChar char="•"/>
+                      </a:pPr>
+                      <a:r>
+                        <a:rPr lang="en-US" sz="1400" dirty="0" err="1"/>
+                        <a:t>Beinhaltet</a:t>
+                      </a:r>
+                      <a:r>
+                        <a:rPr lang="en-US" sz="1400" dirty="0"/>
+                        <a:t> alle </a:t>
+                      </a:r>
+                      <a:r>
+                        <a:rPr lang="en-US" sz="1400" dirty="0" err="1"/>
+                        <a:t>notwendigen</a:t>
+                      </a:r>
+                      <a:r>
+                        <a:rPr lang="en-US" sz="1400" dirty="0"/>
+                        <a:t> Felder + </a:t>
+                      </a:r>
+                      <a:r>
+                        <a:rPr lang="en-US" sz="1400" dirty="0" err="1"/>
+                        <a:t>diese</a:t>
+                      </a:r>
+                      <a:r>
+                        <a:rPr lang="en-US" sz="1400" dirty="0"/>
+                        <a:t> </a:t>
+                      </a:r>
+                      <a:r>
+                        <a:rPr lang="en-US" sz="1400" dirty="0" err="1"/>
+                        <a:t>sind</a:t>
+                      </a:r>
+                      <a:r>
+                        <a:rPr lang="en-US" sz="1400" dirty="0"/>
+                        <a:t> </a:t>
+                      </a:r>
+                      <a:r>
+                        <a:rPr lang="en-US" sz="1400" dirty="0" err="1"/>
+                        <a:t>richtig</a:t>
+                      </a:r>
+                      <a:r>
+                        <a:rPr lang="en-US" sz="1400" dirty="0"/>
+                        <a:t> </a:t>
+                      </a:r>
+                      <a:r>
+                        <a:rPr lang="en-US" sz="1400" dirty="0" err="1"/>
+                        <a:t>konfiguriert</a:t>
+                      </a:r>
+                      <a:r>
+                        <a:rPr lang="en-US" sz="1400" dirty="0"/>
+                        <a:t>.</a:t>
+                      </a:r>
+                      <a:endParaRPr lang="de-DE" sz="1400" dirty="0"/>
+                    </a:p>
+                  </a:txBody>
+                  <a:tcPr/>
+                </a:tc>
+                <a:extLst>
+                  <a:ext uri="{0D108BD9-81ED-4DB2-BD59-A6C34878D82A}">
+                    <a16:rowId xmlns:a16="http://schemas.microsoft.com/office/drawing/2014/main" val="4006408752"/>
+                  </a:ext>
+                </a:extLst>
+              </a:tr>
+            </a:tbl>
+          </a:graphicData>
+        </a:graphic>
+      </p:graphicFrame>
+      <p:sp>
+        <p:nvSpPr>
+          <p:cNvPr id="6" name="Textfeld 5">
+            <a:extLst>
+              <a:ext uri="{FF2B5EF4-FFF2-40B4-BE49-F238E27FC236}">
+                <a16:creationId xmlns:a16="http://schemas.microsoft.com/office/drawing/2014/main" id="{98BCABE6-CA74-3ACD-9CB3-5C8F6D1D34AE}"/>
+              </a:ext>
+            </a:extLst>
+          </p:cNvPr>
+          <p:cNvSpPr txBox="1"/>
+          <p:nvPr/>
+        </p:nvSpPr>
+        <p:spPr>
+          <a:xfrm>
+            <a:off x="911225" y="2067261"/>
+            <a:ext cx="5899150" cy="369332"/>
+          </a:xfrm>
+          <a:prstGeom prst="rect">
+            <a:avLst/>
+          </a:prstGeom>
+          <a:noFill/>
+        </p:spPr>
+        <p:txBody>
+          <a:bodyPr wrap="square" rtlCol="0">
+            <a:spAutoFit/>
+          </a:bodyPr>
+          <a:lstStyle/>
+          <a:p>
+            <a:r>
+              <a:rPr lang="en-US" b="1" dirty="0" err="1"/>
+              <a:t>Abnahmekriterien</a:t>
+            </a:r>
+            <a:endParaRPr lang="de-DE" b="1" dirty="0"/>
+          </a:p>
+        </p:txBody>
+      </p:sp>
+    </p:spTree>
+    <p:extLst>
+      <p:ext uri="{BB962C8B-B14F-4D97-AF65-F5344CB8AC3E}">
+        <p14:creationId xmlns:p14="http://schemas.microsoft.com/office/powerpoint/2010/main" val="1110673821"/>
+      </p:ext>
+    </p:extLst>
+  </p:cSld>
+  <p:clrMapOvr>
+    <a:masterClrMapping/>
+  </p:clrMapOvr>
+</p:sld>
+</file>
+
+<file path=ppt/slides/slide13.xml><?xml version="1.0" encoding="utf-8"?>
+<p:sld xmlns:a="http://schemas.openxmlformats.org/drawingml/2006/main" xmlns:r="http://schemas.openxmlformats.org/officeDocument/2006/relationships" xmlns:p="http://schemas.openxmlformats.org/presentationml/2006/main">
+  <p:cSld>
+    <p:spTree>
+      <p:nvGrpSpPr>
+        <p:cNvPr id="1" name="">
+          <a:extLst>
+            <a:ext uri="{FF2B5EF4-FFF2-40B4-BE49-F238E27FC236}">
+              <a16:creationId xmlns:a16="http://schemas.microsoft.com/office/drawing/2014/main" id="{221AA48E-2A24-EE87-5DFA-47A1FBCDFE8F}"/>
+            </a:ext>
+          </a:extLst>
+        </p:cNvPr>
+        <p:cNvGrpSpPr/>
+        <p:nvPr/>
+      </p:nvGrpSpPr>
+      <p:grpSpPr>
+        <a:xfrm>
+          <a:off x="0" y="0"/>
+          <a:ext cx="0" cy="0"/>
+          <a:chOff x="0" y="0"/>
+          <a:chExt cx="0" cy="0"/>
+        </a:xfrm>
+      </p:grpSpPr>
+      <p:sp>
+        <p:nvSpPr>
+          <p:cNvPr id="2" name="Titel 1">
+            <a:extLst>
+              <a:ext uri="{FF2B5EF4-FFF2-40B4-BE49-F238E27FC236}">
+                <a16:creationId xmlns:a16="http://schemas.microsoft.com/office/drawing/2014/main" id="{78BC473A-B699-478D-8F2A-85E701CD1E84}"/>
+              </a:ext>
+            </a:extLst>
+          </p:cNvPr>
+          <p:cNvSpPr>
+            <a:spLocks noGrp="1"/>
+          </p:cNvSpPr>
+          <p:nvPr>
+            <p:ph type="title"/>
+          </p:nvPr>
+        </p:nvSpPr>
+        <p:spPr/>
+        <p:txBody>
+          <a:bodyPr/>
+          <a:lstStyle/>
+          <a:p>
+            <a:r>
+              <a:rPr lang="de-DE" dirty="0"/>
+              <a:t>4. Detailplanung</a:t>
+            </a:r>
+          </a:p>
+        </p:txBody>
+      </p:sp>
+      <p:sp>
+        <p:nvSpPr>
+          <p:cNvPr id="4" name="Datumsplatzhalter 3">
+            <a:extLst>
+              <a:ext uri="{FF2B5EF4-FFF2-40B4-BE49-F238E27FC236}">
+                <a16:creationId xmlns:a16="http://schemas.microsoft.com/office/drawing/2014/main" id="{56E791A0-760F-F86C-27C4-D8D547D2144A}"/>
+              </a:ext>
+            </a:extLst>
+          </p:cNvPr>
+          <p:cNvSpPr>
+            <a:spLocks noGrp="1"/>
+          </p:cNvSpPr>
+          <p:nvPr>
+            <p:ph type="dt" sz="half" idx="10"/>
+          </p:nvPr>
+        </p:nvSpPr>
+        <p:spPr/>
+        <p:txBody>
+          <a:bodyPr/>
+          <a:lstStyle/>
+          <a:p>
+            <a:fld id="{42B45B56-1D88-4042-8DF0-EB6B41B710D3}" type="datetime1">
+              <a:rPr lang="de-DE" smtClean="0"/>
+              <a:t>23.11.2024</a:t>
+            </a:fld>
+            <a:endParaRPr lang="en-US"/>
+          </a:p>
+        </p:txBody>
+      </p:sp>
+      <p:sp>
+        <p:nvSpPr>
+          <p:cNvPr id="5" name="Foliennummernplatzhalter 4">
+            <a:extLst>
+              <a:ext uri="{FF2B5EF4-FFF2-40B4-BE49-F238E27FC236}">
+                <a16:creationId xmlns:a16="http://schemas.microsoft.com/office/drawing/2014/main" id="{887F0A8D-82B8-1B82-BBB2-211902C89BBB}"/>
+              </a:ext>
+            </a:extLst>
+          </p:cNvPr>
+          <p:cNvSpPr>
+            <a:spLocks noGrp="1"/>
+          </p:cNvSpPr>
+          <p:nvPr>
+            <p:ph type="sldNum" sz="quarter" idx="12"/>
+          </p:nvPr>
+        </p:nvSpPr>
+        <p:spPr/>
+        <p:txBody>
+          <a:bodyPr/>
+          <a:lstStyle/>
+          <a:p>
+            <a:fld id="{07CE569E-9B7C-4CB9-AB80-C0841F922CFF}" type="slidenum">
+              <a:rPr lang="en-US" smtClean="0"/>
+              <a:t>13</a:t>
+            </a:fld>
+            <a:endParaRPr lang="en-US"/>
+          </a:p>
+        </p:txBody>
+      </p:sp>
+      <p:sp>
+        <p:nvSpPr>
+          <p:cNvPr id="6" name="Textfeld 5">
+            <a:extLst>
+              <a:ext uri="{FF2B5EF4-FFF2-40B4-BE49-F238E27FC236}">
+                <a16:creationId xmlns:a16="http://schemas.microsoft.com/office/drawing/2014/main" id="{B7469EB5-3D56-C92C-FAC3-44FC9C1A8830}"/>
+              </a:ext>
+            </a:extLst>
+          </p:cNvPr>
+          <p:cNvSpPr txBox="1"/>
+          <p:nvPr/>
+        </p:nvSpPr>
+        <p:spPr>
+          <a:xfrm>
+            <a:off x="911225" y="2067261"/>
+            <a:ext cx="5899150" cy="369332"/>
+          </a:xfrm>
+          <a:prstGeom prst="rect">
+            <a:avLst/>
+          </a:prstGeom>
+          <a:noFill/>
+        </p:spPr>
+        <p:txBody>
+          <a:bodyPr wrap="square" rtlCol="0">
+            <a:spAutoFit/>
+          </a:bodyPr>
+          <a:lstStyle/>
+          <a:p>
+            <a:r>
+              <a:rPr lang="en-US" b="1" dirty="0" err="1"/>
+              <a:t>Risiken</a:t>
+            </a:r>
+            <a:r>
+              <a:rPr lang="en-US" b="1" dirty="0"/>
+              <a:t> und </a:t>
+            </a:r>
+            <a:r>
+              <a:rPr lang="en-US" b="1" dirty="0" err="1"/>
+              <a:t>Abhängigkeiten</a:t>
+            </a:r>
+            <a:r>
+              <a:rPr lang="en-US" b="1" dirty="0"/>
+              <a:t>:</a:t>
+            </a:r>
+            <a:endParaRPr lang="de-DE" b="1" dirty="0"/>
+          </a:p>
+        </p:txBody>
+      </p:sp>
+      <p:graphicFrame>
+        <p:nvGraphicFramePr>
+          <p:cNvPr id="7" name="Tabelle 6">
+            <a:extLst>
+              <a:ext uri="{FF2B5EF4-FFF2-40B4-BE49-F238E27FC236}">
+                <a16:creationId xmlns:a16="http://schemas.microsoft.com/office/drawing/2014/main" id="{72EA57CB-F693-AFE9-BC66-EDE0FCB651CF}"/>
+              </a:ext>
+            </a:extLst>
+          </p:cNvPr>
+          <p:cNvGraphicFramePr>
+            <a:graphicFrameLocks noGrp="1"/>
+          </p:cNvGraphicFramePr>
+          <p:nvPr>
+            <p:extLst>
+              <p:ext uri="{D42A27DB-BD31-4B8C-83A1-F6EECF244321}">
+                <p14:modId xmlns:p14="http://schemas.microsoft.com/office/powerpoint/2010/main" val="2148125067"/>
+              </p:ext>
+            </p:extLst>
+          </p:nvPr>
+        </p:nvGraphicFramePr>
+        <p:xfrm>
+          <a:off x="911225" y="2505710"/>
+          <a:ext cx="9239538" cy="2936240"/>
+        </p:xfrm>
+        <a:graphic>
+          <a:graphicData uri="http://schemas.openxmlformats.org/drawingml/2006/table">
+            <a:tbl>
+              <a:tblPr firstRow="1" bandRow="1">
+                <a:tableStyleId>{5C22544A-7EE6-4342-B048-85BDC9FD1C3A}</a:tableStyleId>
+              </a:tblPr>
+              <a:tblGrid>
+                <a:gridCol w="2995757">
+                  <a:extLst>
+                    <a:ext uri="{9D8B030D-6E8A-4147-A177-3AD203B41FA5}">
+                      <a16:colId xmlns:a16="http://schemas.microsoft.com/office/drawing/2014/main" val="2800661665"/>
+                    </a:ext>
+                  </a:extLst>
+                </a:gridCol>
+                <a:gridCol w="2955636">
+                  <a:extLst>
+                    <a:ext uri="{9D8B030D-6E8A-4147-A177-3AD203B41FA5}">
+                      <a16:colId xmlns:a16="http://schemas.microsoft.com/office/drawing/2014/main" val="1572888870"/>
+                    </a:ext>
+                  </a:extLst>
+                </a:gridCol>
+                <a:gridCol w="3288145">
+                  <a:extLst>
+                    <a:ext uri="{9D8B030D-6E8A-4147-A177-3AD203B41FA5}">
+                      <a16:colId xmlns:a16="http://schemas.microsoft.com/office/drawing/2014/main" val="2692839791"/>
+                    </a:ext>
+                  </a:extLst>
+                </a:gridCol>
+              </a:tblGrid>
+              <a:tr h="370840">
+                <a:tc>
+                  <a:txBody>
+                    <a:bodyPr/>
+                    <a:lstStyle/>
+                    <a:p>
+                      <a:r>
+                        <a:rPr lang="en-US" dirty="0" err="1"/>
+                        <a:t>Risiko</a:t>
+                      </a:r>
+                      <a:endParaRPr lang="de-DE" dirty="0"/>
+                    </a:p>
+                  </a:txBody>
+                  <a:tcPr/>
+                </a:tc>
+                <a:tc>
+                  <a:txBody>
+                    <a:bodyPr/>
+                    <a:lstStyle/>
+                    <a:p>
+                      <a:r>
+                        <a:rPr lang="en-US" dirty="0" err="1"/>
+                        <a:t>Auswirkung</a:t>
+                      </a:r>
+                      <a:endParaRPr lang="de-DE" dirty="0"/>
+                    </a:p>
+                  </a:txBody>
+                  <a:tcPr/>
+                </a:tc>
+                <a:tc>
+                  <a:txBody>
+                    <a:bodyPr/>
+                    <a:lstStyle/>
+                    <a:p>
+                      <a:r>
+                        <a:rPr lang="en-US" dirty="0" err="1"/>
+                        <a:t>Lösung</a:t>
+                      </a:r>
+                      <a:endParaRPr lang="de-DE" dirty="0"/>
+                    </a:p>
+                  </a:txBody>
+                  <a:tcPr/>
+                </a:tc>
+                <a:extLst>
+                  <a:ext uri="{0D108BD9-81ED-4DB2-BD59-A6C34878D82A}">
+                    <a16:rowId xmlns:a16="http://schemas.microsoft.com/office/drawing/2014/main" val="531979671"/>
+                  </a:ext>
+                </a:extLst>
+              </a:tr>
+              <a:tr h="370840">
+                <a:tc>
+                  <a:txBody>
+                    <a:bodyPr/>
+                    <a:lstStyle/>
+                    <a:p>
+                      <a:r>
+                        <a:rPr lang="en-US" dirty="0" err="1"/>
+                        <a:t>Unerfahrenheit</a:t>
+                      </a:r>
+                      <a:r>
+                        <a:rPr lang="en-US" dirty="0"/>
+                        <a:t> </a:t>
+                      </a:r>
+                      <a:r>
+                        <a:rPr lang="en-US" dirty="0" err="1"/>
+                        <a:t>mit</a:t>
+                      </a:r>
+                      <a:r>
+                        <a:rPr lang="en-US" dirty="0"/>
+                        <a:t> Tools</a:t>
+                      </a:r>
+                      <a:endParaRPr lang="de-DE" dirty="0"/>
+                    </a:p>
+                  </a:txBody>
+                  <a:tcPr/>
+                </a:tc>
+                <a:tc>
+                  <a:txBody>
+                    <a:bodyPr/>
+                    <a:lstStyle/>
+                    <a:p>
+                      <a:r>
+                        <a:rPr lang="en-US" dirty="0" err="1"/>
+                        <a:t>Erhöhter</a:t>
+                      </a:r>
+                      <a:r>
+                        <a:rPr lang="en-US" dirty="0"/>
+                        <a:t> </a:t>
+                      </a:r>
+                      <a:r>
+                        <a:rPr lang="en-US" dirty="0" err="1"/>
+                        <a:t>Schulungsaufwand</a:t>
+                      </a:r>
+                      <a:endParaRPr lang="de-DE" dirty="0"/>
+                    </a:p>
+                  </a:txBody>
+                  <a:tcPr/>
+                </a:tc>
+                <a:tc>
+                  <a:txBody>
+                    <a:bodyPr/>
+                    <a:lstStyle/>
+                    <a:p>
+                      <a:r>
+                        <a:rPr lang="en-US" dirty="0" err="1"/>
+                        <a:t>Schulung</a:t>
+                      </a:r>
+                      <a:r>
+                        <a:rPr lang="en-US" dirty="0"/>
+                        <a:t> </a:t>
+                      </a:r>
+                      <a:r>
+                        <a:rPr lang="en-US" dirty="0" err="1"/>
+                        <a:t>frühzeitig</a:t>
+                      </a:r>
+                      <a:r>
+                        <a:rPr lang="en-US" dirty="0"/>
+                        <a:t> </a:t>
+                      </a:r>
+                      <a:r>
+                        <a:rPr lang="en-US" dirty="0" err="1"/>
+                        <a:t>ansetzen</a:t>
+                      </a:r>
+                      <a:endParaRPr lang="de-DE" dirty="0"/>
+                    </a:p>
+                  </a:txBody>
+                  <a:tcPr/>
+                </a:tc>
+                <a:extLst>
+                  <a:ext uri="{0D108BD9-81ED-4DB2-BD59-A6C34878D82A}">
+                    <a16:rowId xmlns:a16="http://schemas.microsoft.com/office/drawing/2014/main" val="2460179213"/>
+                  </a:ext>
+                </a:extLst>
+              </a:tr>
+              <a:tr h="370840">
+                <a:tc>
+                  <a:txBody>
+                    <a:bodyPr/>
+                    <a:lstStyle/>
+                    <a:p>
+                      <a:r>
+                        <a:rPr lang="en-US" dirty="0" err="1"/>
+                        <a:t>Verbindung</a:t>
+                      </a:r>
+                      <a:r>
+                        <a:rPr lang="en-US" dirty="0"/>
+                        <a:t> der DB </a:t>
+                      </a:r>
+                      <a:r>
+                        <a:rPr lang="en-US" dirty="0" err="1"/>
+                        <a:t>zu</a:t>
+                      </a:r>
+                      <a:r>
+                        <a:rPr lang="en-US" dirty="0"/>
+                        <a:t> Frontend </a:t>
+                      </a:r>
+                      <a:r>
+                        <a:rPr lang="en-US" dirty="0" err="1"/>
+                        <a:t>komplexer</a:t>
+                      </a:r>
+                      <a:r>
+                        <a:rPr lang="en-US" dirty="0"/>
+                        <a:t> </a:t>
+                      </a:r>
+                      <a:r>
+                        <a:rPr lang="en-US" dirty="0" err="1"/>
+                        <a:t>als</a:t>
+                      </a:r>
+                      <a:r>
+                        <a:rPr lang="en-US" dirty="0"/>
+                        <a:t> </a:t>
+                      </a:r>
+                      <a:r>
+                        <a:rPr lang="en-US" dirty="0" err="1"/>
+                        <a:t>erwartet</a:t>
+                      </a:r>
+                      <a:endParaRPr lang="de-DE" dirty="0"/>
+                    </a:p>
+                  </a:txBody>
+                  <a:tcPr/>
+                </a:tc>
+                <a:tc>
+                  <a:txBody>
+                    <a:bodyPr/>
+                    <a:lstStyle/>
+                    <a:p>
+                      <a:r>
+                        <a:rPr lang="en-US" dirty="0"/>
+                        <a:t>Backend </a:t>
+                      </a:r>
+                      <a:r>
+                        <a:rPr lang="en-US" dirty="0" err="1"/>
+                        <a:t>kann</a:t>
+                      </a:r>
+                      <a:r>
+                        <a:rPr lang="en-US" dirty="0"/>
+                        <a:t> erst </a:t>
+                      </a:r>
+                      <a:r>
+                        <a:rPr lang="en-US" dirty="0" err="1"/>
+                        <a:t>später</a:t>
+                      </a:r>
+                      <a:r>
+                        <a:rPr lang="en-US" dirty="0"/>
+                        <a:t> </a:t>
+                      </a:r>
+                      <a:r>
+                        <a:rPr lang="en-US" dirty="0" err="1"/>
+                        <a:t>angebunden</a:t>
+                      </a:r>
+                      <a:r>
+                        <a:rPr lang="en-US" dirty="0"/>
+                        <a:t> </a:t>
+                      </a:r>
+                      <a:r>
+                        <a:rPr lang="en-US" dirty="0" err="1"/>
+                        <a:t>werden</a:t>
+                      </a:r>
+                      <a:endParaRPr lang="de-DE" dirty="0"/>
+                    </a:p>
+                  </a:txBody>
+                  <a:tcPr/>
+                </a:tc>
+                <a:tc>
+                  <a:txBody>
+                    <a:bodyPr/>
+                    <a:lstStyle/>
+                    <a:p>
+                      <a:pPr marL="285750" indent="-285750">
+                        <a:buFont typeface="Arial" panose="020B0604020202020204" pitchFamily="34" charset="0"/>
+                        <a:buChar char="•"/>
+                      </a:pPr>
+                      <a:r>
+                        <a:rPr lang="en-US" dirty="0" err="1"/>
+                        <a:t>Prototypen</a:t>
+                      </a:r>
+                      <a:r>
+                        <a:rPr lang="en-US" dirty="0"/>
+                        <a:t> </a:t>
+                      </a:r>
+                      <a:r>
+                        <a:rPr lang="en-US" dirty="0" err="1"/>
+                        <a:t>notwendig</a:t>
+                      </a:r>
+                      <a:endParaRPr lang="en-US" dirty="0"/>
+                    </a:p>
+                    <a:p>
+                      <a:pPr marL="285750" indent="-285750">
+                        <a:buFont typeface="Arial" panose="020B0604020202020204" pitchFamily="34" charset="0"/>
+                        <a:buChar char="•"/>
+                      </a:pPr>
+                      <a:r>
+                        <a:rPr lang="en-US" dirty="0"/>
+                        <a:t>Mit Demo-</a:t>
+                      </a:r>
+                      <a:r>
+                        <a:rPr lang="en-US" dirty="0" err="1"/>
+                        <a:t>Daten</a:t>
+                      </a:r>
+                      <a:r>
+                        <a:rPr lang="en-US" dirty="0"/>
+                        <a:t> (xml) </a:t>
+                      </a:r>
+                      <a:r>
+                        <a:rPr lang="en-US" dirty="0" err="1"/>
+                        <a:t>arbeiten</a:t>
+                      </a:r>
+                      <a:endParaRPr lang="en-US" dirty="0"/>
+                    </a:p>
+                  </a:txBody>
+                  <a:tcPr/>
+                </a:tc>
+                <a:extLst>
+                  <a:ext uri="{0D108BD9-81ED-4DB2-BD59-A6C34878D82A}">
+                    <a16:rowId xmlns:a16="http://schemas.microsoft.com/office/drawing/2014/main" val="1311972194"/>
+                  </a:ext>
+                </a:extLst>
+              </a:tr>
+              <a:tr h="370840">
+                <a:tc>
+                  <a:txBody>
+                    <a:bodyPr/>
+                    <a:lstStyle/>
+                    <a:p>
+                      <a:r>
+                        <a:rPr lang="en-US" dirty="0" err="1"/>
+                        <a:t>Fehlendes</a:t>
+                      </a:r>
+                      <a:r>
+                        <a:rPr lang="en-US" dirty="0"/>
+                        <a:t> </a:t>
+                      </a:r>
+                      <a:r>
+                        <a:rPr lang="en-US" dirty="0" err="1"/>
+                        <a:t>Nutzerfeedback</a:t>
+                      </a:r>
+                      <a:endParaRPr lang="de-DE" dirty="0"/>
+                    </a:p>
+                  </a:txBody>
+                  <a:tcPr/>
+                </a:tc>
+                <a:tc>
+                  <a:txBody>
+                    <a:bodyPr/>
+                    <a:lstStyle/>
+                    <a:p>
+                      <a:r>
+                        <a:rPr lang="en-US" dirty="0" err="1"/>
+                        <a:t>Scheuklappen-Effekt</a:t>
+                      </a:r>
+                      <a:endParaRPr lang="de-DE" dirty="0"/>
+                    </a:p>
+                  </a:txBody>
+                  <a:tcPr/>
+                </a:tc>
+                <a:tc>
+                  <a:txBody>
+                    <a:bodyPr/>
+                    <a:lstStyle/>
+                    <a:p>
+                      <a:r>
+                        <a:rPr lang="en-US" dirty="0"/>
+                        <a:t>Externes Feedback </a:t>
+                      </a:r>
+                      <a:r>
+                        <a:rPr lang="en-US" dirty="0" err="1"/>
+                        <a:t>holen</a:t>
+                      </a:r>
+                      <a:endParaRPr lang="de-DE" dirty="0"/>
+                    </a:p>
+                  </a:txBody>
+                  <a:tcPr/>
+                </a:tc>
+                <a:extLst>
+                  <a:ext uri="{0D108BD9-81ED-4DB2-BD59-A6C34878D82A}">
+                    <a16:rowId xmlns:a16="http://schemas.microsoft.com/office/drawing/2014/main" val="4260193921"/>
+                  </a:ext>
+                </a:extLst>
+              </a:tr>
+              <a:tr h="370840">
+                <a:tc>
+                  <a:txBody>
+                    <a:bodyPr/>
+                    <a:lstStyle/>
+                    <a:p>
+                      <a:r>
+                        <a:rPr lang="en-US" dirty="0" err="1"/>
+                        <a:t>Änderungen</a:t>
+                      </a:r>
+                      <a:r>
+                        <a:rPr lang="en-US" dirty="0"/>
+                        <a:t> an </a:t>
+                      </a:r>
+                      <a:r>
+                        <a:rPr lang="en-US" dirty="0" err="1"/>
+                        <a:t>Anforderungen</a:t>
+                      </a:r>
+                      <a:endParaRPr lang="de-DE" dirty="0"/>
+                    </a:p>
+                  </a:txBody>
+                  <a:tcPr/>
+                </a:tc>
+                <a:tc>
+                  <a:txBody>
+                    <a:bodyPr/>
+                    <a:lstStyle/>
+                    <a:p>
+                      <a:r>
+                        <a:rPr lang="en-US" dirty="0" err="1"/>
+                        <a:t>Anpassung</a:t>
+                      </a:r>
+                      <a:r>
+                        <a:rPr lang="en-US" dirty="0"/>
+                        <a:t> des </a:t>
+                      </a:r>
+                      <a:r>
+                        <a:rPr lang="en-US" dirty="0" err="1"/>
+                        <a:t>Projektablaufs</a:t>
+                      </a:r>
+                      <a:endParaRPr lang="de-DE" dirty="0"/>
+                    </a:p>
+                  </a:txBody>
+                  <a:tcPr/>
+                </a:tc>
+                <a:tc>
+                  <a:txBody>
+                    <a:bodyPr/>
+                    <a:lstStyle/>
+                    <a:p>
+                      <a:r>
+                        <a:rPr lang="en-US" dirty="0" err="1"/>
+                        <a:t>Regelmäßige</a:t>
+                      </a:r>
+                      <a:r>
+                        <a:rPr lang="en-US" dirty="0"/>
+                        <a:t> </a:t>
+                      </a:r>
+                      <a:r>
+                        <a:rPr lang="en-US" dirty="0" err="1"/>
+                        <a:t>Absprache</a:t>
+                      </a:r>
+                      <a:r>
+                        <a:rPr lang="en-US" dirty="0"/>
+                        <a:t> </a:t>
+                      </a:r>
+                      <a:r>
+                        <a:rPr lang="en-US" dirty="0" err="1"/>
+                        <a:t>mit</a:t>
+                      </a:r>
+                      <a:r>
+                        <a:rPr lang="en-US" dirty="0"/>
+                        <a:t> </a:t>
+                      </a:r>
+                      <a:r>
+                        <a:rPr lang="en-US" dirty="0" err="1"/>
+                        <a:t>Stakeholdern</a:t>
+                      </a:r>
+                      <a:endParaRPr lang="de-DE" dirty="0"/>
+                    </a:p>
+                  </a:txBody>
+                  <a:tcPr/>
+                </a:tc>
+                <a:extLst>
+                  <a:ext uri="{0D108BD9-81ED-4DB2-BD59-A6C34878D82A}">
+                    <a16:rowId xmlns:a16="http://schemas.microsoft.com/office/drawing/2014/main" val="1603356896"/>
+                  </a:ext>
+                </a:extLst>
+              </a:tr>
+            </a:tbl>
+          </a:graphicData>
+        </a:graphic>
+      </p:graphicFrame>
+    </p:spTree>
+    <p:extLst>
+      <p:ext uri="{BB962C8B-B14F-4D97-AF65-F5344CB8AC3E}">
+        <p14:creationId xmlns:p14="http://schemas.microsoft.com/office/powerpoint/2010/main" val="1495722751"/>
+      </p:ext>
+    </p:extLst>
+  </p:cSld>
+  <p:clrMapOvr>
+    <a:masterClrMapping/>
+  </p:clrMapOvr>
+</p:sld>
+</file>
+
+<file path=ppt/slides/slide14.xml><?xml version="1.0" encoding="utf-8"?>
 <p:sld xmlns:a="http://schemas.openxmlformats.org/drawingml/2006/main" xmlns:r="http://schemas.openxmlformats.org/officeDocument/2006/relationships" xmlns:p="http://schemas.openxmlformats.org/presentationml/2006/main">
   <p:cSld>
     <p:spTree>
@@ -5210,7 +7787,7 @@
           <p:cNvPr id="2" name="Titel 1">
             <a:extLst>
               <a:ext uri="{FF2B5EF4-FFF2-40B4-BE49-F238E27FC236}">
-                <a16:creationId xmlns:a16="http://schemas.microsoft.com/office/drawing/2014/main" id="{32CCE440-A4CB-26A7-5B3F-3F9D4B878A95}"/>
+                <a16:creationId xmlns:a16="http://schemas.microsoft.com/office/drawing/2014/main" id="{86AADDDC-CD07-D152-F98D-6AA7ABFFAE93}"/>
               </a:ext>
             </a:extLst>
           </p:cNvPr>
@@ -5228,128 +7805,33 @@
           <a:p>
             <a:r>
               <a:rPr lang="de-DE" dirty="0"/>
-              <a:t>7. SOUPs/OTS</a:t>
-            </a:r>
-          </a:p>
-        </p:txBody>
-      </p:sp>
-      <p:sp>
-        <p:nvSpPr>
-          <p:cNvPr id="6" name="Inhaltsplatzhalter 5">
-            <a:extLst>
-              <a:ext uri="{FF2B5EF4-FFF2-40B4-BE49-F238E27FC236}">
-                <a16:creationId xmlns:a16="http://schemas.microsoft.com/office/drawing/2014/main" id="{AF37E05B-D1E7-D5BB-3AA4-0CBC94340331}"/>
-              </a:ext>
-            </a:extLst>
-          </p:cNvPr>
-          <p:cNvSpPr>
-            <a:spLocks noGrp="1"/>
-          </p:cNvSpPr>
-          <p:nvPr>
-            <p:ph sz="half" idx="1"/>
+              <a:t>5. Ausblick auf den folgenden Sprint</a:t>
+            </a:r>
+          </a:p>
+        </p:txBody>
+      </p:sp>
+      <p:sp>
+        <p:nvSpPr>
+          <p:cNvPr id="3" name="Inhaltsplatzhalter 2">
+            <a:extLst>
+              <a:ext uri="{FF2B5EF4-FFF2-40B4-BE49-F238E27FC236}">
+                <a16:creationId xmlns:a16="http://schemas.microsoft.com/office/drawing/2014/main" id="{5E854AF4-9867-751A-7A8B-348123EF4C14}"/>
+              </a:ext>
+            </a:extLst>
+          </p:cNvPr>
+          <p:cNvSpPr>
+            <a:spLocks noGrp="1"/>
+          </p:cNvSpPr>
+          <p:nvPr>
+            <p:ph idx="1"/>
           </p:nvPr>
         </p:nvSpPr>
         <p:spPr/>
         <p:txBody>
-          <a:bodyPr>
-            <a:normAutofit lnSpcReduction="10000"/>
-          </a:bodyPr>
-          <a:lstStyle/>
-          <a:p>
-            <a:r>
-              <a:rPr lang="de-DE" dirty="0"/>
-              <a:t>Eingesetzte SOUPs:</a:t>
-            </a:r>
-          </a:p>
-          <a:p>
-            <a:pPr lvl="1"/>
-            <a:r>
-              <a:rPr lang="de-DE" dirty="0"/>
-              <a:t>Docker-Container für Hosting der Anwendung</a:t>
-            </a:r>
-          </a:p>
-          <a:p>
-            <a:r>
-              <a:rPr lang="de-DE" dirty="0"/>
-              <a:t>Bibliotheken: </a:t>
-            </a:r>
-          </a:p>
-          <a:p>
-            <a:pPr lvl="1"/>
-            <a:r>
-              <a:rPr lang="de-DE" dirty="0"/>
-              <a:t>[z. B. </a:t>
-            </a:r>
-            <a:r>
-              <a:rPr lang="de-DE" dirty="0" err="1"/>
-              <a:t>Newtonsoft.Json</a:t>
-            </a:r>
-            <a:r>
-              <a:rPr lang="de-DE" dirty="0"/>
-              <a:t>]</a:t>
-            </a:r>
-          </a:p>
-          <a:p>
-            <a:r>
-              <a:rPr lang="de-DE" dirty="0"/>
-              <a:t>Eingesetzte OTS:</a:t>
-            </a:r>
-          </a:p>
-          <a:p>
-            <a:pPr lvl="1"/>
-            <a:r>
-              <a:rPr lang="de-DE" dirty="0"/>
-              <a:t>.NET 5.0 Framework</a:t>
-            </a:r>
-          </a:p>
-        </p:txBody>
-      </p:sp>
-      <p:sp>
-        <p:nvSpPr>
-          <p:cNvPr id="7" name="Inhaltsplatzhalter 6">
-            <a:extLst>
-              <a:ext uri="{FF2B5EF4-FFF2-40B4-BE49-F238E27FC236}">
-                <a16:creationId xmlns:a16="http://schemas.microsoft.com/office/drawing/2014/main" id="{3BFD40B0-F7F1-F960-F8BC-73901AB54EC1}"/>
-              </a:ext>
-            </a:extLst>
-          </p:cNvPr>
-          <p:cNvSpPr>
-            <a:spLocks noGrp="1"/>
-          </p:cNvSpPr>
-          <p:nvPr>
-            <p:ph sz="half" idx="2"/>
-          </p:nvPr>
-        </p:nvSpPr>
-        <p:spPr/>
-        <p:txBody>
-          <a:bodyPr>
-            <a:normAutofit lnSpcReduction="10000"/>
-          </a:bodyPr>
-          <a:lstStyle/>
-          <a:p>
-            <a:r>
-              <a:rPr lang="de-DE" dirty="0"/>
-              <a:t>SQLite-Datenbank</a:t>
-            </a:r>
-          </a:p>
-          <a:p>
-            <a:r>
-              <a:rPr lang="de-DE" dirty="0"/>
-              <a:t>Visual Studio IDE</a:t>
-            </a:r>
-          </a:p>
-          <a:p>
-            <a:r>
-              <a:rPr lang="de-DE" dirty="0"/>
-              <a:t>Maßnahmen zur Validierung und Sicherstellung:</a:t>
-            </a:r>
-          </a:p>
-          <a:p>
-            <a:pPr lvl="1"/>
-            <a:r>
-              <a:rPr lang="de-DE" dirty="0"/>
-              <a:t>Security-Scans, regelmäßige Updates</a:t>
-            </a:r>
+          <a:bodyPr/>
+          <a:lstStyle/>
+          <a:p>
+            <a:endParaRPr lang="de-DE"/>
           </a:p>
         </p:txBody>
       </p:sp>
@@ -5358,7 +7840,7 @@
           <p:cNvPr id="4" name="Datumsplatzhalter 3">
             <a:extLst>
               <a:ext uri="{FF2B5EF4-FFF2-40B4-BE49-F238E27FC236}">
-                <a16:creationId xmlns:a16="http://schemas.microsoft.com/office/drawing/2014/main" id="{02CC40AD-91C3-625D-A10C-F9A7627732C1}"/>
+                <a16:creationId xmlns:a16="http://schemas.microsoft.com/office/drawing/2014/main" id="{305A6BE5-5A63-7D28-E770-729A20618D33}"/>
               </a:ext>
             </a:extLst>
           </p:cNvPr>
@@ -5387,7 +7869,7 @@
           <p:cNvPr id="5" name="Foliennummernplatzhalter 4">
             <a:extLst>
               <a:ext uri="{FF2B5EF4-FFF2-40B4-BE49-F238E27FC236}">
-                <a16:creationId xmlns:a16="http://schemas.microsoft.com/office/drawing/2014/main" id="{C09C3547-5BE9-9D3D-0D06-22EA64B7A6ED}"/>
+                <a16:creationId xmlns:a16="http://schemas.microsoft.com/office/drawing/2014/main" id="{E28ABC24-8900-E378-E502-62B817D571F6}"/>
               </a:ext>
             </a:extLst>
           </p:cNvPr>
@@ -5405,7 +7887,488 @@
           <a:p>
             <a:fld id="{07CE569E-9B7C-4CB9-AB80-C0841F922CFF}" type="slidenum">
               <a:rPr lang="en-US" smtClean="0"/>
-              <a:t>11</a:t>
+              <a:t>14</a:t>
+            </a:fld>
+            <a:endParaRPr lang="en-US"/>
+          </a:p>
+        </p:txBody>
+      </p:sp>
+    </p:spTree>
+    <p:extLst>
+      <p:ext uri="{BB962C8B-B14F-4D97-AF65-F5344CB8AC3E}">
+        <p14:creationId xmlns:p14="http://schemas.microsoft.com/office/powerpoint/2010/main" val="3562051256"/>
+      </p:ext>
+    </p:extLst>
+  </p:cSld>
+  <p:clrMapOvr>
+    <a:masterClrMapping/>
+  </p:clrMapOvr>
+</p:sld>
+</file>
+
+<file path=ppt/slides/slide15.xml><?xml version="1.0" encoding="utf-8"?>
+<p:sld xmlns:a="http://schemas.openxmlformats.org/drawingml/2006/main" xmlns:r="http://schemas.openxmlformats.org/officeDocument/2006/relationships" xmlns:p="http://schemas.openxmlformats.org/presentationml/2006/main">
+  <p:cSld>
+    <p:spTree>
+      <p:nvGrpSpPr>
+        <p:cNvPr id="1" name=""/>
+        <p:cNvGrpSpPr/>
+        <p:nvPr/>
+      </p:nvGrpSpPr>
+      <p:grpSpPr>
+        <a:xfrm>
+          <a:off x="0" y="0"/>
+          <a:ext cx="0" cy="0"/>
+          <a:chOff x="0" y="0"/>
+          <a:chExt cx="0" cy="0"/>
+        </a:xfrm>
+      </p:grpSpPr>
+      <p:sp>
+        <p:nvSpPr>
+          <p:cNvPr id="2" name="Titel 1">
+            <a:extLst>
+              <a:ext uri="{FF2B5EF4-FFF2-40B4-BE49-F238E27FC236}">
+                <a16:creationId xmlns:a16="http://schemas.microsoft.com/office/drawing/2014/main" id="{A075FF74-E5D2-1C9F-1DF3-DCD54EF547E9}"/>
+              </a:ext>
+            </a:extLst>
+          </p:cNvPr>
+          <p:cNvSpPr>
+            <a:spLocks noGrp="1"/>
+          </p:cNvSpPr>
+          <p:nvPr>
+            <p:ph type="title"/>
+          </p:nvPr>
+        </p:nvSpPr>
+        <p:spPr/>
+        <p:txBody>
+          <a:bodyPr/>
+          <a:lstStyle/>
+          <a:p>
+            <a:r>
+              <a:rPr lang="de-DE" dirty="0"/>
+              <a:t>6. Software-Tools</a:t>
+            </a:r>
+          </a:p>
+        </p:txBody>
+      </p:sp>
+      <p:sp>
+        <p:nvSpPr>
+          <p:cNvPr id="3" name="Inhaltsplatzhalter 2">
+            <a:extLst>
+              <a:ext uri="{FF2B5EF4-FFF2-40B4-BE49-F238E27FC236}">
+                <a16:creationId xmlns:a16="http://schemas.microsoft.com/office/drawing/2014/main" id="{E627C203-A1B7-383D-97A8-56B3248A1E83}"/>
+              </a:ext>
+            </a:extLst>
+          </p:cNvPr>
+          <p:cNvSpPr>
+            <a:spLocks noGrp="1"/>
+          </p:cNvSpPr>
+          <p:nvPr>
+            <p:ph sz="half" idx="1"/>
+          </p:nvPr>
+        </p:nvSpPr>
+        <p:spPr/>
+        <p:txBody>
+          <a:bodyPr>
+            <a:normAutofit/>
+          </a:bodyPr>
+          <a:lstStyle/>
+          <a:p>
+            <a:r>
+              <a:rPr lang="de-DE" dirty="0"/>
+              <a:t>Programmiersprache:</a:t>
+            </a:r>
+          </a:p>
+          <a:p>
+            <a:pPr lvl="1"/>
+            <a:r>
+              <a:rPr lang="de-DE" dirty="0"/>
+              <a:t>C#</a:t>
+            </a:r>
+          </a:p>
+          <a:p>
+            <a:r>
+              <a:rPr lang="de-DE" dirty="0"/>
+              <a:t>Framework:</a:t>
+            </a:r>
+          </a:p>
+          <a:p>
+            <a:pPr lvl="1"/>
+            <a:r>
+              <a:rPr lang="de-DE" dirty="0" err="1"/>
+              <a:t>Blazor</a:t>
+            </a:r>
+            <a:endParaRPr lang="de-DE" dirty="0"/>
+          </a:p>
+          <a:p>
+            <a:r>
+              <a:rPr lang="de-DE" dirty="0"/>
+              <a:t>IDE:</a:t>
+            </a:r>
+          </a:p>
+          <a:p>
+            <a:pPr lvl="1"/>
+            <a:r>
+              <a:rPr lang="de-DE" dirty="0"/>
+              <a:t>Visual Studio</a:t>
+            </a:r>
+          </a:p>
+        </p:txBody>
+      </p:sp>
+      <p:sp>
+        <p:nvSpPr>
+          <p:cNvPr id="6" name="Inhaltsplatzhalter 5">
+            <a:extLst>
+              <a:ext uri="{FF2B5EF4-FFF2-40B4-BE49-F238E27FC236}">
+                <a16:creationId xmlns:a16="http://schemas.microsoft.com/office/drawing/2014/main" id="{7185288F-FFC3-A9CF-5040-625A8A619580}"/>
+              </a:ext>
+            </a:extLst>
+          </p:cNvPr>
+          <p:cNvSpPr>
+            <a:spLocks noGrp="1"/>
+          </p:cNvSpPr>
+          <p:nvPr>
+            <p:ph sz="half" idx="2"/>
+          </p:nvPr>
+        </p:nvSpPr>
+        <p:spPr/>
+        <p:txBody>
+          <a:bodyPr>
+            <a:normAutofit/>
+          </a:bodyPr>
+          <a:lstStyle/>
+          <a:p>
+            <a:r>
+              <a:rPr lang="de-DE" dirty="0"/>
+              <a:t>Datenbank:</a:t>
+            </a:r>
+          </a:p>
+          <a:p>
+            <a:pPr lvl="1"/>
+            <a:r>
+              <a:rPr lang="de-DE" dirty="0"/>
+              <a:t>SQLite</a:t>
+            </a:r>
+          </a:p>
+          <a:p>
+            <a:r>
+              <a:rPr lang="de-DE" dirty="0"/>
+              <a:t>Weitere Tools:</a:t>
+            </a:r>
+          </a:p>
+          <a:p>
+            <a:pPr lvl="1"/>
+            <a:r>
+              <a:rPr lang="de-DE" dirty="0"/>
+              <a:t>Git (Versionierung)</a:t>
+            </a:r>
+          </a:p>
+          <a:p>
+            <a:pPr lvl="1"/>
+            <a:r>
+              <a:rPr lang="de-DE" dirty="0"/>
+              <a:t>Docker (</a:t>
+            </a:r>
+            <a:r>
+              <a:rPr lang="de-DE" dirty="0" err="1"/>
+              <a:t>Deployment</a:t>
+            </a:r>
+            <a:r>
+              <a:rPr lang="de-DE" dirty="0"/>
+              <a:t>)</a:t>
+            </a:r>
+          </a:p>
+        </p:txBody>
+      </p:sp>
+      <p:sp>
+        <p:nvSpPr>
+          <p:cNvPr id="4" name="Datumsplatzhalter 3">
+            <a:extLst>
+              <a:ext uri="{FF2B5EF4-FFF2-40B4-BE49-F238E27FC236}">
+                <a16:creationId xmlns:a16="http://schemas.microsoft.com/office/drawing/2014/main" id="{F5985418-FDA1-F1A7-80E8-C25C6BAC324B}"/>
+              </a:ext>
+            </a:extLst>
+          </p:cNvPr>
+          <p:cNvSpPr>
+            <a:spLocks noGrp="1"/>
+          </p:cNvSpPr>
+          <p:nvPr>
+            <p:ph type="dt" sz="half" idx="10"/>
+          </p:nvPr>
+        </p:nvSpPr>
+        <p:spPr/>
+        <p:txBody>
+          <a:bodyPr/>
+          <a:lstStyle/>
+          <a:p>
+            <a:fld id="{42B45B56-1D88-4042-8DF0-EB6B41B710D3}" type="datetime1">
+              <a:rPr lang="de-DE" smtClean="0"/>
+              <a:t>23.11.2024</a:t>
+            </a:fld>
+            <a:endParaRPr lang="en-US"/>
+          </a:p>
+        </p:txBody>
+      </p:sp>
+      <p:sp>
+        <p:nvSpPr>
+          <p:cNvPr id="5" name="Foliennummernplatzhalter 4">
+            <a:extLst>
+              <a:ext uri="{FF2B5EF4-FFF2-40B4-BE49-F238E27FC236}">
+                <a16:creationId xmlns:a16="http://schemas.microsoft.com/office/drawing/2014/main" id="{6A7A11C6-83C4-FA07-F8C7-F2826F8F22B6}"/>
+              </a:ext>
+            </a:extLst>
+          </p:cNvPr>
+          <p:cNvSpPr>
+            <a:spLocks noGrp="1"/>
+          </p:cNvSpPr>
+          <p:nvPr>
+            <p:ph type="sldNum" sz="quarter" idx="12"/>
+          </p:nvPr>
+        </p:nvSpPr>
+        <p:spPr/>
+        <p:txBody>
+          <a:bodyPr/>
+          <a:lstStyle/>
+          <a:p>
+            <a:fld id="{07CE569E-9B7C-4CB9-AB80-C0841F922CFF}" type="slidenum">
+              <a:rPr lang="en-US" smtClean="0"/>
+              <a:t>15</a:t>
+            </a:fld>
+            <a:endParaRPr lang="en-US"/>
+          </a:p>
+        </p:txBody>
+      </p:sp>
+    </p:spTree>
+    <p:extLst>
+      <p:ext uri="{BB962C8B-B14F-4D97-AF65-F5344CB8AC3E}">
+        <p14:creationId xmlns:p14="http://schemas.microsoft.com/office/powerpoint/2010/main" val="1367875186"/>
+      </p:ext>
+    </p:extLst>
+  </p:cSld>
+  <p:clrMapOvr>
+    <a:masterClrMapping/>
+  </p:clrMapOvr>
+</p:sld>
+</file>
+
+<file path=ppt/slides/slide16.xml><?xml version="1.0" encoding="utf-8"?>
+<p:sld xmlns:a="http://schemas.openxmlformats.org/drawingml/2006/main" xmlns:r="http://schemas.openxmlformats.org/officeDocument/2006/relationships" xmlns:p="http://schemas.openxmlformats.org/presentationml/2006/main">
+  <p:cSld>
+    <p:spTree>
+      <p:nvGrpSpPr>
+        <p:cNvPr id="1" name=""/>
+        <p:cNvGrpSpPr/>
+        <p:nvPr/>
+      </p:nvGrpSpPr>
+      <p:grpSpPr>
+        <a:xfrm>
+          <a:off x="0" y="0"/>
+          <a:ext cx="0" cy="0"/>
+          <a:chOff x="0" y="0"/>
+          <a:chExt cx="0" cy="0"/>
+        </a:xfrm>
+      </p:grpSpPr>
+      <p:sp>
+        <p:nvSpPr>
+          <p:cNvPr id="2" name="Titel 1">
+            <a:extLst>
+              <a:ext uri="{FF2B5EF4-FFF2-40B4-BE49-F238E27FC236}">
+                <a16:creationId xmlns:a16="http://schemas.microsoft.com/office/drawing/2014/main" id="{32CCE440-A4CB-26A7-5B3F-3F9D4B878A95}"/>
+              </a:ext>
+            </a:extLst>
+          </p:cNvPr>
+          <p:cNvSpPr>
+            <a:spLocks noGrp="1"/>
+          </p:cNvSpPr>
+          <p:nvPr>
+            <p:ph type="title"/>
+          </p:nvPr>
+        </p:nvSpPr>
+        <p:spPr/>
+        <p:txBody>
+          <a:bodyPr/>
+          <a:lstStyle/>
+          <a:p>
+            <a:r>
+              <a:rPr lang="de-DE" dirty="0"/>
+              <a:t>7. SOUPs/OTS</a:t>
+            </a:r>
+          </a:p>
+        </p:txBody>
+      </p:sp>
+      <p:sp>
+        <p:nvSpPr>
+          <p:cNvPr id="6" name="Inhaltsplatzhalter 5">
+            <a:extLst>
+              <a:ext uri="{FF2B5EF4-FFF2-40B4-BE49-F238E27FC236}">
+                <a16:creationId xmlns:a16="http://schemas.microsoft.com/office/drawing/2014/main" id="{AF37E05B-D1E7-D5BB-3AA4-0CBC94340331}"/>
+              </a:ext>
+            </a:extLst>
+          </p:cNvPr>
+          <p:cNvSpPr>
+            <a:spLocks noGrp="1"/>
+          </p:cNvSpPr>
+          <p:nvPr>
+            <p:ph sz="half" idx="1"/>
+          </p:nvPr>
+        </p:nvSpPr>
+        <p:spPr/>
+        <p:txBody>
+          <a:bodyPr>
+            <a:normAutofit lnSpcReduction="10000"/>
+          </a:bodyPr>
+          <a:lstStyle/>
+          <a:p>
+            <a:r>
+              <a:rPr lang="de-DE" dirty="0"/>
+              <a:t>Eingesetzte SOUPs:</a:t>
+            </a:r>
+          </a:p>
+          <a:p>
+            <a:pPr lvl="1"/>
+            <a:r>
+              <a:rPr lang="de-DE" dirty="0"/>
+              <a:t>Docker-Container für Hosting der Anwendung</a:t>
+            </a:r>
+          </a:p>
+          <a:p>
+            <a:r>
+              <a:rPr lang="de-DE" dirty="0"/>
+              <a:t>Bibliotheken: </a:t>
+            </a:r>
+          </a:p>
+          <a:p>
+            <a:pPr lvl="1"/>
+            <a:r>
+              <a:rPr lang="de-DE" dirty="0"/>
+              <a:t>[z. B. </a:t>
+            </a:r>
+            <a:r>
+              <a:rPr lang="de-DE" dirty="0" err="1"/>
+              <a:t>Newtonsoft.Json</a:t>
+            </a:r>
+            <a:r>
+              <a:rPr lang="de-DE" dirty="0"/>
+              <a:t>]</a:t>
+            </a:r>
+          </a:p>
+          <a:p>
+            <a:r>
+              <a:rPr lang="de-DE" dirty="0"/>
+              <a:t>Eingesetzte OTS:</a:t>
+            </a:r>
+          </a:p>
+          <a:p>
+            <a:pPr lvl="1"/>
+            <a:r>
+              <a:rPr lang="de-DE" dirty="0"/>
+              <a:t>.NET 5.0 Framework</a:t>
+            </a:r>
+          </a:p>
+        </p:txBody>
+      </p:sp>
+      <p:sp>
+        <p:nvSpPr>
+          <p:cNvPr id="7" name="Inhaltsplatzhalter 6">
+            <a:extLst>
+              <a:ext uri="{FF2B5EF4-FFF2-40B4-BE49-F238E27FC236}">
+                <a16:creationId xmlns:a16="http://schemas.microsoft.com/office/drawing/2014/main" id="{3BFD40B0-F7F1-F960-F8BC-73901AB54EC1}"/>
+              </a:ext>
+            </a:extLst>
+          </p:cNvPr>
+          <p:cNvSpPr>
+            <a:spLocks noGrp="1"/>
+          </p:cNvSpPr>
+          <p:nvPr>
+            <p:ph sz="half" idx="2"/>
+          </p:nvPr>
+        </p:nvSpPr>
+        <p:spPr/>
+        <p:txBody>
+          <a:bodyPr>
+            <a:normAutofit lnSpcReduction="10000"/>
+          </a:bodyPr>
+          <a:lstStyle/>
+          <a:p>
+            <a:r>
+              <a:rPr lang="de-DE" dirty="0"/>
+              <a:t>SQLite-Datenbank</a:t>
+            </a:r>
+          </a:p>
+          <a:p>
+            <a:r>
+              <a:rPr lang="de-DE" dirty="0"/>
+              <a:t>Visual Studio IDE</a:t>
+            </a:r>
+          </a:p>
+          <a:p>
+            <a:r>
+              <a:rPr lang="de-DE" dirty="0"/>
+              <a:t>Maßnahmen zur Validierung und Sicherstellung:</a:t>
+            </a:r>
+          </a:p>
+          <a:p>
+            <a:pPr lvl="1"/>
+            <a:r>
+              <a:rPr lang="de-DE" dirty="0"/>
+              <a:t>Security-Scans, regelmäßige Updates</a:t>
+            </a:r>
+          </a:p>
+        </p:txBody>
+      </p:sp>
+      <p:sp>
+        <p:nvSpPr>
+          <p:cNvPr id="4" name="Datumsplatzhalter 3">
+            <a:extLst>
+              <a:ext uri="{FF2B5EF4-FFF2-40B4-BE49-F238E27FC236}">
+                <a16:creationId xmlns:a16="http://schemas.microsoft.com/office/drawing/2014/main" id="{02CC40AD-91C3-625D-A10C-F9A7627732C1}"/>
+              </a:ext>
+            </a:extLst>
+          </p:cNvPr>
+          <p:cNvSpPr>
+            <a:spLocks noGrp="1"/>
+          </p:cNvSpPr>
+          <p:nvPr>
+            <p:ph type="dt" sz="half" idx="10"/>
+          </p:nvPr>
+        </p:nvSpPr>
+        <p:spPr/>
+        <p:txBody>
+          <a:bodyPr/>
+          <a:lstStyle/>
+          <a:p>
+            <a:fld id="{42B45B56-1D88-4042-8DF0-EB6B41B710D3}" type="datetime1">
+              <a:rPr lang="de-DE" smtClean="0"/>
+              <a:t>23.11.2024</a:t>
+            </a:fld>
+            <a:endParaRPr lang="en-US"/>
+          </a:p>
+        </p:txBody>
+      </p:sp>
+      <p:sp>
+        <p:nvSpPr>
+          <p:cNvPr id="5" name="Foliennummernplatzhalter 4">
+            <a:extLst>
+              <a:ext uri="{FF2B5EF4-FFF2-40B4-BE49-F238E27FC236}">
+                <a16:creationId xmlns:a16="http://schemas.microsoft.com/office/drawing/2014/main" id="{C09C3547-5BE9-9D3D-0D06-22EA64B7A6ED}"/>
+              </a:ext>
+            </a:extLst>
+          </p:cNvPr>
+          <p:cNvSpPr>
+            <a:spLocks noGrp="1"/>
+          </p:cNvSpPr>
+          <p:nvPr>
+            <p:ph type="sldNum" sz="quarter" idx="12"/>
+          </p:nvPr>
+        </p:nvSpPr>
+        <p:spPr/>
+        <p:txBody>
+          <a:bodyPr/>
+          <a:lstStyle/>
+          <a:p>
+            <a:fld id="{07CE569E-9B7C-4CB9-AB80-C0841F922CFF}" type="slidenum">
+              <a:rPr lang="en-US" smtClean="0"/>
+              <a:t>16</a:t>
             </a:fld>
             <a:endParaRPr lang="en-US"/>
           </a:p>
@@ -7290,31 +10253,6 @@
       </p:sp>
       <p:sp>
         <p:nvSpPr>
-          <p:cNvPr id="3" name="Inhaltsplatzhalter 2">
-            <a:extLst>
-              <a:ext uri="{FF2B5EF4-FFF2-40B4-BE49-F238E27FC236}">
-                <a16:creationId xmlns:a16="http://schemas.microsoft.com/office/drawing/2014/main" id="{C77C4CF4-DB37-281A-EA30-8A6074C874A3}"/>
-              </a:ext>
-            </a:extLst>
-          </p:cNvPr>
-          <p:cNvSpPr>
-            <a:spLocks noGrp="1"/>
-          </p:cNvSpPr>
-          <p:nvPr>
-            <p:ph idx="1"/>
-          </p:nvPr>
-        </p:nvSpPr>
-        <p:spPr/>
-        <p:txBody>
-          <a:bodyPr/>
-          <a:lstStyle/>
-          <a:p>
-            <a:endParaRPr lang="de-DE"/>
-          </a:p>
-        </p:txBody>
-      </p:sp>
-      <p:sp>
-        <p:nvSpPr>
           <p:cNvPr id="4" name="Datumsplatzhalter 3">
             <a:extLst>
               <a:ext uri="{FF2B5EF4-FFF2-40B4-BE49-F238E27FC236}">
@@ -7371,6 +10309,290 @@
           </a:p>
         </p:txBody>
       </p:sp>
+      <p:sp>
+        <p:nvSpPr>
+          <p:cNvPr id="8" name="Inhaltsplatzhalter 7">
+            <a:extLst>
+              <a:ext uri="{FF2B5EF4-FFF2-40B4-BE49-F238E27FC236}">
+                <a16:creationId xmlns:a16="http://schemas.microsoft.com/office/drawing/2014/main" id="{22B032CF-7BEE-394B-B89E-5DBB04B07C95}"/>
+              </a:ext>
+            </a:extLst>
+          </p:cNvPr>
+          <p:cNvSpPr>
+            <a:spLocks noGrp="1"/>
+          </p:cNvSpPr>
+          <p:nvPr>
+            <p:ph idx="1"/>
+          </p:nvPr>
+        </p:nvSpPr>
+        <p:spPr>
+          <a:xfrm>
+            <a:off x="762000" y="2374392"/>
+            <a:ext cx="10668000" cy="3294404"/>
+          </a:xfrm>
+        </p:spPr>
+        <p:txBody>
+          <a:bodyPr/>
+          <a:lstStyle/>
+          <a:p>
+            <a:r>
+              <a:rPr lang="en-US" dirty="0"/>
+              <a:t>Menu-Karte </a:t>
+            </a:r>
+            <a:r>
+              <a:rPr lang="en-US" dirty="0" err="1"/>
+              <a:t>anzeigen</a:t>
+            </a:r>
+            <a:endParaRPr lang="en-US" dirty="0"/>
+          </a:p>
+          <a:p>
+            <a:pPr lvl="1"/>
+            <a:r>
+              <a:rPr lang="en-US" dirty="0"/>
+              <a:t>Website </a:t>
+            </a:r>
+            <a:r>
+              <a:rPr lang="en-US" dirty="0" err="1"/>
+              <a:t>erstellen</a:t>
+            </a:r>
+            <a:endParaRPr lang="en-US" dirty="0"/>
+          </a:p>
+          <a:p>
+            <a:pPr lvl="1"/>
+            <a:r>
+              <a:rPr lang="en-US" dirty="0" err="1"/>
+              <a:t>Datenbank</a:t>
+            </a:r>
+            <a:r>
+              <a:rPr lang="en-US" dirty="0"/>
+              <a:t> </a:t>
+            </a:r>
+            <a:r>
+              <a:rPr lang="en-US" dirty="0" err="1"/>
+              <a:t>aufbauen</a:t>
+            </a:r>
+            <a:endParaRPr lang="en-US" dirty="0"/>
+          </a:p>
+          <a:p>
+            <a:r>
+              <a:rPr lang="en-US" dirty="0" err="1"/>
+              <a:t>Auswahl</a:t>
+            </a:r>
+            <a:r>
+              <a:rPr lang="en-US" dirty="0"/>
+              <a:t> und </a:t>
+            </a:r>
+            <a:r>
+              <a:rPr lang="en-US" dirty="0" err="1"/>
+              <a:t>Speichern</a:t>
+            </a:r>
+            <a:r>
+              <a:rPr lang="en-US" dirty="0"/>
+              <a:t> (</a:t>
+            </a:r>
+            <a:r>
+              <a:rPr lang="en-US" dirty="0" err="1"/>
+              <a:t>Warenkorb</a:t>
+            </a:r>
+            <a:r>
+              <a:rPr lang="en-US" dirty="0"/>
+              <a:t>) von </a:t>
+            </a:r>
+            <a:r>
+              <a:rPr lang="en-US" dirty="0" err="1"/>
+              <a:t>markierten</a:t>
+            </a:r>
+            <a:r>
+              <a:rPr lang="en-US" dirty="0"/>
+              <a:t> </a:t>
+            </a:r>
+            <a:r>
+              <a:rPr lang="en-US" dirty="0" err="1"/>
+              <a:t>Speisen</a:t>
+            </a:r>
+            <a:endParaRPr lang="de-DE" dirty="0"/>
+          </a:p>
+        </p:txBody>
+      </p:sp>
+      <p:sp>
+        <p:nvSpPr>
+          <p:cNvPr id="9" name="Rechteck 8">
+            <a:extLst>
+              <a:ext uri="{FF2B5EF4-FFF2-40B4-BE49-F238E27FC236}">
+                <a16:creationId xmlns:a16="http://schemas.microsoft.com/office/drawing/2014/main" id="{B9D710F2-26B3-E933-12F8-AD231FAACE5C}"/>
+              </a:ext>
+            </a:extLst>
+          </p:cNvPr>
+          <p:cNvSpPr/>
+          <p:nvPr/>
+        </p:nvSpPr>
+        <p:spPr>
+          <a:xfrm>
+            <a:off x="2181880" y="6056769"/>
+            <a:ext cx="4870765" cy="534154"/>
+          </a:xfrm>
+          <a:prstGeom prst="rect">
+            <a:avLst/>
+          </a:prstGeom>
+        </p:spPr>
+        <p:style>
+          <a:lnRef idx="2">
+            <a:schemeClr val="accent1">
+              <a:shade val="15000"/>
+            </a:schemeClr>
+          </a:lnRef>
+          <a:fillRef idx="1">
+            <a:schemeClr val="accent1"/>
+          </a:fillRef>
+          <a:effectRef idx="0">
+            <a:schemeClr val="accent1"/>
+          </a:effectRef>
+          <a:fontRef idx="minor">
+            <a:schemeClr val="lt1"/>
+          </a:fontRef>
+        </p:style>
+        <p:txBody>
+          <a:bodyPr rtlCol="0" anchor="ctr"/>
+          <a:lstStyle/>
+          <a:p>
+            <a:pPr algn="ctr"/>
+            <a:endParaRPr lang="de-DE"/>
+          </a:p>
+        </p:txBody>
+      </p:sp>
+      <p:sp>
+        <p:nvSpPr>
+          <p:cNvPr id="10" name="Rechteck 9">
+            <a:extLst>
+              <a:ext uri="{FF2B5EF4-FFF2-40B4-BE49-F238E27FC236}">
+                <a16:creationId xmlns:a16="http://schemas.microsoft.com/office/drawing/2014/main" id="{5B3808CC-EAE0-2B56-5309-1C4946E43803}"/>
+              </a:ext>
+            </a:extLst>
+          </p:cNvPr>
+          <p:cNvSpPr/>
+          <p:nvPr/>
+        </p:nvSpPr>
+        <p:spPr>
+          <a:xfrm>
+            <a:off x="2865419" y="5522615"/>
+            <a:ext cx="3503691" cy="534154"/>
+          </a:xfrm>
+          <a:prstGeom prst="rect">
+            <a:avLst/>
+          </a:prstGeom>
+        </p:spPr>
+        <p:style>
+          <a:lnRef idx="2">
+            <a:schemeClr val="accent1">
+              <a:shade val="15000"/>
+            </a:schemeClr>
+          </a:lnRef>
+          <a:fillRef idx="1">
+            <a:schemeClr val="accent1"/>
+          </a:fillRef>
+          <a:effectRef idx="0">
+            <a:schemeClr val="accent1"/>
+          </a:effectRef>
+          <a:fontRef idx="minor">
+            <a:schemeClr val="lt1"/>
+          </a:fontRef>
+        </p:style>
+        <p:txBody>
+          <a:bodyPr rtlCol="0" anchor="ctr"/>
+          <a:lstStyle/>
+          <a:p>
+            <a:pPr algn="ctr"/>
+            <a:endParaRPr lang="de-DE"/>
+          </a:p>
+        </p:txBody>
+      </p:sp>
+      <p:sp>
+        <p:nvSpPr>
+          <p:cNvPr id="11" name="Rechteck 10">
+            <a:extLst>
+              <a:ext uri="{FF2B5EF4-FFF2-40B4-BE49-F238E27FC236}">
+                <a16:creationId xmlns:a16="http://schemas.microsoft.com/office/drawing/2014/main" id="{DB2EE6EB-B12C-07E7-7814-72C38A9C755B}"/>
+              </a:ext>
+            </a:extLst>
+          </p:cNvPr>
+          <p:cNvSpPr/>
+          <p:nvPr/>
+        </p:nvSpPr>
+        <p:spPr>
+          <a:xfrm>
+            <a:off x="3520662" y="4985669"/>
+            <a:ext cx="2193203" cy="534154"/>
+          </a:xfrm>
+          <a:prstGeom prst="rect">
+            <a:avLst/>
+          </a:prstGeom>
+        </p:spPr>
+        <p:style>
+          <a:lnRef idx="2">
+            <a:schemeClr val="accent1">
+              <a:shade val="15000"/>
+            </a:schemeClr>
+          </a:lnRef>
+          <a:fillRef idx="1">
+            <a:schemeClr val="accent1"/>
+          </a:fillRef>
+          <a:effectRef idx="0">
+            <a:schemeClr val="accent1"/>
+          </a:effectRef>
+          <a:fontRef idx="minor">
+            <a:schemeClr val="lt1"/>
+          </a:fontRef>
+        </p:style>
+        <p:txBody>
+          <a:bodyPr rtlCol="0" anchor="ctr"/>
+          <a:lstStyle/>
+          <a:p>
+            <a:pPr algn="ctr"/>
+            <a:endParaRPr lang="de-DE"/>
+          </a:p>
+        </p:txBody>
+      </p:sp>
+      <p:cxnSp>
+        <p:nvCxnSpPr>
+          <p:cNvPr id="13" name="Gerade Verbindung mit Pfeil 12">
+            <a:extLst>
+              <a:ext uri="{FF2B5EF4-FFF2-40B4-BE49-F238E27FC236}">
+                <a16:creationId xmlns:a16="http://schemas.microsoft.com/office/drawing/2014/main" id="{52C1E2E1-831C-0869-ECEE-C521D569E6C9}"/>
+              </a:ext>
+            </a:extLst>
+          </p:cNvPr>
+          <p:cNvCxnSpPr>
+            <a:cxnSpLocks/>
+          </p:cNvCxnSpPr>
+          <p:nvPr/>
+        </p:nvCxnSpPr>
+        <p:spPr>
+          <a:xfrm flipH="1">
+            <a:off x="6934954" y="5106154"/>
+            <a:ext cx="1013989" cy="860080"/>
+          </a:xfrm>
+          <a:prstGeom prst="straightConnector1">
+            <a:avLst/>
+          </a:prstGeom>
+          <a:ln w="57150">
+            <a:tailEnd type="triangle"/>
+          </a:ln>
+        </p:spPr>
+        <p:style>
+          <a:lnRef idx="1">
+            <a:schemeClr val="accent1"/>
+          </a:lnRef>
+          <a:fillRef idx="0">
+            <a:schemeClr val="accent1"/>
+          </a:fillRef>
+          <a:effectRef idx="0">
+            <a:schemeClr val="accent1"/>
+          </a:effectRef>
+          <a:fontRef idx="minor">
+            <a:schemeClr val="tx1"/>
+          </a:fontRef>
+        </p:style>
+      </p:cxnSp>
     </p:spTree>
     <p:extLst>
       <p:ext uri="{BB962C8B-B14F-4D97-AF65-F5344CB8AC3E}">
@@ -7381,6 +10603,185 @@
   <p:clrMapOvr>
     <a:masterClrMapping/>
   </p:clrMapOvr>
+  <p:timing>
+    <p:tnLst>
+      <p:par>
+        <p:cTn id="1" dur="indefinite" restart="never" nodeType="tmRoot">
+          <p:childTnLst>
+            <p:seq concurrent="1" nextAc="seek">
+              <p:cTn id="2" dur="indefinite" nodeType="mainSeq">
+                <p:childTnLst>
+                  <p:par>
+                    <p:cTn id="3" fill="hold">
+                      <p:stCondLst>
+                        <p:cond delay="indefinite"/>
+                      </p:stCondLst>
+                      <p:childTnLst>
+                        <p:par>
+                          <p:cTn id="4" fill="hold">
+                            <p:stCondLst>
+                              <p:cond delay="0"/>
+                            </p:stCondLst>
+                            <p:childTnLst>
+                              <p:par>
+                                <p:cTn id="5" presetID="1" presetClass="entr" presetSubtype="0" fill="hold" grpId="0" nodeType="clickEffect">
+                                  <p:stCondLst>
+                                    <p:cond delay="0"/>
+                                  </p:stCondLst>
+                                  <p:childTnLst>
+                                    <p:set>
+                                      <p:cBhvr>
+                                        <p:cTn id="6" dur="1" fill="hold">
+                                          <p:stCondLst>
+                                            <p:cond delay="0"/>
+                                          </p:stCondLst>
+                                        </p:cTn>
+                                        <p:tgtEl>
+                                          <p:spTgt spid="11"/>
+                                        </p:tgtEl>
+                                        <p:attrNameLst>
+                                          <p:attrName>style.visibility</p:attrName>
+                                        </p:attrNameLst>
+                                      </p:cBhvr>
+                                      <p:to>
+                                        <p:strVal val="visible"/>
+                                      </p:to>
+                                    </p:set>
+                                  </p:childTnLst>
+                                </p:cTn>
+                              </p:par>
+                              <p:par>
+                                <p:cTn id="7" presetID="1" presetClass="entr" presetSubtype="0" fill="hold" grpId="0" nodeType="withEffect">
+                                  <p:stCondLst>
+                                    <p:cond delay="0"/>
+                                  </p:stCondLst>
+                                  <p:childTnLst>
+                                    <p:set>
+                                      <p:cBhvr>
+                                        <p:cTn id="8" dur="1" fill="hold">
+                                          <p:stCondLst>
+                                            <p:cond delay="0"/>
+                                          </p:stCondLst>
+                                        </p:cTn>
+                                        <p:tgtEl>
+                                          <p:spTgt spid="10"/>
+                                        </p:tgtEl>
+                                        <p:attrNameLst>
+                                          <p:attrName>style.visibility</p:attrName>
+                                        </p:attrNameLst>
+                                      </p:cBhvr>
+                                      <p:to>
+                                        <p:strVal val="visible"/>
+                                      </p:to>
+                                    </p:set>
+                                  </p:childTnLst>
+                                </p:cTn>
+                              </p:par>
+                              <p:par>
+                                <p:cTn id="9" presetID="1" presetClass="entr" presetSubtype="0" fill="hold" grpId="0" nodeType="withEffect">
+                                  <p:stCondLst>
+                                    <p:cond delay="0"/>
+                                  </p:stCondLst>
+                                  <p:childTnLst>
+                                    <p:set>
+                                      <p:cBhvr>
+                                        <p:cTn id="10" dur="1" fill="hold">
+                                          <p:stCondLst>
+                                            <p:cond delay="0"/>
+                                          </p:stCondLst>
+                                        </p:cTn>
+                                        <p:tgtEl>
+                                          <p:spTgt spid="9"/>
+                                        </p:tgtEl>
+                                        <p:attrNameLst>
+                                          <p:attrName>style.visibility</p:attrName>
+                                        </p:attrNameLst>
+                                      </p:cBhvr>
+                                      <p:to>
+                                        <p:strVal val="visible"/>
+                                      </p:to>
+                                    </p:set>
+                                  </p:childTnLst>
+                                </p:cTn>
+                              </p:par>
+                            </p:childTnLst>
+                          </p:cTn>
+                        </p:par>
+                      </p:childTnLst>
+                    </p:cTn>
+                  </p:par>
+                  <p:par>
+                    <p:cTn id="11" fill="hold">
+                      <p:stCondLst>
+                        <p:cond delay="indefinite"/>
+                      </p:stCondLst>
+                      <p:childTnLst>
+                        <p:par>
+                          <p:cTn id="12" fill="hold">
+                            <p:stCondLst>
+                              <p:cond delay="0"/>
+                            </p:stCondLst>
+                            <p:childTnLst>
+                              <p:par>
+                                <p:cTn id="13" presetID="1" presetClass="entr" presetSubtype="0" fill="hold" nodeType="clickEffect">
+                                  <p:stCondLst>
+                                    <p:cond delay="0"/>
+                                  </p:stCondLst>
+                                  <p:childTnLst>
+                                    <p:set>
+                                      <p:cBhvr>
+                                        <p:cTn id="14" dur="1" fill="hold">
+                                          <p:stCondLst>
+                                            <p:cond delay="0"/>
+                                          </p:stCondLst>
+                                        </p:cTn>
+                                        <p:tgtEl>
+                                          <p:spTgt spid="13"/>
+                                        </p:tgtEl>
+                                        <p:attrNameLst>
+                                          <p:attrName>style.visibility</p:attrName>
+                                        </p:attrNameLst>
+                                      </p:cBhvr>
+                                      <p:to>
+                                        <p:strVal val="visible"/>
+                                      </p:to>
+                                    </p:set>
+                                  </p:childTnLst>
+                                </p:cTn>
+                              </p:par>
+                            </p:childTnLst>
+                          </p:cTn>
+                        </p:par>
+                      </p:childTnLst>
+                    </p:cTn>
+                  </p:par>
+                </p:childTnLst>
+              </p:cTn>
+              <p:prevCondLst>
+                <p:cond evt="onPrev" delay="0">
+                  <p:tgtEl>
+                    <p:sldTgt/>
+                  </p:tgtEl>
+                </p:cond>
+              </p:prevCondLst>
+              <p:nextCondLst>
+                <p:cond evt="onNext" delay="0">
+                  <p:tgtEl>
+                    <p:sldTgt/>
+                  </p:tgtEl>
+                </p:cond>
+              </p:nextCondLst>
+            </p:seq>
+          </p:childTnLst>
+        </p:cTn>
+      </p:par>
+    </p:tnLst>
+    <p:bldLst>
+      <p:bldP spid="9" grpId="0" animBg="1"/>
+      <p:bldP spid="10" grpId="0" animBg="1"/>
+      <p:bldP spid="11" grpId="0" animBg="1"/>
+    </p:bldLst>
+  </p:timing>
 </p:sld>
 </file>
 
@@ -7389,7 +10790,13 @@
   <p:cSld>
     <p:spTree>
       <p:nvGrpSpPr>
-        <p:cNvPr id="1" name=""/>
+        <p:cNvPr id="1" name="">
+          <a:extLst>
+            <a:ext uri="{FF2B5EF4-FFF2-40B4-BE49-F238E27FC236}">
+              <a16:creationId xmlns:a16="http://schemas.microsoft.com/office/drawing/2014/main" id="{C5F9D20F-1259-1DD4-66CE-2CBDC00607BF}"/>
+            </a:ext>
+          </a:extLst>
+        </p:cNvPr>
         <p:cNvGrpSpPr/>
         <p:nvPr/>
       </p:nvGrpSpPr>
@@ -7406,7 +10813,7 @@
           <p:cNvPr id="2" name="Titel 1">
             <a:extLst>
               <a:ext uri="{FF2B5EF4-FFF2-40B4-BE49-F238E27FC236}">
-                <a16:creationId xmlns:a16="http://schemas.microsoft.com/office/drawing/2014/main" id="{86AADDDC-CD07-D152-F98D-6AA7ABFFAE93}"/>
+                <a16:creationId xmlns:a16="http://schemas.microsoft.com/office/drawing/2014/main" id="{F38F1474-9419-C444-A28A-E12FABF05F5B}"/>
               </a:ext>
             </a:extLst>
           </p:cNvPr>
@@ -7424,33 +10831,8 @@
           <a:p>
             <a:r>
               <a:rPr lang="de-DE" dirty="0"/>
-              <a:t>5. Ausblick auf den folgenden Sprint</a:t>
-            </a:r>
-          </a:p>
-        </p:txBody>
-      </p:sp>
-      <p:sp>
-        <p:nvSpPr>
-          <p:cNvPr id="3" name="Inhaltsplatzhalter 2">
-            <a:extLst>
-              <a:ext uri="{FF2B5EF4-FFF2-40B4-BE49-F238E27FC236}">
-                <a16:creationId xmlns:a16="http://schemas.microsoft.com/office/drawing/2014/main" id="{5E854AF4-9867-751A-7A8B-348123EF4C14}"/>
-              </a:ext>
-            </a:extLst>
-          </p:cNvPr>
-          <p:cNvSpPr>
-            <a:spLocks noGrp="1"/>
-          </p:cNvSpPr>
-          <p:nvPr>
-            <p:ph idx="1"/>
-          </p:nvPr>
-        </p:nvSpPr>
-        <p:spPr/>
-        <p:txBody>
-          <a:bodyPr/>
-          <a:lstStyle/>
-          <a:p>
-            <a:endParaRPr lang="de-DE"/>
+              <a:t>4. Detailplanung</a:t>
+            </a:r>
           </a:p>
         </p:txBody>
       </p:sp>
@@ -7459,7 +10841,7 @@
           <p:cNvPr id="4" name="Datumsplatzhalter 3">
             <a:extLst>
               <a:ext uri="{FF2B5EF4-FFF2-40B4-BE49-F238E27FC236}">
-                <a16:creationId xmlns:a16="http://schemas.microsoft.com/office/drawing/2014/main" id="{305A6BE5-5A63-7D28-E770-729A20618D33}"/>
+                <a16:creationId xmlns:a16="http://schemas.microsoft.com/office/drawing/2014/main" id="{A61AD540-48A5-C28A-EAB3-FC9343A26E5E}"/>
               </a:ext>
             </a:extLst>
           </p:cNvPr>
@@ -7488,7 +10870,7 @@
           <p:cNvPr id="5" name="Foliennummernplatzhalter 4">
             <a:extLst>
               <a:ext uri="{FF2B5EF4-FFF2-40B4-BE49-F238E27FC236}">
-                <a16:creationId xmlns:a16="http://schemas.microsoft.com/office/drawing/2014/main" id="{E28ABC24-8900-E378-E502-62B817D571F6}"/>
+                <a16:creationId xmlns:a16="http://schemas.microsoft.com/office/drawing/2014/main" id="{0FCCF7DF-8E4D-8D49-043D-1CEC9B567358}"/>
               </a:ext>
             </a:extLst>
           </p:cNvPr>
@@ -7512,10 +10894,782 @@
           </a:p>
         </p:txBody>
       </p:sp>
+      <p:graphicFrame>
+        <p:nvGraphicFramePr>
+          <p:cNvPr id="3" name="Inhaltsplatzhalter 2">
+            <a:extLst>
+              <a:ext uri="{FF2B5EF4-FFF2-40B4-BE49-F238E27FC236}">
+                <a16:creationId xmlns:a16="http://schemas.microsoft.com/office/drawing/2014/main" id="{FAC168E6-FD48-9C86-CD4E-55F23F4D96A5}"/>
+              </a:ext>
+            </a:extLst>
+          </p:cNvPr>
+          <p:cNvGraphicFramePr>
+            <a:graphicFrameLocks noGrp="1"/>
+          </p:cNvGraphicFramePr>
+          <p:nvPr>
+            <p:ph idx="1"/>
+            <p:extLst>
+              <p:ext uri="{D42A27DB-BD31-4B8C-83A1-F6EECF244321}">
+                <p14:modId xmlns:p14="http://schemas.microsoft.com/office/powerpoint/2010/main" val="471433078"/>
+              </p:ext>
+            </p:extLst>
+          </p:nvPr>
+        </p:nvGraphicFramePr>
+        <p:xfrm>
+          <a:off x="762000" y="1860487"/>
+          <a:ext cx="8961423" cy="4348100"/>
+        </p:xfrm>
+        <a:graphic>
+          <a:graphicData uri="http://schemas.openxmlformats.org/drawingml/2006/table">
+            <a:tbl>
+              <a:tblPr firstRow="1" bandRow="1">
+                <a:tableStyleId>{5C22544A-7EE6-4342-B048-85BDC9FD1C3A}</a:tableStyleId>
+              </a:tblPr>
+              <a:tblGrid>
+                <a:gridCol w="3810675">
+                  <a:extLst>
+                    <a:ext uri="{9D8B030D-6E8A-4147-A177-3AD203B41FA5}">
+                      <a16:colId xmlns:a16="http://schemas.microsoft.com/office/drawing/2014/main" val="230851902"/>
+                    </a:ext>
+                  </a:extLst>
+                </a:gridCol>
+                <a:gridCol w="2321893">
+                  <a:extLst>
+                    <a:ext uri="{9D8B030D-6E8A-4147-A177-3AD203B41FA5}">
+                      <a16:colId xmlns:a16="http://schemas.microsoft.com/office/drawing/2014/main" val="2657664356"/>
+                    </a:ext>
+                  </a:extLst>
+                </a:gridCol>
+                <a:gridCol w="1733814">
+                  <a:extLst>
+                    <a:ext uri="{9D8B030D-6E8A-4147-A177-3AD203B41FA5}">
+                      <a16:colId xmlns:a16="http://schemas.microsoft.com/office/drawing/2014/main" val="4098082685"/>
+                    </a:ext>
+                  </a:extLst>
+                </a:gridCol>
+                <a:gridCol w="1095041">
+                  <a:extLst>
+                    <a:ext uri="{9D8B030D-6E8A-4147-A177-3AD203B41FA5}">
+                      <a16:colId xmlns:a16="http://schemas.microsoft.com/office/drawing/2014/main" val="2360363224"/>
+                    </a:ext>
+                  </a:extLst>
+                </a:gridCol>
+              </a:tblGrid>
+              <a:tr h="364002">
+                <a:tc>
+                  <a:txBody>
+                    <a:bodyPr/>
+                    <a:lstStyle/>
+                    <a:p>
+                      <a:r>
+                        <a:rPr lang="en-US" sz="1400" dirty="0"/>
+                        <a:t>Aufgabe</a:t>
+                      </a:r>
+                      <a:endParaRPr lang="de-DE" sz="1400" dirty="0"/>
+                    </a:p>
+                  </a:txBody>
+                  <a:tcPr/>
+                </a:tc>
+                <a:tc>
+                  <a:txBody>
+                    <a:bodyPr/>
+                    <a:lstStyle/>
+                    <a:p>
+                      <a:r>
+                        <a:rPr lang="en-US" sz="1400" dirty="0" err="1"/>
+                        <a:t>Zuständigkeit</a:t>
+                      </a:r>
+                      <a:endParaRPr lang="de-DE" sz="1400" dirty="0"/>
+                    </a:p>
+                  </a:txBody>
+                  <a:tcPr/>
+                </a:tc>
+                <a:tc>
+                  <a:txBody>
+                    <a:bodyPr/>
+                    <a:lstStyle/>
+                    <a:p>
+                      <a:r>
+                        <a:rPr lang="en-US" sz="1400" dirty="0" err="1"/>
+                        <a:t>Aufwand</a:t>
+                      </a:r>
+                      <a:endParaRPr lang="de-DE" sz="1400" dirty="0"/>
+                    </a:p>
+                  </a:txBody>
+                  <a:tcPr/>
+                </a:tc>
+                <a:tc>
+                  <a:txBody>
+                    <a:bodyPr/>
+                    <a:lstStyle/>
+                    <a:p>
+                      <a:r>
+                        <a:rPr lang="en-US" sz="1400" dirty="0"/>
+                        <a:t>Status</a:t>
+                      </a:r>
+                      <a:endParaRPr lang="de-DE" sz="1400" dirty="0"/>
+                    </a:p>
+                  </a:txBody>
+                  <a:tcPr/>
+                </a:tc>
+                <a:extLst>
+                  <a:ext uri="{0D108BD9-81ED-4DB2-BD59-A6C34878D82A}">
+                    <a16:rowId xmlns:a16="http://schemas.microsoft.com/office/drawing/2014/main" val="2749238170"/>
+                  </a:ext>
+                </a:extLst>
+              </a:tr>
+              <a:tr h="926116">
+                <a:tc>
+                  <a:txBody>
+                    <a:bodyPr/>
+                    <a:lstStyle/>
+                    <a:p>
+                      <a:r>
+                        <a:rPr lang="en-US" sz="1400" dirty="0" err="1"/>
+                        <a:t>Dokumentation</a:t>
+                      </a:r>
+                      <a:r>
+                        <a:rPr lang="en-US" sz="1400" dirty="0"/>
+                        <a:t> + </a:t>
+                      </a:r>
+                      <a:r>
+                        <a:rPr lang="en-US" sz="1400" dirty="0" err="1"/>
+                        <a:t>Organisation</a:t>
+                      </a:r>
+                      <a:endParaRPr lang="de-DE" sz="1400" dirty="0"/>
+                    </a:p>
+                  </a:txBody>
+                  <a:tcPr/>
+                </a:tc>
+                <a:tc>
+                  <a:txBody>
+                    <a:bodyPr/>
+                    <a:lstStyle/>
+                    <a:p>
+                      <a:r>
+                        <a:rPr lang="en-US" sz="1400" dirty="0"/>
+                        <a:t>Alle</a:t>
+                      </a:r>
+                      <a:endParaRPr lang="de-DE" sz="1400" dirty="0"/>
+                    </a:p>
+                  </a:txBody>
+                  <a:tcPr/>
+                </a:tc>
+                <a:tc>
+                  <a:txBody>
+                    <a:bodyPr/>
+                    <a:lstStyle/>
+                    <a:p>
+                      <a:r>
+                        <a:rPr lang="en-US" sz="1400" dirty="0"/>
+                        <a:t>18</a:t>
+                      </a:r>
+                    </a:p>
+                    <a:p>
+                      <a:r>
+                        <a:rPr lang="en-US" sz="1050" dirty="0"/>
+                        <a:t>(6h </a:t>
+                      </a:r>
+                      <a:r>
+                        <a:rPr lang="en-US" sz="1050" dirty="0" err="1"/>
+                        <a:t>Vorbereitung</a:t>
+                      </a:r>
+                      <a:r>
+                        <a:rPr lang="en-US" sz="1050" dirty="0"/>
+                        <a:t> des Sprint)</a:t>
+                      </a:r>
+                      <a:endParaRPr lang="de-DE" sz="1050" dirty="0"/>
+                    </a:p>
+                  </a:txBody>
+                  <a:tcPr/>
+                </a:tc>
+                <a:tc>
+                  <a:txBody>
+                    <a:bodyPr/>
+                    <a:lstStyle/>
+                    <a:p>
+                      <a:r>
+                        <a:rPr lang="en-US" sz="1400" dirty="0"/>
+                        <a:t>In Arbeit</a:t>
+                      </a:r>
+                      <a:endParaRPr lang="de-DE" sz="1400" dirty="0"/>
+                    </a:p>
+                  </a:txBody>
+                  <a:tcPr/>
+                </a:tc>
+                <a:extLst>
+                  <a:ext uri="{0D108BD9-81ED-4DB2-BD59-A6C34878D82A}">
+                    <a16:rowId xmlns:a16="http://schemas.microsoft.com/office/drawing/2014/main" val="432160553"/>
+                  </a:ext>
+                </a:extLst>
+              </a:tr>
+              <a:tr h="392695">
+                <a:tc>
+                  <a:txBody>
+                    <a:bodyPr/>
+                    <a:lstStyle/>
+                    <a:p>
+                      <a:r>
+                        <a:rPr lang="en-US" sz="1400" dirty="0" err="1"/>
+                        <a:t>Erstellen</a:t>
+                      </a:r>
+                      <a:r>
+                        <a:rPr lang="en-US" sz="1400" dirty="0"/>
+                        <a:t> Mockups u. Wireframes</a:t>
+                      </a:r>
+                      <a:endParaRPr lang="de-DE" sz="1400" dirty="0"/>
+                    </a:p>
+                  </a:txBody>
+                  <a:tcPr/>
+                </a:tc>
+                <a:tc>
+                  <a:txBody>
+                    <a:bodyPr/>
+                    <a:lstStyle/>
+                    <a:p>
+                      <a:r>
+                        <a:rPr lang="en-US" sz="1400" kern="1200" dirty="0">
+                          <a:solidFill>
+                            <a:schemeClr val="dk1"/>
+                          </a:solidFill>
+                          <a:latin typeface="+mn-lt"/>
+                          <a:ea typeface="+mn-ea"/>
+                          <a:cs typeface="+mn-cs"/>
+                        </a:rPr>
+                        <a:t>Vincent Knapp</a:t>
+                      </a:r>
+                      <a:endParaRPr lang="de-DE" sz="1400" kern="1200" dirty="0">
+                        <a:solidFill>
+                          <a:schemeClr val="dk1"/>
+                        </a:solidFill>
+                        <a:latin typeface="+mn-lt"/>
+                        <a:ea typeface="+mn-ea"/>
+                        <a:cs typeface="+mn-cs"/>
+                      </a:endParaRPr>
+                    </a:p>
+                  </a:txBody>
+                  <a:tcPr/>
+                </a:tc>
+                <a:tc>
+                  <a:txBody>
+                    <a:bodyPr/>
+                    <a:lstStyle/>
+                    <a:p>
+                      <a:r>
+                        <a:rPr lang="en-US" sz="1400" kern="1200" dirty="0">
+                          <a:solidFill>
+                            <a:schemeClr val="dk1"/>
+                          </a:solidFill>
+                          <a:latin typeface="+mn-lt"/>
+                          <a:ea typeface="+mn-ea"/>
+                          <a:cs typeface="+mn-cs"/>
+                        </a:rPr>
+                        <a:t>2</a:t>
+                      </a:r>
+                      <a:endParaRPr lang="de-DE" sz="1400" kern="1200" dirty="0">
+                        <a:solidFill>
+                          <a:schemeClr val="dk1"/>
+                        </a:solidFill>
+                        <a:latin typeface="+mn-lt"/>
+                        <a:ea typeface="+mn-ea"/>
+                        <a:cs typeface="+mn-cs"/>
+                      </a:endParaRPr>
+                    </a:p>
+                  </a:txBody>
+                  <a:tcPr/>
+                </a:tc>
+                <a:tc>
+                  <a:txBody>
+                    <a:bodyPr/>
+                    <a:lstStyle/>
+                    <a:p>
+                      <a:r>
+                        <a:rPr lang="en-US" sz="1400" dirty="0" err="1"/>
+                        <a:t>Erledigt</a:t>
+                      </a:r>
+                      <a:endParaRPr lang="de-DE" sz="1400" dirty="0"/>
+                    </a:p>
+                  </a:txBody>
+                  <a:tcPr/>
+                </a:tc>
+                <a:extLst>
+                  <a:ext uri="{0D108BD9-81ED-4DB2-BD59-A6C34878D82A}">
+                    <a16:rowId xmlns:a16="http://schemas.microsoft.com/office/drawing/2014/main" val="739622510"/>
+                  </a:ext>
+                </a:extLst>
+              </a:tr>
+              <a:tr h="506337">
+                <a:tc>
+                  <a:txBody>
+                    <a:bodyPr/>
+                    <a:lstStyle/>
+                    <a:p>
+                      <a:pPr marL="0" marR="0" lvl="0" indent="0" algn="l" defTabSz="914400" rtl="0" eaLnBrk="1" fontAlgn="auto" latinLnBrk="0" hangingPunct="1">
+                        <a:lnSpc>
+                          <a:spcPct val="100000"/>
+                        </a:lnSpc>
+                        <a:spcBef>
+                          <a:spcPts val="0"/>
+                        </a:spcBef>
+                        <a:spcAft>
+                          <a:spcPts val="0"/>
+                        </a:spcAft>
+                        <a:buClrTx/>
+                        <a:buSzTx/>
+                        <a:buFontTx/>
+                        <a:buNone/>
+                        <a:tabLst/>
+                        <a:defRPr/>
+                      </a:pPr>
+                      <a:r>
+                        <a:rPr lang="en-US" sz="1400" dirty="0"/>
+                        <a:t>Website “Menu-Karte” </a:t>
+                      </a:r>
+                      <a:r>
+                        <a:rPr lang="en-US" sz="1400" dirty="0" err="1"/>
+                        <a:t>erstellen</a:t>
+                      </a:r>
+                      <a:endParaRPr lang="en-US" sz="1400" dirty="0"/>
+                    </a:p>
+                  </a:txBody>
+                  <a:tcPr/>
+                </a:tc>
+                <a:tc>
+                  <a:txBody>
+                    <a:bodyPr/>
+                    <a:lstStyle/>
+                    <a:p>
+                      <a:r>
+                        <a:rPr lang="en-US" sz="1400" dirty="0"/>
+                        <a:t>Dennis Haaf</a:t>
+                      </a:r>
+                      <a:br>
+                        <a:rPr lang="en-US" sz="1400" dirty="0"/>
+                      </a:br>
+                      <a:r>
+                        <a:rPr lang="en-US" sz="1400" dirty="0"/>
+                        <a:t>Vincent Knapp</a:t>
+                      </a:r>
+                      <a:endParaRPr lang="de-DE" sz="1400" dirty="0"/>
+                    </a:p>
+                  </a:txBody>
+                  <a:tcPr/>
+                </a:tc>
+                <a:tc>
+                  <a:txBody>
+                    <a:bodyPr/>
+                    <a:lstStyle/>
+                    <a:p>
+                      <a:r>
+                        <a:rPr lang="en-US" sz="1400" dirty="0"/>
+                        <a:t>8</a:t>
+                      </a:r>
+                      <a:endParaRPr lang="de-DE" sz="1400" dirty="0"/>
+                    </a:p>
+                  </a:txBody>
+                  <a:tcPr/>
+                </a:tc>
+                <a:tc>
+                  <a:txBody>
+                    <a:bodyPr/>
+                    <a:lstStyle/>
+                    <a:p>
+                      <a:endParaRPr lang="de-DE" sz="1400" dirty="0"/>
+                    </a:p>
+                  </a:txBody>
+                  <a:tcPr/>
+                </a:tc>
+                <a:extLst>
+                  <a:ext uri="{0D108BD9-81ED-4DB2-BD59-A6C34878D82A}">
+                    <a16:rowId xmlns:a16="http://schemas.microsoft.com/office/drawing/2014/main" val="740267785"/>
+                  </a:ext>
+                </a:extLst>
+              </a:tr>
+              <a:tr h="628278">
+                <a:tc>
+                  <a:txBody>
+                    <a:bodyPr/>
+                    <a:lstStyle/>
+                    <a:p>
+                      <a:r>
+                        <a:rPr lang="en-US" sz="1400" dirty="0" err="1"/>
+                        <a:t>Datenbank</a:t>
+                      </a:r>
+                      <a:r>
+                        <a:rPr lang="en-US" sz="1400" dirty="0"/>
+                        <a:t> “Menu-Karte”</a:t>
+                      </a:r>
+                      <a:endParaRPr lang="de-DE" sz="1400" dirty="0"/>
+                    </a:p>
+                  </a:txBody>
+                  <a:tcPr/>
+                </a:tc>
+                <a:tc>
+                  <a:txBody>
+                    <a:bodyPr/>
+                    <a:lstStyle/>
+                    <a:p>
+                      <a:r>
+                        <a:rPr lang="en-US" sz="1400" dirty="0"/>
+                        <a:t>Dennis Haaf</a:t>
+                      </a:r>
+                    </a:p>
+                    <a:p>
+                      <a:r>
+                        <a:rPr lang="en-US" sz="1400" dirty="0"/>
+                        <a:t>Vincent Knapp</a:t>
+                      </a:r>
+                      <a:endParaRPr lang="de-DE" sz="1400" dirty="0"/>
+                    </a:p>
+                  </a:txBody>
+                  <a:tcPr/>
+                </a:tc>
+                <a:tc>
+                  <a:txBody>
+                    <a:bodyPr/>
+                    <a:lstStyle/>
+                    <a:p>
+                      <a:r>
+                        <a:rPr lang="en-US" sz="1400" dirty="0"/>
+                        <a:t>1</a:t>
+                      </a:r>
+                      <a:endParaRPr lang="de-DE" sz="1400" dirty="0"/>
+                    </a:p>
+                  </a:txBody>
+                  <a:tcPr/>
+                </a:tc>
+                <a:tc>
+                  <a:txBody>
+                    <a:bodyPr/>
+                    <a:lstStyle/>
+                    <a:p>
+                      <a:endParaRPr lang="de-DE" sz="1400" dirty="0"/>
+                    </a:p>
+                  </a:txBody>
+                  <a:tcPr/>
+                </a:tc>
+                <a:extLst>
+                  <a:ext uri="{0D108BD9-81ED-4DB2-BD59-A6C34878D82A}">
+                    <a16:rowId xmlns:a16="http://schemas.microsoft.com/office/drawing/2014/main" val="2603736860"/>
+                  </a:ext>
+                </a:extLst>
+              </a:tr>
+              <a:tr h="482529">
+                <a:tc>
+                  <a:txBody>
+                    <a:bodyPr/>
+                    <a:lstStyle/>
+                    <a:p>
+                      <a:r>
+                        <a:rPr lang="en-US" sz="1400" dirty="0" err="1"/>
+                        <a:t>Einführung</a:t>
+                      </a:r>
+                      <a:r>
+                        <a:rPr lang="en-US" sz="1400" dirty="0"/>
+                        <a:t> in </a:t>
+                      </a:r>
+                      <a:r>
+                        <a:rPr lang="en-US" sz="1400" dirty="0" err="1"/>
+                        <a:t>Blazor</a:t>
+                      </a:r>
+                      <a:r>
+                        <a:rPr lang="en-US" sz="1400" dirty="0"/>
+                        <a:t> und C# Coding</a:t>
+                      </a:r>
+                      <a:endParaRPr lang="de-DE" sz="1400" dirty="0"/>
+                    </a:p>
+                  </a:txBody>
+                  <a:tcPr/>
+                </a:tc>
+                <a:tc>
+                  <a:txBody>
+                    <a:bodyPr/>
+                    <a:lstStyle/>
+                    <a:p>
+                      <a:r>
+                        <a:rPr lang="en-US" sz="1400" dirty="0"/>
+                        <a:t>Alle</a:t>
+                      </a:r>
+                    </a:p>
+                  </a:txBody>
+                  <a:tcPr/>
+                </a:tc>
+                <a:tc>
+                  <a:txBody>
+                    <a:bodyPr/>
+                    <a:lstStyle/>
+                    <a:p>
+                      <a:r>
+                        <a:rPr lang="en-US" sz="1400" dirty="0"/>
+                        <a:t>4</a:t>
+                      </a:r>
+                      <a:endParaRPr lang="de-DE" sz="1400" dirty="0"/>
+                    </a:p>
+                  </a:txBody>
+                  <a:tcPr/>
+                </a:tc>
+                <a:tc>
+                  <a:txBody>
+                    <a:bodyPr/>
+                    <a:lstStyle/>
+                    <a:p>
+                      <a:r>
+                        <a:rPr lang="en-US" sz="1400" dirty="0" err="1"/>
+                        <a:t>Erledigt</a:t>
+                      </a:r>
+                      <a:endParaRPr lang="de-DE" sz="1400" dirty="0"/>
+                    </a:p>
+                  </a:txBody>
+                  <a:tcPr/>
+                </a:tc>
+                <a:extLst>
+                  <a:ext uri="{0D108BD9-81ED-4DB2-BD59-A6C34878D82A}">
+                    <a16:rowId xmlns:a16="http://schemas.microsoft.com/office/drawing/2014/main" val="4252090113"/>
+                  </a:ext>
+                </a:extLst>
+              </a:tr>
+              <a:tr h="488887">
+                <a:tc>
+                  <a:txBody>
+                    <a:bodyPr/>
+                    <a:lstStyle/>
+                    <a:p>
+                      <a:r>
+                        <a:rPr lang="en-US" sz="1400" dirty="0"/>
+                        <a:t>Website “</a:t>
+                      </a:r>
+                      <a:r>
+                        <a:rPr lang="en-US" sz="1400" dirty="0" err="1"/>
+                        <a:t>Warenkorb</a:t>
+                      </a:r>
+                      <a:r>
+                        <a:rPr lang="en-US" sz="1400" dirty="0"/>
+                        <a:t>”</a:t>
+                      </a:r>
+                      <a:endParaRPr lang="de-DE" sz="1400" dirty="0"/>
+                    </a:p>
+                  </a:txBody>
+                  <a:tcPr/>
+                </a:tc>
+                <a:tc>
+                  <a:txBody>
+                    <a:bodyPr/>
+                    <a:lstStyle/>
+                    <a:p>
+                      <a:r>
+                        <a:rPr lang="en-US" sz="1400" dirty="0"/>
+                        <a:t>Hans </a:t>
+                      </a:r>
+                      <a:r>
+                        <a:rPr lang="en-US" sz="1400" dirty="0" err="1"/>
+                        <a:t>Bloching</a:t>
+                      </a:r>
+                      <a:endParaRPr lang="en-US" sz="1400" dirty="0"/>
+                    </a:p>
+                    <a:p>
+                      <a:r>
+                        <a:rPr lang="en-US" sz="1400" dirty="0"/>
+                        <a:t>Rene Weber</a:t>
+                      </a:r>
+                      <a:endParaRPr lang="de-DE" sz="1400" dirty="0"/>
+                    </a:p>
+                  </a:txBody>
+                  <a:tcPr/>
+                </a:tc>
+                <a:tc>
+                  <a:txBody>
+                    <a:bodyPr/>
+                    <a:lstStyle/>
+                    <a:p>
+                      <a:r>
+                        <a:rPr lang="en-US" sz="1400" dirty="0"/>
+                        <a:t>12</a:t>
+                      </a:r>
+                      <a:endParaRPr lang="de-DE" sz="1400" dirty="0"/>
+                    </a:p>
+                  </a:txBody>
+                  <a:tcPr/>
+                </a:tc>
+                <a:tc>
+                  <a:txBody>
+                    <a:bodyPr/>
+                    <a:lstStyle/>
+                    <a:p>
+                      <a:endParaRPr lang="de-DE" sz="1400" dirty="0"/>
+                    </a:p>
+                  </a:txBody>
+                  <a:tcPr/>
+                </a:tc>
+                <a:extLst>
+                  <a:ext uri="{0D108BD9-81ED-4DB2-BD59-A6C34878D82A}">
+                    <a16:rowId xmlns:a16="http://schemas.microsoft.com/office/drawing/2014/main" val="1091053033"/>
+                  </a:ext>
+                </a:extLst>
+              </a:tr>
+              <a:tr h="450561">
+                <a:tc>
+                  <a:txBody>
+                    <a:bodyPr/>
+                    <a:lstStyle/>
+                    <a:p>
+                      <a:r>
+                        <a:rPr lang="en-US" sz="1400" dirty="0" err="1"/>
+                        <a:t>Datenbank</a:t>
+                      </a:r>
+                      <a:r>
+                        <a:rPr lang="en-US" sz="1400" dirty="0"/>
+                        <a:t> “</a:t>
+                      </a:r>
+                      <a:r>
+                        <a:rPr lang="en-US" sz="1400" dirty="0" err="1"/>
+                        <a:t>Warenkorb</a:t>
+                      </a:r>
+                      <a:r>
+                        <a:rPr lang="en-US" sz="1400" dirty="0"/>
+                        <a:t>”</a:t>
+                      </a:r>
+                      <a:endParaRPr lang="de-DE" sz="1400" dirty="0"/>
+                    </a:p>
+                  </a:txBody>
+                  <a:tcPr/>
+                </a:tc>
+                <a:tc>
+                  <a:txBody>
+                    <a:bodyPr/>
+                    <a:lstStyle/>
+                    <a:p>
+                      <a:r>
+                        <a:rPr lang="en-US" sz="1400" dirty="0"/>
+                        <a:t>Hans </a:t>
+                      </a:r>
+                      <a:r>
+                        <a:rPr lang="en-US" sz="1400" dirty="0" err="1"/>
+                        <a:t>Bloching</a:t>
+                      </a:r>
+                      <a:endParaRPr lang="en-US" sz="1400" dirty="0"/>
+                    </a:p>
+                    <a:p>
+                      <a:r>
+                        <a:rPr lang="en-US" sz="1400" dirty="0"/>
+                        <a:t>Rene Weber</a:t>
+                      </a:r>
+                      <a:endParaRPr lang="de-DE" sz="1400" dirty="0"/>
+                    </a:p>
+                  </a:txBody>
+                  <a:tcPr/>
+                </a:tc>
+                <a:tc>
+                  <a:txBody>
+                    <a:bodyPr/>
+                    <a:lstStyle/>
+                    <a:p>
+                      <a:r>
+                        <a:rPr lang="en-US" sz="1400" dirty="0"/>
+                        <a:t>3</a:t>
+                      </a:r>
+                      <a:endParaRPr lang="de-DE" sz="1400" dirty="0"/>
+                    </a:p>
+                  </a:txBody>
+                  <a:tcPr/>
+                </a:tc>
+                <a:tc>
+                  <a:txBody>
+                    <a:bodyPr/>
+                    <a:lstStyle/>
+                    <a:p>
+                      <a:endParaRPr lang="de-DE" sz="1400" dirty="0"/>
+                    </a:p>
+                  </a:txBody>
+                  <a:tcPr/>
+                </a:tc>
+                <a:extLst>
+                  <a:ext uri="{0D108BD9-81ED-4DB2-BD59-A6C34878D82A}">
+                    <a16:rowId xmlns:a16="http://schemas.microsoft.com/office/drawing/2014/main" val="2446957633"/>
+                  </a:ext>
+                </a:extLst>
+              </a:tr>
+            </a:tbl>
+          </a:graphicData>
+        </a:graphic>
+      </p:graphicFrame>
+      <p:pic>
+        <p:nvPicPr>
+          <p:cNvPr id="7" name="Grafik 6">
+            <a:extLst>
+              <a:ext uri="{FF2B5EF4-FFF2-40B4-BE49-F238E27FC236}">
+                <a16:creationId xmlns:a16="http://schemas.microsoft.com/office/drawing/2014/main" id="{F447DF4A-5353-B320-B18E-CE9C17911E47}"/>
+              </a:ext>
+            </a:extLst>
+          </p:cNvPr>
+          <p:cNvPicPr>
+            <a:picLocks noChangeAspect="1"/>
+          </p:cNvPicPr>
+          <p:nvPr/>
+        </p:nvPicPr>
+        <p:blipFill>
+          <a:blip r:embed="rId2"/>
+          <a:stretch>
+            <a:fillRect/>
+          </a:stretch>
+        </p:blipFill>
+        <p:spPr>
+          <a:xfrm>
+            <a:off x="6879460" y="6208587"/>
+            <a:ext cx="1738967" cy="451906"/>
+          </a:xfrm>
+          <a:prstGeom prst="rect">
+            <a:avLst/>
+          </a:prstGeom>
+        </p:spPr>
+      </p:pic>
+      <p:sp>
+        <p:nvSpPr>
+          <p:cNvPr id="12" name="Textfeld 11">
+            <a:extLst>
+              <a:ext uri="{FF2B5EF4-FFF2-40B4-BE49-F238E27FC236}">
+                <a16:creationId xmlns:a16="http://schemas.microsoft.com/office/drawing/2014/main" id="{6C748691-0350-4F12-29B1-58781F9859C7}"/>
+              </a:ext>
+            </a:extLst>
+          </p:cNvPr>
+          <p:cNvSpPr txBox="1"/>
+          <p:nvPr/>
+        </p:nvSpPr>
+        <p:spPr>
+          <a:xfrm>
+            <a:off x="6901218" y="6248432"/>
+            <a:ext cx="1524000" cy="369332"/>
+          </a:xfrm>
+          <a:prstGeom prst="rect">
+            <a:avLst/>
+          </a:prstGeom>
+          <a:noFill/>
+        </p:spPr>
+        <p:txBody>
+          <a:bodyPr wrap="square" rtlCol="0">
+            <a:spAutoFit/>
+          </a:bodyPr>
+          <a:lstStyle/>
+          <a:p>
+            <a:r>
+              <a:rPr lang="en-US" dirty="0">
+                <a:solidFill>
+                  <a:schemeClr val="bg1"/>
+                </a:solidFill>
+              </a:rPr>
+              <a:t>48</a:t>
+            </a:r>
+            <a:endParaRPr lang="de-DE" dirty="0">
+              <a:solidFill>
+                <a:schemeClr val="bg1"/>
+              </a:solidFill>
+            </a:endParaRPr>
+          </a:p>
+        </p:txBody>
+      </p:sp>
     </p:spTree>
     <p:extLst>
       <p:ext uri="{BB962C8B-B14F-4D97-AF65-F5344CB8AC3E}">
-        <p14:creationId xmlns:p14="http://schemas.microsoft.com/office/powerpoint/2010/main" val="3562051256"/>
+        <p14:creationId xmlns:p14="http://schemas.microsoft.com/office/powerpoint/2010/main" val="2023827376"/>
       </p:ext>
     </p:extLst>
   </p:cSld>

</xml_diff>

<commit_message>
Anpassung Product Backlog + Sprint PP
</commit_message>
<xml_diff>
--- a/Dokumente/Sprint-Backlog/Sprint-Backlog1.pptx
+++ b/Dokumente/Sprint-Backlog/Sprint-Backlog1.pptx
@@ -5,7 +5,7 @@
     <p:sldMasterId id="2147483751" r:id="rId1"/>
   </p:sldMasterIdLst>
   <p:notesMasterIdLst>
-    <p:notesMasterId r:id="rId20"/>
+    <p:notesMasterId r:id="rId22"/>
   </p:notesMasterIdLst>
   <p:sldIdLst>
     <p:sldId id="256" r:id="rId2"/>
@@ -26,6 +26,8 @@
     <p:sldId id="262" r:id="rId17"/>
     <p:sldId id="263" r:id="rId18"/>
     <p:sldId id="264" r:id="rId19"/>
+    <p:sldId id="275" r:id="rId20"/>
+    <p:sldId id="274" r:id="rId21"/>
   </p:sldIdLst>
   <p:sldSz cx="12192000" cy="6858000"/>
   <p:notesSz cx="6858000" cy="9144000"/>
@@ -232,7 +234,17 @@
     </c:title>
     <c:autoTitleDeleted val="0"/>
     <c:plotArea>
-      <c:layout/>
+      <c:layout>
+        <c:manualLayout>
+          <c:layoutTarget val="inner"/>
+          <c:xMode val="edge"/>
+          <c:yMode val="edge"/>
+          <c:x val="5.2313658352699098E-2"/>
+          <c:y val="0.13784236237959871"/>
+          <c:w val="0.91848069800603815"/>
+          <c:h val="0.80242463729334157"/>
+        </c:manualLayout>
+      </c:layout>
       <c:barChart>
         <c:barDir val="col"/>
         <c:grouping val="stacked"/>
@@ -252,7 +264,7 @@
           <c:invertIfNegative val="0"/>
           <c:cat>
             <c:strRef>
-              <c:f>Tabelle1!$A$7:$D$7</c:f>
+              <c:f>Tabelle1!$A$12:$D$12</c:f>
               <c:strCache>
                 <c:ptCount val="4"/>
                 <c:pt idx="0">
@@ -272,18 +284,18 @@
           </c:cat>
           <c:val>
             <c:numRef>
-              <c:f>Tabelle1!$A$8:$D$8</c:f>
+              <c:f>Tabelle1!$A$13:$D$13</c:f>
               <c:numCache>
                 <c:formatCode>General</c:formatCode>
                 <c:ptCount val="4"/>
                 <c:pt idx="0">
-                  <c:v>13</c:v>
+                  <c:v>13.5</c:v>
                 </c:pt>
                 <c:pt idx="1">
-                  <c:v>10</c:v>
+                  <c:v>9.5</c:v>
                 </c:pt>
                 <c:pt idx="2">
-                  <c:v>13</c:v>
+                  <c:v>13.5</c:v>
                 </c:pt>
                 <c:pt idx="3">
                   <c:v>12</c:v>
@@ -293,7 +305,7 @@
           </c:val>
           <c:extLst>
             <c:ext xmlns:c16="http://schemas.microsoft.com/office/drawing/2014/chart" uri="{C3380CC4-5D6E-409C-BE32-E72D297353CC}">
-              <c16:uniqueId val="{00000000-FA2F-4567-A336-028964AED735}"/>
+              <c16:uniqueId val="{00000000-CB2B-4B7E-8120-2FEA4C91E37E}"/>
             </c:ext>
           </c:extLst>
         </c:ser>
@@ -1086,7 +1098,7 @@
           <a:p>
             <a:fld id="{7628164F-130E-49E7-B4EA-740541215FF9}" type="datetimeFigureOut">
               <a:rPr lang="de-DE" smtClean="0"/>
-              <a:t>28.11.2024</a:t>
+              <a:t>29.11.2024</a:t>
             </a:fld>
             <a:endParaRPr lang="de-DE"/>
           </a:p>
@@ -1500,7 +1512,7 @@
           <a:p>
             <a:fld id="{EFF128A2-C7E8-4B7B-8091-9AC752F728F8}" type="datetime1">
               <a:rPr lang="de-DE" smtClean="0"/>
-              <a:t>28.11.2024</a:t>
+              <a:t>29.11.2024</a:t>
             </a:fld>
             <a:endParaRPr lang="en-US"/>
           </a:p>
@@ -1698,7 +1710,7 @@
           <a:p>
             <a:fld id="{CD278108-7565-4086-A563-4BA2E64958FD}" type="datetime1">
               <a:rPr lang="de-DE" smtClean="0"/>
-              <a:t>28.11.2024</a:t>
+              <a:t>29.11.2024</a:t>
             </a:fld>
             <a:endParaRPr lang="en-US"/>
           </a:p>
@@ -1906,7 +1918,7 @@
           <a:p>
             <a:fld id="{E66CCB26-F45E-4B69-82BE-D569C28446C1}" type="datetime1">
               <a:rPr lang="de-DE" smtClean="0"/>
-              <a:t>28.11.2024</a:t>
+              <a:t>29.11.2024</a:t>
             </a:fld>
             <a:endParaRPr lang="en-US"/>
           </a:p>
@@ -2110,7 +2122,7 @@
           <a:p>
             <a:fld id="{42B45B56-1D88-4042-8DF0-EB6B41B710D3}" type="datetime1">
               <a:rPr lang="de-DE" smtClean="0"/>
-              <a:t>28.11.2024</a:t>
+              <a:t>29.11.2024</a:t>
             </a:fld>
             <a:endParaRPr lang="en-US"/>
           </a:p>
@@ -2385,7 +2397,7 @@
           <a:p>
             <a:fld id="{63213392-7725-4DB0-A75F-BB511BA574DC}" type="datetime1">
               <a:rPr lang="de-DE" smtClean="0"/>
-              <a:t>28.11.2024</a:t>
+              <a:t>29.11.2024</a:t>
             </a:fld>
             <a:endParaRPr lang="en-US"/>
           </a:p>
@@ -2650,7 +2662,7 @@
           <a:p>
             <a:fld id="{12AE7323-5CDD-4051-9975-1729D84443C7}" type="datetime1">
               <a:rPr lang="de-DE" smtClean="0"/>
-              <a:t>28.11.2024</a:t>
+              <a:t>29.11.2024</a:t>
             </a:fld>
             <a:endParaRPr lang="en-US"/>
           </a:p>
@@ -3062,7 +3074,7 @@
           <a:p>
             <a:fld id="{75919FF8-1369-4F22-8739-0971D22D8076}" type="datetime1">
               <a:rPr lang="de-DE" smtClean="0"/>
-              <a:t>28.11.2024</a:t>
+              <a:t>29.11.2024</a:t>
             </a:fld>
             <a:endParaRPr lang="en-US"/>
           </a:p>
@@ -3203,7 +3215,7 @@
           <a:p>
             <a:fld id="{07445AF5-82F2-43C2-816E-A9BEF34D89B7}" type="datetime1">
               <a:rPr lang="de-DE" smtClean="0"/>
-              <a:t>28.11.2024</a:t>
+              <a:t>29.11.2024</a:t>
             </a:fld>
             <a:endParaRPr lang="en-US"/>
           </a:p>
@@ -3316,7 +3328,7 @@
           <a:p>
             <a:fld id="{84700FD4-A8C8-481E-B7C9-06459B544445}" type="datetime1">
               <a:rPr lang="de-DE" smtClean="0"/>
-              <a:t>28.11.2024</a:t>
+              <a:t>29.11.2024</a:t>
             </a:fld>
             <a:endParaRPr lang="en-US"/>
           </a:p>
@@ -3628,7 +3640,7 @@
           <a:p>
             <a:fld id="{225DF808-C4B8-42BA-B4B9-08D42756061A}" type="datetime1">
               <a:rPr lang="de-DE" smtClean="0"/>
-              <a:t>28.11.2024</a:t>
+              <a:t>29.11.2024</a:t>
             </a:fld>
             <a:endParaRPr lang="en-US"/>
           </a:p>
@@ -3919,7 +3931,7 @@
           <a:p>
             <a:fld id="{C36BBF2E-DB4C-4E4C-81C8-BB88CDC14250}" type="datetime1">
               <a:rPr lang="de-DE" smtClean="0"/>
-              <a:t>28.11.2024</a:t>
+              <a:t>29.11.2024</a:t>
             </a:fld>
             <a:endParaRPr lang="en-US"/>
           </a:p>
@@ -4674,7 +4686,7 @@
           <a:p>
             <a:fld id="{7C1C68C6-DBC0-4157-B769-7CB85FE6437C}" type="datetime1">
               <a:rPr lang="de-DE" smtClean="0"/>
-              <a:t>28.11.2024</a:t>
+              <a:t>29.11.2024</a:t>
             </a:fld>
             <a:endParaRPr lang="en-US" dirty="0"/>
           </a:p>
@@ -5890,7 +5902,7 @@
           <a:p>
             <a:fld id="{42B45B56-1D88-4042-8DF0-EB6B41B710D3}" type="datetime1">
               <a:rPr lang="de-DE" smtClean="0"/>
-              <a:t>28.11.2024</a:t>
+              <a:t>29.11.2024</a:t>
             </a:fld>
             <a:endParaRPr lang="en-US"/>
           </a:p>
@@ -6475,7 +6487,7 @@
           <a:p>
             <a:fld id="{42B45B56-1D88-4042-8DF0-EB6B41B710D3}" type="datetime1">
               <a:rPr lang="de-DE" smtClean="0"/>
-              <a:t>28.11.2024</a:t>
+              <a:t>29.11.2024</a:t>
             </a:fld>
             <a:endParaRPr lang="en-US"/>
           </a:p>
@@ -6526,14 +6538,14 @@
             <p:ph idx="1"/>
             <p:extLst>
               <p:ext uri="{D42A27DB-BD31-4B8C-83A1-F6EECF244321}">
-                <p14:modId xmlns:p14="http://schemas.microsoft.com/office/powerpoint/2010/main" val="471433078"/>
+                <p14:modId xmlns:p14="http://schemas.microsoft.com/office/powerpoint/2010/main" val="2690394352"/>
               </p:ext>
             </p:extLst>
           </p:nvPr>
         </p:nvGraphicFramePr>
         <p:xfrm>
           <a:off x="762000" y="1860487"/>
-          <a:ext cx="8961423" cy="4348100"/>
+          <a:ext cx="8961423" cy="4467451"/>
         </p:xfrm>
         <a:graphic>
           <a:graphicData uri="http://schemas.openxmlformats.org/drawingml/2006/table">
@@ -6578,7 +6590,7 @@
                     <a:lstStyle/>
                     <a:p>
                       <a:r>
-                        <a:rPr lang="en-US" sz="1400" dirty="0"/>
+                        <a:rPr lang="en-US" sz="1400"/>
                         <a:t>Aufgabe</a:t>
                       </a:r>
                       <a:endParaRPr lang="de-DE" sz="1400" dirty="0"/>
@@ -6592,7 +6604,7 @@
                     <a:lstStyle/>
                     <a:p>
                       <a:r>
-                        <a:rPr lang="en-US" sz="1400" dirty="0" err="1"/>
+                        <a:rPr lang="en-US" sz="1400"/>
                         <a:t>Zuständigkeit</a:t>
                       </a:r>
                       <a:endParaRPr lang="de-DE" sz="1400" dirty="0"/>
@@ -6606,7 +6618,7 @@
                     <a:lstStyle/>
                     <a:p>
                       <a:r>
-                        <a:rPr lang="en-US" sz="1400" dirty="0" err="1"/>
+                        <a:rPr lang="en-US" sz="1400"/>
                         <a:t>Aufwand</a:t>
                       </a:r>
                       <a:endParaRPr lang="de-DE" sz="1400" dirty="0"/>
@@ -6620,7 +6632,7 @@
                     <a:lstStyle/>
                     <a:p>
                       <a:r>
-                        <a:rPr lang="en-US" sz="1400" dirty="0"/>
+                        <a:rPr lang="en-US" sz="1400"/>
                         <a:t>Status</a:t>
                       </a:r>
                       <a:endParaRPr lang="de-DE" sz="1400" dirty="0"/>
@@ -6641,16 +6653,8 @@
                     <a:lstStyle/>
                     <a:p>
                       <a:r>
-                        <a:rPr lang="en-US" sz="1400" dirty="0" err="1"/>
-                        <a:t>Dokumentation</a:t>
-                      </a:r>
-                      <a:r>
-                        <a:rPr lang="en-US" sz="1400" dirty="0"/>
-                        <a:t> + </a:t>
-                      </a:r>
-                      <a:r>
-                        <a:rPr lang="en-US" sz="1400" dirty="0" err="1"/>
-                        <a:t>Organisation</a:t>
+                        <a:rPr lang="en-US" sz="1400"/>
+                        <a:t>Dokumentation + Project Managment</a:t>
                       </a:r>
                       <a:endParaRPr lang="de-DE" sz="1400" dirty="0"/>
                     </a:p>
@@ -6663,7 +6667,7 @@
                     <a:lstStyle/>
                     <a:p>
                       <a:r>
-                        <a:rPr lang="en-US" sz="1400" dirty="0"/>
+                        <a:rPr lang="en-US" sz="1400"/>
                         <a:t>Alle</a:t>
                       </a:r>
                       <a:endParaRPr lang="de-DE" sz="1400" dirty="0"/>
@@ -6677,22 +6681,14 @@
                     <a:lstStyle/>
                     <a:p>
                       <a:r>
-                        <a:rPr lang="en-US" sz="1400" dirty="0"/>
+                        <a:rPr lang="en-US" sz="1400"/>
                         <a:t>18</a:t>
                       </a:r>
                     </a:p>
                     <a:p>
                       <a:r>
-                        <a:rPr lang="en-US" sz="1050" dirty="0"/>
-                        <a:t>(6h </a:t>
-                      </a:r>
-                      <a:r>
-                        <a:rPr lang="en-US" sz="1050" dirty="0" err="1"/>
-                        <a:t>Vorbereitung</a:t>
-                      </a:r>
-                      <a:r>
-                        <a:rPr lang="en-US" sz="1050" dirty="0"/>
-                        <a:t> des Sprint)</a:t>
+                        <a:rPr lang="en-US" sz="1050"/>
+                        <a:t>(6h Vorbereitung des Sprint)</a:t>
                       </a:r>
                       <a:endParaRPr lang="de-DE" sz="1050" dirty="0"/>
                     </a:p>
@@ -6705,8 +6701,8 @@
                     <a:lstStyle/>
                     <a:p>
                       <a:r>
-                        <a:rPr lang="en-US" sz="1400" dirty="0"/>
-                        <a:t>In Arbeit</a:t>
+                        <a:rPr lang="en-US" sz="1400" dirty="0" err="1"/>
+                        <a:t>Erledigt</a:t>
                       </a:r>
                       <a:endParaRPr lang="de-DE" sz="1400" dirty="0"/>
                     </a:p>
@@ -6719,19 +6715,15 @@
                   </a:ext>
                 </a:extLst>
               </a:tr>
-              <a:tr h="392695">
+              <a:tr h="408804">
                 <a:tc>
                   <a:txBody>
                     <a:bodyPr/>
                     <a:lstStyle/>
                     <a:p>
                       <a:r>
-                        <a:rPr lang="en-US" sz="1400" dirty="0" err="1"/>
-                        <a:t>Erstellen</a:t>
-                      </a:r>
-                      <a:r>
-                        <a:rPr lang="en-US" sz="1400" dirty="0"/>
-                        <a:t> Mockups u. Wireframes</a:t>
+                        <a:rPr lang="en-US" sz="1400"/>
+                        <a:t>Erstellen Mockups u. Wireframes</a:t>
                       </a:r>
                       <a:endParaRPr lang="de-DE" sz="1400" dirty="0"/>
                     </a:p>
@@ -6744,7 +6736,7 @@
                     <a:lstStyle/>
                     <a:p>
                       <a:r>
-                        <a:rPr lang="en-US" sz="1400" kern="1200" dirty="0">
+                        <a:rPr lang="en-US" sz="1400" kern="1200">
                           <a:solidFill>
                             <a:schemeClr val="dk1"/>
                           </a:solidFill>
@@ -6772,7 +6764,7 @@
                     <a:lstStyle/>
                     <a:p>
                       <a:r>
-                        <a:rPr lang="en-US" sz="1400" kern="1200" dirty="0">
+                        <a:rPr lang="en-US" sz="1400" kern="1200">
                           <a:solidFill>
                             <a:schemeClr val="dk1"/>
                           </a:solidFill>
@@ -6800,7 +6792,7 @@
                     <a:lstStyle/>
                     <a:p>
                       <a:r>
-                        <a:rPr lang="en-US" sz="1400" dirty="0" err="1"/>
+                        <a:rPr lang="en-US" sz="1400"/>
                         <a:t>Erledigt</a:t>
                       </a:r>
                       <a:endParaRPr lang="de-DE" sz="1400" dirty="0"/>
@@ -6877,7 +6869,7 @@
                     <a:lstStyle/>
                     <a:p>
                       <a:r>
-                        <a:rPr lang="en-US" sz="1400" dirty="0"/>
+                        <a:rPr lang="en-US" sz="1400"/>
                         <a:t>8</a:t>
                       </a:r>
                       <a:endParaRPr lang="de-DE" sz="1400" dirty="0"/>
@@ -6890,6 +6882,10 @@
                     <a:bodyPr/>
                     <a:lstStyle/>
                     <a:p>
+                      <a:r>
+                        <a:rPr lang="en-US" sz="1400" dirty="0" err="1"/>
+                        <a:t>Erledigt</a:t>
+                      </a:r>
                       <a:endParaRPr lang="de-DE" sz="1400" dirty="0"/>
                     </a:p>
                   </a:txBody>
@@ -6926,14 +6922,20 @@
                     <a:lstStyle/>
                     <a:p>
                       <a:r>
-                        <a:rPr lang="en-US" sz="1400" dirty="0"/>
-                        <a:t>Dennis Haaf</a:t>
+                        <a:rPr lang="en-US" sz="1400"/>
+                        <a:t>Vincent Knapp</a:t>
                       </a:r>
                     </a:p>
                     <a:p>
                       <a:r>
-                        <a:rPr lang="en-US" sz="1400" dirty="0"/>
-                        <a:t>Vincent Knapp</a:t>
+                        <a:rPr lang="en-US" sz="1400"/>
+                        <a:t>Hans Bloching</a:t>
+                      </a:r>
+                    </a:p>
+                    <a:p>
+                      <a:r>
+                        <a:rPr lang="en-US" sz="1400"/>
+                        <a:t>Rene Weber</a:t>
                       </a:r>
                       <a:endParaRPr lang="de-DE" sz="1400" dirty="0"/>
                     </a:p>
@@ -6946,8 +6948,8 @@
                     <a:lstStyle/>
                     <a:p>
                       <a:r>
-                        <a:rPr lang="en-US" sz="1400" dirty="0"/>
-                        <a:t>1</a:t>
+                        <a:rPr lang="en-US" sz="1400"/>
+                        <a:t>1,5</a:t>
                       </a:r>
                       <a:endParaRPr lang="de-DE" sz="1400" dirty="0"/>
                     </a:p>
@@ -6959,6 +6961,10 @@
                     <a:bodyPr/>
                     <a:lstStyle/>
                     <a:p>
+                      <a:r>
+                        <a:rPr lang="en-US" sz="1400" dirty="0" err="1"/>
+                        <a:t>Erledigt</a:t>
+                      </a:r>
                       <a:endParaRPr lang="de-DE" sz="1400" dirty="0"/>
                     </a:p>
                   </a:txBody>
@@ -6977,20 +6983,8 @@
                     <a:lstStyle/>
                     <a:p>
                       <a:r>
-                        <a:rPr lang="en-US" sz="1400" dirty="0" err="1"/>
-                        <a:t>Einführung</a:t>
-                      </a:r>
-                      <a:r>
-                        <a:rPr lang="en-US" sz="1400" dirty="0"/>
-                        <a:t> in </a:t>
-                      </a:r>
-                      <a:r>
-                        <a:rPr lang="en-US" sz="1400" dirty="0" err="1"/>
-                        <a:t>Blazor</a:t>
-                      </a:r>
-                      <a:r>
-                        <a:rPr lang="en-US" sz="1400" dirty="0"/>
-                        <a:t> und C# Coding</a:t>
+                        <a:rPr lang="en-US" sz="1400"/>
+                        <a:t>Einführung in Blazor und C# Coding</a:t>
                       </a:r>
                       <a:endParaRPr lang="de-DE" sz="1400" dirty="0"/>
                     </a:p>
@@ -7016,7 +7010,7 @@
                     <a:lstStyle/>
                     <a:p>
                       <a:r>
-                        <a:rPr lang="en-US" sz="1400" dirty="0"/>
+                        <a:rPr lang="en-US" sz="1400"/>
                         <a:t>4</a:t>
                       </a:r>
                       <a:endParaRPr lang="de-DE" sz="1400" dirty="0"/>
@@ -7030,7 +7024,7 @@
                     <a:lstStyle/>
                     <a:p>
                       <a:r>
-                        <a:rPr lang="en-US" sz="1400" dirty="0" err="1"/>
+                        <a:rPr lang="en-US" sz="1400"/>
                         <a:t>Erledigt</a:t>
                       </a:r>
                       <a:endParaRPr lang="de-DE" sz="1400" dirty="0"/>
@@ -7051,16 +7045,8 @@
                     <a:lstStyle/>
                     <a:p>
                       <a:r>
-                        <a:rPr lang="en-US" sz="1400" dirty="0"/>
-                        <a:t>Website “</a:t>
-                      </a:r>
-                      <a:r>
-                        <a:rPr lang="en-US" sz="1400" dirty="0" err="1"/>
-                        <a:t>Warenkorb</a:t>
-                      </a:r>
-                      <a:r>
-                        <a:rPr lang="en-US" sz="1400" dirty="0"/>
-                        <a:t>”</a:t>
+                        <a:rPr lang="en-US" sz="1400"/>
+                        <a:t>Website “Warenkorb”</a:t>
                       </a:r>
                       <a:endParaRPr lang="de-DE" sz="1400" dirty="0"/>
                     </a:p>
@@ -7073,18 +7059,13 @@
                     <a:lstStyle/>
                     <a:p>
                       <a:r>
-                        <a:rPr lang="en-US" sz="1400" dirty="0"/>
-                        <a:t>Hans </a:t>
-                      </a:r>
-                      <a:r>
-                        <a:rPr lang="en-US" sz="1400" dirty="0" err="1"/>
-                        <a:t>Bloching</a:t>
-                      </a:r>
-                      <a:endParaRPr lang="en-US" sz="1400" dirty="0"/>
+                        <a:rPr lang="en-US" sz="1400"/>
+                        <a:t>Hans Bloching</a:t>
+                      </a:r>
                     </a:p>
                     <a:p>
                       <a:r>
-                        <a:rPr lang="en-US" sz="1400" dirty="0"/>
+                        <a:rPr lang="en-US" sz="1400"/>
                         <a:t>Rene Weber</a:t>
                       </a:r>
                       <a:endParaRPr lang="de-DE" sz="1400" dirty="0"/>
@@ -7098,7 +7079,7 @@
                     <a:lstStyle/>
                     <a:p>
                       <a:r>
-                        <a:rPr lang="en-US" sz="1400" dirty="0"/>
+                        <a:rPr lang="en-US" sz="1400"/>
                         <a:t>12</a:t>
                       </a:r>
                       <a:endParaRPr lang="de-DE" sz="1400" dirty="0"/>
@@ -7111,6 +7092,10 @@
                     <a:bodyPr/>
                     <a:lstStyle/>
                     <a:p>
+                      <a:r>
+                        <a:rPr lang="en-US" sz="1400" dirty="0"/>
+                        <a:t>In Arbeit</a:t>
+                      </a:r>
                       <a:endParaRPr lang="de-DE" sz="1400" dirty="0"/>
                     </a:p>
                   </a:txBody>
@@ -7142,6 +7127,14 @@
                       </a:r>
                       <a:r>
                         <a:rPr lang="en-US" sz="1400" dirty="0"/>
+                        <a:t>/</a:t>
+                      </a:r>
+                      <a:r>
+                        <a:rPr lang="en-US" sz="1400" dirty="0" err="1"/>
+                        <a:t>Bestellungen</a:t>
+                      </a:r>
+                      <a:r>
+                        <a:rPr lang="en-US" sz="1400" dirty="0"/>
                         <a:t>”</a:t>
                       </a:r>
                       <a:endParaRPr lang="de-DE" sz="1400" dirty="0"/>
@@ -7193,6 +7186,10 @@
                     <a:bodyPr/>
                     <a:lstStyle/>
                     <a:p>
+                      <a:r>
+                        <a:rPr lang="en-US" sz="1400" dirty="0"/>
+                        <a:t>In Arbeit</a:t>
+                      </a:r>
                       <a:endParaRPr lang="de-DE" sz="1400" dirty="0"/>
                     </a:p>
                   </a:txBody>
@@ -7230,7 +7227,7 @@
         </p:blipFill>
         <p:spPr>
           <a:xfrm>
-            <a:off x="6879460" y="6208587"/>
+            <a:off x="6884925" y="6278906"/>
             <a:ext cx="1738967" cy="451906"/>
           </a:xfrm>
           <a:prstGeom prst="rect">
@@ -7252,7 +7249,7 @@
         </p:nvSpPr>
         <p:spPr>
           <a:xfrm>
-            <a:off x="6901218" y="6248432"/>
+            <a:off x="6884925" y="6327056"/>
             <a:ext cx="1524000" cy="369332"/>
           </a:xfrm>
           <a:prstGeom prst="rect">
@@ -7272,7 +7269,7 @@
                   <a:schemeClr val="bg1"/>
                 </a:solidFill>
               </a:rPr>
-              <a:t>48</a:t>
+              <a:t>48,5</a:t>
             </a:r>
             <a:endParaRPr lang="de-DE" dirty="0">
               <a:solidFill>
@@ -7369,7 +7366,7 @@
           <a:p>
             <a:fld id="{42B45B56-1D88-4042-8DF0-EB6B41B710D3}" type="datetime1">
               <a:rPr lang="de-DE" smtClean="0"/>
-              <a:t>28.11.2024</a:t>
+              <a:t>29.11.2024</a:t>
             </a:fld>
             <a:endParaRPr lang="en-US"/>
           </a:p>
@@ -7406,7 +7403,7 @@
       </p:sp>
       <p:graphicFrame>
         <p:nvGraphicFramePr>
-          <p:cNvPr id="10" name="Diagramm 9">
+          <p:cNvPr id="3" name="Diagramm 2">
             <a:extLst>
               <a:ext uri="{FF2B5EF4-FFF2-40B4-BE49-F238E27FC236}">
                 <a16:creationId xmlns:a16="http://schemas.microsoft.com/office/drawing/2014/main" id="{33E7D1FF-F8D0-F6A6-E3F2-5DB3E10D3BE4}"/>
@@ -7419,14 +7416,14 @@
           <p:nvPr>
             <p:extLst>
               <p:ext uri="{D42A27DB-BD31-4B8C-83A1-F6EECF244321}">
-                <p14:modId xmlns:p14="http://schemas.microsoft.com/office/powerpoint/2010/main" val="3149356319"/>
+                <p14:modId xmlns:p14="http://schemas.microsoft.com/office/powerpoint/2010/main" val="2393212789"/>
               </p:ext>
             </p:extLst>
           </p:nvPr>
         </p:nvGraphicFramePr>
         <p:xfrm>
-          <a:off x="1406308" y="2084532"/>
-          <a:ext cx="6204456" cy="4271818"/>
+          <a:off x="1861358" y="2053987"/>
+          <a:ext cx="5653017" cy="3867795"/>
         </p:xfrm>
         <a:graphic>
           <a:graphicData uri="http://schemas.openxmlformats.org/drawingml/2006/chart">
@@ -7521,7 +7518,7 @@
           <a:p>
             <a:fld id="{42B45B56-1D88-4042-8DF0-EB6B41B710D3}" type="datetime1">
               <a:rPr lang="de-DE" smtClean="0"/>
-              <a:t>28.11.2024</a:t>
+              <a:t>29.11.2024</a:t>
             </a:fld>
             <a:endParaRPr lang="en-US"/>
           </a:p>
@@ -7747,7 +7744,7 @@
           <a:p>
             <a:fld id="{42B45B56-1D88-4042-8DF0-EB6B41B710D3}" type="datetime1">
               <a:rPr lang="de-DE" smtClean="0"/>
-              <a:t>28.11.2024</a:t>
+              <a:t>29.11.2024</a:t>
             </a:fld>
             <a:endParaRPr lang="en-US"/>
           </a:p>
@@ -8688,7 +8685,7 @@
           <a:p>
             <a:fld id="{42B45B56-1D88-4042-8DF0-EB6B41B710D3}" type="datetime1">
               <a:rPr lang="de-DE" smtClean="0"/>
-              <a:t>28.11.2024</a:t>
+              <a:t>29.11.2024</a:t>
             </a:fld>
             <a:endParaRPr lang="en-US"/>
           </a:p>
@@ -9256,6 +9253,55 @@
           </a:graphicData>
         </a:graphic>
       </p:graphicFrame>
+      <p:sp>
+        <p:nvSpPr>
+          <p:cNvPr id="3" name="Gewitterblitz 2">
+            <a:extLst>
+              <a:ext uri="{FF2B5EF4-FFF2-40B4-BE49-F238E27FC236}">
+                <a16:creationId xmlns:a16="http://schemas.microsoft.com/office/drawing/2014/main" id="{7C02CA7B-6441-3EED-23C9-16C3E26D9C3D}"/>
+              </a:ext>
+            </a:extLst>
+          </p:cNvPr>
+          <p:cNvSpPr/>
+          <p:nvPr/>
+        </p:nvSpPr>
+        <p:spPr>
+          <a:xfrm rot="3267422">
+            <a:off x="9647582" y="3597330"/>
+            <a:ext cx="1524000" cy="2936240"/>
+          </a:xfrm>
+          <a:prstGeom prst="lightningBolt">
+            <a:avLst/>
+          </a:prstGeom>
+          <a:solidFill>
+            <a:srgbClr val="FFC000"/>
+          </a:solidFill>
+        </p:spPr>
+        <p:style>
+          <a:lnRef idx="2">
+            <a:schemeClr val="accent1">
+              <a:shade val="15000"/>
+            </a:schemeClr>
+          </a:lnRef>
+          <a:fillRef idx="1">
+            <a:schemeClr val="accent1"/>
+          </a:fillRef>
+          <a:effectRef idx="0">
+            <a:schemeClr val="accent1"/>
+          </a:effectRef>
+          <a:fontRef idx="minor">
+            <a:schemeClr val="lt1"/>
+          </a:fontRef>
+        </p:style>
+        <p:txBody>
+          <a:bodyPr rtlCol="0" anchor="ctr"/>
+          <a:lstStyle/>
+          <a:p>
+            <a:pPr algn="ctr"/>
+            <a:endParaRPr lang="de-DE"/>
+          </a:p>
+        </p:txBody>
+      </p:sp>
     </p:spTree>
     <p:extLst>
       <p:ext uri="{BB962C8B-B14F-4D97-AF65-F5344CB8AC3E}">
@@ -9266,6 +9312,84 @@
   <p:clrMapOvr>
     <a:masterClrMapping/>
   </p:clrMapOvr>
+  <p:timing>
+    <p:tnLst>
+      <p:par>
+        <p:cTn id="1" dur="indefinite" restart="never" nodeType="tmRoot">
+          <p:childTnLst>
+            <p:seq concurrent="1" nextAc="seek">
+              <p:cTn id="2" dur="indefinite" nodeType="mainSeq">
+                <p:childTnLst>
+                  <p:par>
+                    <p:cTn id="3" fill="hold">
+                      <p:stCondLst>
+                        <p:cond delay="indefinite"/>
+                      </p:stCondLst>
+                      <p:childTnLst>
+                        <p:par>
+                          <p:cTn id="4" fill="hold">
+                            <p:stCondLst>
+                              <p:cond delay="0"/>
+                            </p:stCondLst>
+                            <p:childTnLst>
+                              <p:par>
+                                <p:cTn id="5" presetID="1" presetClass="entr" presetSubtype="0" fill="hold" grpId="0" nodeType="clickEffect">
+                                  <p:stCondLst>
+                                    <p:cond delay="0"/>
+                                  </p:stCondLst>
+                                  <p:childTnLst>
+                                    <p:set>
+                                      <p:cBhvr>
+                                        <p:cTn id="6" dur="1" fill="hold">
+                                          <p:stCondLst>
+                                            <p:cond delay="0"/>
+                                          </p:stCondLst>
+                                        </p:cTn>
+                                        <p:tgtEl>
+                                          <p:spTgt spid="3"/>
+                                        </p:tgtEl>
+                                        <p:attrNameLst>
+                                          <p:attrName>style.visibility</p:attrName>
+                                        </p:attrNameLst>
+                                      </p:cBhvr>
+                                      <p:to>
+                                        <p:strVal val="visible"/>
+                                      </p:to>
+                                    </p:set>
+                                  </p:childTnLst>
+                                </p:cTn>
+                              </p:par>
+                            </p:childTnLst>
+                          </p:cTn>
+                        </p:par>
+                      </p:childTnLst>
+                    </p:cTn>
+                  </p:par>
+                </p:childTnLst>
+              </p:cTn>
+              <p:prevCondLst>
+                <p:cond evt="onPrev" delay="0">
+                  <p:tgtEl>
+                    <p:sldTgt/>
+                  </p:tgtEl>
+                </p:cond>
+              </p:prevCondLst>
+              <p:nextCondLst>
+                <p:cond evt="onNext" delay="0">
+                  <p:tgtEl>
+                    <p:sldTgt/>
+                  </p:tgtEl>
+                </p:cond>
+              </p:nextCondLst>
+            </p:seq>
+          </p:childTnLst>
+        </p:cTn>
+      </p:par>
+    </p:tnLst>
+    <p:bldLst>
+      <p:bldP spid="3" grpId="0" animBg="1"/>
+    </p:bldLst>
+  </p:timing>
 </p:sld>
 </file>
 
@@ -9335,7 +9459,139 @@
           <a:bodyPr/>
           <a:lstStyle/>
           <a:p>
-            <a:endParaRPr lang="de-DE"/>
+            <a:r>
+              <a:rPr lang="en-US" sz="2800" dirty="0" err="1"/>
+              <a:t>Warenkorb</a:t>
+            </a:r>
+            <a:r>
+              <a:rPr lang="en-US" sz="2800" dirty="0"/>
+              <a:t> </a:t>
+            </a:r>
+            <a:r>
+              <a:rPr lang="en-US" sz="2800" dirty="0" err="1"/>
+              <a:t>Erstellung</a:t>
+            </a:r>
+            <a:r>
+              <a:rPr lang="en-US" sz="2800" dirty="0"/>
+              <a:t> </a:t>
+            </a:r>
+            <a:r>
+              <a:rPr lang="en-US" sz="2800" dirty="0" err="1"/>
+              <a:t>abschlie</a:t>
+            </a:r>
+            <a:r>
+              <a:rPr lang="de-DE" sz="2800" dirty="0"/>
+              <a:t>ß</a:t>
+            </a:r>
+            <a:r>
+              <a:rPr lang="en-US" sz="2800" dirty="0" err="1"/>
+              <a:t>en</a:t>
+            </a:r>
+            <a:endParaRPr lang="en-US" sz="2800" dirty="0"/>
+          </a:p>
+          <a:p>
+            <a:r>
+              <a:rPr lang="en-US" dirty="0" err="1"/>
+              <a:t>Logik</a:t>
+            </a:r>
+            <a:r>
+              <a:rPr lang="en-US" dirty="0"/>
+              <a:t> “</a:t>
+            </a:r>
+            <a:r>
+              <a:rPr lang="en-US" dirty="0" err="1"/>
+              <a:t>Anpassen</a:t>
+            </a:r>
+            <a:r>
+              <a:rPr lang="en-US" dirty="0"/>
+              <a:t> von </a:t>
+            </a:r>
+            <a:r>
+              <a:rPr lang="en-US" dirty="0" err="1"/>
+              <a:t>Speisen</a:t>
+            </a:r>
+            <a:r>
+              <a:rPr lang="en-US" dirty="0"/>
+              <a:t> </a:t>
+            </a:r>
+            <a:r>
+              <a:rPr lang="en-US" dirty="0" err="1"/>
+              <a:t>im</a:t>
+            </a:r>
+            <a:r>
+              <a:rPr lang="en-US" dirty="0"/>
+              <a:t> </a:t>
+            </a:r>
+            <a:r>
+              <a:rPr lang="en-US" dirty="0" err="1"/>
+              <a:t>Warenkorb</a:t>
+            </a:r>
+            <a:r>
+              <a:rPr lang="en-US" dirty="0"/>
+              <a:t>”</a:t>
+            </a:r>
+          </a:p>
+          <a:p>
+            <a:r>
+              <a:rPr lang="en-US" sz="2800" dirty="0" err="1"/>
+              <a:t>Logik</a:t>
+            </a:r>
+            <a:r>
+              <a:rPr lang="en-US" sz="2800" dirty="0"/>
+              <a:t> </a:t>
+            </a:r>
+            <a:r>
+              <a:rPr lang="en-US" dirty="0"/>
+              <a:t>“</a:t>
+            </a:r>
+            <a:r>
+              <a:rPr lang="en-US" dirty="0" err="1"/>
+              <a:t>Autom</a:t>
+            </a:r>
+            <a:r>
+              <a:rPr lang="en-US" dirty="0"/>
+              <a:t>. </a:t>
+            </a:r>
+            <a:r>
+              <a:rPr lang="en-US" dirty="0" err="1"/>
+              <a:t>Kalkulation</a:t>
+            </a:r>
+            <a:r>
+              <a:rPr lang="en-US" dirty="0"/>
+              <a:t> der Kosten”</a:t>
+            </a:r>
+            <a:endParaRPr lang="en-US" sz="2800" dirty="0"/>
+          </a:p>
+          <a:p>
+            <a:r>
+              <a:rPr lang="en-US" dirty="0" err="1"/>
+              <a:t>Logik</a:t>
+            </a:r>
+            <a:r>
+              <a:rPr lang="en-US" dirty="0"/>
+              <a:t> </a:t>
+            </a:r>
+            <a:r>
+              <a:rPr lang="en-US" dirty="0" err="1"/>
+              <a:t>zum</a:t>
+            </a:r>
+            <a:r>
+              <a:rPr lang="en-US" dirty="0"/>
+              <a:t> </a:t>
+            </a:r>
+            <a:r>
+              <a:rPr lang="en-US" dirty="0" err="1"/>
+              <a:t>Absenden</a:t>
+            </a:r>
+            <a:r>
+              <a:rPr lang="en-US" dirty="0"/>
+              <a:t> der </a:t>
+            </a:r>
+            <a:r>
+              <a:rPr lang="en-US" dirty="0" err="1"/>
+              <a:t>Bestellung</a:t>
+            </a:r>
+            <a:endParaRPr lang="en-US" dirty="0"/>
           </a:p>
         </p:txBody>
       </p:sp>
@@ -9362,7 +9618,7 @@
           <a:p>
             <a:fld id="{42B45B56-1D88-4042-8DF0-EB6B41B710D3}" type="datetime1">
               <a:rPr lang="de-DE" smtClean="0"/>
-              <a:t>28.11.2024</a:t>
+              <a:t>29.11.2024</a:t>
             </a:fld>
             <a:endParaRPr lang="en-US"/>
           </a:p>
@@ -9607,7 +9863,7 @@
           <a:p>
             <a:fld id="{42B45B56-1D88-4042-8DF0-EB6B41B710D3}" type="datetime1">
               <a:rPr lang="de-DE" smtClean="0"/>
-              <a:t>28.11.2024</a:t>
+              <a:t>29.11.2024</a:t>
             </a:fld>
             <a:endParaRPr lang="en-US"/>
           </a:p>
@@ -9843,7 +10099,7 @@
           <a:p>
             <a:fld id="{42B45B56-1D88-4042-8DF0-EB6B41B710D3}" type="datetime1">
               <a:rPr lang="de-DE" smtClean="0"/>
-              <a:t>28.11.2024</a:t>
+              <a:t>29.11.2024</a:t>
             </a:fld>
             <a:endParaRPr lang="en-US"/>
           </a:p>
@@ -9882,6 +10138,169 @@
     <p:extLst>
       <p:ext uri="{BB962C8B-B14F-4D97-AF65-F5344CB8AC3E}">
         <p14:creationId xmlns:p14="http://schemas.microsoft.com/office/powerpoint/2010/main" val="3169394714"/>
+      </p:ext>
+    </p:extLst>
+  </p:cSld>
+  <p:clrMapOvr>
+    <a:masterClrMapping/>
+  </p:clrMapOvr>
+</p:sld>
+</file>
+
+<file path=ppt/slides/slide19.xml><?xml version="1.0" encoding="utf-8"?>
+<p:sld xmlns:a="http://schemas.openxmlformats.org/drawingml/2006/main" xmlns:r="http://schemas.openxmlformats.org/officeDocument/2006/relationships" xmlns:p="http://schemas.openxmlformats.org/presentationml/2006/main">
+  <p:cSld>
+    <p:spTree>
+      <p:nvGrpSpPr>
+        <p:cNvPr id="1" name=""/>
+        <p:cNvGrpSpPr/>
+        <p:nvPr/>
+      </p:nvGrpSpPr>
+      <p:grpSpPr>
+        <a:xfrm>
+          <a:off x="0" y="0"/>
+          <a:ext cx="0" cy="0"/>
+          <a:chOff x="0" y="0"/>
+          <a:chExt cx="0" cy="0"/>
+        </a:xfrm>
+      </p:grpSpPr>
+      <p:sp>
+        <p:nvSpPr>
+          <p:cNvPr id="2" name="Titel 1">
+            <a:extLst>
+              <a:ext uri="{FF2B5EF4-FFF2-40B4-BE49-F238E27FC236}">
+                <a16:creationId xmlns:a16="http://schemas.microsoft.com/office/drawing/2014/main" id="{05F31F6E-2F65-7A93-DF0B-917ABC029378}"/>
+              </a:ext>
+            </a:extLst>
+          </p:cNvPr>
+          <p:cNvSpPr>
+            <a:spLocks noGrp="1"/>
+          </p:cNvSpPr>
+          <p:nvPr>
+            <p:ph type="title"/>
+          </p:nvPr>
+        </p:nvSpPr>
+        <p:spPr/>
+        <p:txBody>
+          <a:bodyPr/>
+          <a:lstStyle/>
+          <a:p>
+            <a:endParaRPr lang="de-DE"/>
+          </a:p>
+        </p:txBody>
+      </p:sp>
+      <p:sp>
+        <p:nvSpPr>
+          <p:cNvPr id="3" name="Inhaltsplatzhalter 2">
+            <a:extLst>
+              <a:ext uri="{FF2B5EF4-FFF2-40B4-BE49-F238E27FC236}">
+                <a16:creationId xmlns:a16="http://schemas.microsoft.com/office/drawing/2014/main" id="{57D7586E-8549-8CEC-FF99-4F32F3A91E62}"/>
+              </a:ext>
+            </a:extLst>
+          </p:cNvPr>
+          <p:cNvSpPr>
+            <a:spLocks noGrp="1"/>
+          </p:cNvSpPr>
+          <p:nvPr>
+            <p:ph sz="half" idx="1"/>
+          </p:nvPr>
+        </p:nvSpPr>
+        <p:spPr/>
+        <p:txBody>
+          <a:bodyPr/>
+          <a:lstStyle/>
+          <a:p>
+            <a:endParaRPr lang="de-DE"/>
+          </a:p>
+        </p:txBody>
+      </p:sp>
+      <p:sp>
+        <p:nvSpPr>
+          <p:cNvPr id="4" name="Inhaltsplatzhalter 3">
+            <a:extLst>
+              <a:ext uri="{FF2B5EF4-FFF2-40B4-BE49-F238E27FC236}">
+                <a16:creationId xmlns:a16="http://schemas.microsoft.com/office/drawing/2014/main" id="{B737EBE6-E269-7788-70A0-0FBAD540DD56}"/>
+              </a:ext>
+            </a:extLst>
+          </p:cNvPr>
+          <p:cNvSpPr>
+            <a:spLocks noGrp="1"/>
+          </p:cNvSpPr>
+          <p:nvPr>
+            <p:ph sz="half" idx="2"/>
+          </p:nvPr>
+        </p:nvSpPr>
+        <p:spPr/>
+        <p:txBody>
+          <a:bodyPr/>
+          <a:lstStyle/>
+          <a:p>
+            <a:endParaRPr lang="de-DE"/>
+          </a:p>
+        </p:txBody>
+      </p:sp>
+      <p:sp>
+        <p:nvSpPr>
+          <p:cNvPr id="5" name="Datumsplatzhalter 4">
+            <a:extLst>
+              <a:ext uri="{FF2B5EF4-FFF2-40B4-BE49-F238E27FC236}">
+                <a16:creationId xmlns:a16="http://schemas.microsoft.com/office/drawing/2014/main" id="{4D485582-CA74-5996-9B0D-1A4F88AB5AF0}"/>
+              </a:ext>
+            </a:extLst>
+          </p:cNvPr>
+          <p:cNvSpPr>
+            <a:spLocks noGrp="1"/>
+          </p:cNvSpPr>
+          <p:nvPr>
+            <p:ph type="dt" sz="half" idx="10"/>
+          </p:nvPr>
+        </p:nvSpPr>
+        <p:spPr/>
+        <p:txBody>
+          <a:bodyPr/>
+          <a:lstStyle/>
+          <a:p>
+            <a:fld id="{12AE7323-5CDD-4051-9975-1729D84443C7}" type="datetime1">
+              <a:rPr lang="de-DE" smtClean="0"/>
+              <a:t>29.11.2024</a:t>
+            </a:fld>
+            <a:endParaRPr lang="en-US"/>
+          </a:p>
+        </p:txBody>
+      </p:sp>
+      <p:sp>
+        <p:nvSpPr>
+          <p:cNvPr id="6" name="Foliennummernplatzhalter 5">
+            <a:extLst>
+              <a:ext uri="{FF2B5EF4-FFF2-40B4-BE49-F238E27FC236}">
+                <a16:creationId xmlns:a16="http://schemas.microsoft.com/office/drawing/2014/main" id="{EFEE860A-9D58-26A0-3548-E7CC6A6E9AEB}"/>
+              </a:ext>
+            </a:extLst>
+          </p:cNvPr>
+          <p:cNvSpPr>
+            <a:spLocks noGrp="1"/>
+          </p:cNvSpPr>
+          <p:nvPr>
+            <p:ph type="sldNum" sz="quarter" idx="12"/>
+          </p:nvPr>
+        </p:nvSpPr>
+        <p:spPr/>
+        <p:txBody>
+          <a:bodyPr/>
+          <a:lstStyle/>
+          <a:p>
+            <a:fld id="{07CE569E-9B7C-4CB9-AB80-C0841F922CFF}" type="slidenum">
+              <a:rPr lang="en-US" smtClean="0"/>
+              <a:t>19</a:t>
+            </a:fld>
+            <a:endParaRPr lang="en-US"/>
+          </a:p>
+        </p:txBody>
+      </p:sp>
+    </p:spTree>
+    <p:extLst>
+      <p:ext uri="{BB962C8B-B14F-4D97-AF65-F5344CB8AC3E}">
+        <p14:creationId xmlns:p14="http://schemas.microsoft.com/office/powerpoint/2010/main" val="3837604972"/>
       </p:ext>
     </p:extLst>
   </p:cSld>
@@ -10053,7 +10472,7 @@
           <a:p>
             <a:fld id="{AE5E781B-AB27-45A9-B2F3-7F70593BE83B}" type="datetime1">
               <a:rPr lang="de-DE" smtClean="0"/>
-              <a:t>28.11.2024</a:t>
+              <a:t>29.11.2024</a:t>
             </a:fld>
             <a:endParaRPr lang="en-US"/>
           </a:p>
@@ -10092,6 +10511,1060 @@
     <p:extLst>
       <p:ext uri="{BB962C8B-B14F-4D97-AF65-F5344CB8AC3E}">
         <p14:creationId xmlns:p14="http://schemas.microsoft.com/office/powerpoint/2010/main" val="1411604025"/>
+      </p:ext>
+    </p:extLst>
+  </p:cSld>
+  <p:clrMapOvr>
+    <a:masterClrMapping/>
+  </p:clrMapOvr>
+</p:sld>
+</file>
+
+<file path=ppt/slides/slide20.xml><?xml version="1.0" encoding="utf-8"?>
+<p:sld xmlns:a="http://schemas.openxmlformats.org/drawingml/2006/main" xmlns:r="http://schemas.openxmlformats.org/officeDocument/2006/relationships" xmlns:p="http://schemas.openxmlformats.org/presentationml/2006/main">
+  <p:cSld>
+    <p:spTree>
+      <p:nvGrpSpPr>
+        <p:cNvPr id="1" name="">
+          <a:extLst>
+            <a:ext uri="{FF2B5EF4-FFF2-40B4-BE49-F238E27FC236}">
+              <a16:creationId xmlns:a16="http://schemas.microsoft.com/office/drawing/2014/main" id="{FAA7904C-22D5-E881-4D01-FB477DA71E5F}"/>
+            </a:ext>
+          </a:extLst>
+        </p:cNvPr>
+        <p:cNvGrpSpPr/>
+        <p:nvPr/>
+      </p:nvGrpSpPr>
+      <p:grpSpPr>
+        <a:xfrm>
+          <a:off x="0" y="0"/>
+          <a:ext cx="0" cy="0"/>
+          <a:chOff x="0" y="0"/>
+          <a:chExt cx="0" cy="0"/>
+        </a:xfrm>
+      </p:grpSpPr>
+      <p:sp>
+        <p:nvSpPr>
+          <p:cNvPr id="2" name="Titel 1">
+            <a:extLst>
+              <a:ext uri="{FF2B5EF4-FFF2-40B4-BE49-F238E27FC236}">
+                <a16:creationId xmlns:a16="http://schemas.microsoft.com/office/drawing/2014/main" id="{3BB55E6B-CF2C-CEF3-FF48-47668B162BA5}"/>
+              </a:ext>
+            </a:extLst>
+          </p:cNvPr>
+          <p:cNvSpPr>
+            <a:spLocks noGrp="1"/>
+          </p:cNvSpPr>
+          <p:nvPr>
+            <p:ph type="title"/>
+          </p:nvPr>
+        </p:nvSpPr>
+        <p:spPr/>
+        <p:txBody>
+          <a:bodyPr/>
+          <a:lstStyle/>
+          <a:p>
+            <a:r>
+              <a:rPr lang="de-DE" dirty="0"/>
+              <a:t>4. Detailplanung (IST)</a:t>
+            </a:r>
+          </a:p>
+        </p:txBody>
+      </p:sp>
+      <p:sp>
+        <p:nvSpPr>
+          <p:cNvPr id="4" name="Datumsplatzhalter 3">
+            <a:extLst>
+              <a:ext uri="{FF2B5EF4-FFF2-40B4-BE49-F238E27FC236}">
+                <a16:creationId xmlns:a16="http://schemas.microsoft.com/office/drawing/2014/main" id="{27F8B146-19B8-D939-3B88-D8858768AA31}"/>
+              </a:ext>
+            </a:extLst>
+          </p:cNvPr>
+          <p:cNvSpPr>
+            <a:spLocks noGrp="1"/>
+          </p:cNvSpPr>
+          <p:nvPr>
+            <p:ph type="dt" sz="half" idx="10"/>
+          </p:nvPr>
+        </p:nvSpPr>
+        <p:spPr/>
+        <p:txBody>
+          <a:bodyPr/>
+          <a:lstStyle/>
+          <a:p>
+            <a:pPr marL="0" marR="0" lvl="0" indent="0" algn="r" defTabSz="914400" rtl="0" eaLnBrk="1" fontAlgn="auto" latinLnBrk="0" hangingPunct="1">
+              <a:lnSpc>
+                <a:spcPct val="100000"/>
+              </a:lnSpc>
+              <a:spcBef>
+                <a:spcPts val="0"/>
+              </a:spcBef>
+              <a:spcAft>
+                <a:spcPts val="0"/>
+              </a:spcAft>
+              <a:buClrTx/>
+              <a:buSzTx/>
+              <a:buFontTx/>
+              <a:buNone/>
+              <a:tabLst/>
+              <a:defRPr/>
+            </a:pPr>
+            <a:fld id="{42B45B56-1D88-4042-8DF0-EB6B41B710D3}" type="datetime1">
+              <a:rPr kumimoji="0" lang="de-DE" sz="1200" b="0" i="0" u="none" strike="noStrike" kern="1200" cap="none" spc="0" normalizeH="0" baseline="0" noProof="0" smtClean="0">
+                <a:ln>
+                  <a:noFill/>
+                </a:ln>
+                <a:solidFill>
+                  <a:srgbClr val="FFFFFF">
+                    <a:tint val="75000"/>
+                    <a:alpha val="70000"/>
+                  </a:srgbClr>
+                </a:solidFill>
+                <a:effectLst/>
+                <a:uLnTx/>
+                <a:uFillTx/>
+                <a:latin typeface="Avenir Next LT Pro"/>
+                <a:ea typeface="+mn-ea"/>
+                <a:cs typeface="+mn-cs"/>
+              </a:rPr>
+              <a:pPr marL="0" marR="0" lvl="0" indent="0" algn="r" defTabSz="914400" rtl="0" eaLnBrk="1" fontAlgn="auto" latinLnBrk="0" hangingPunct="1">
+                <a:lnSpc>
+                  <a:spcPct val="100000"/>
+                </a:lnSpc>
+                <a:spcBef>
+                  <a:spcPts val="0"/>
+                </a:spcBef>
+                <a:spcAft>
+                  <a:spcPts val="0"/>
+                </a:spcAft>
+                <a:buClrTx/>
+                <a:buSzTx/>
+                <a:buFontTx/>
+                <a:buNone/>
+                <a:tabLst/>
+                <a:defRPr/>
+              </a:pPr>
+              <a:t>29.11.2024</a:t>
+            </a:fld>
+            <a:endParaRPr kumimoji="0" lang="en-US" sz="1200" b="0" i="0" u="none" strike="noStrike" kern="1200" cap="none" spc="0" normalizeH="0" baseline="0" noProof="0">
+              <a:ln>
+                <a:noFill/>
+              </a:ln>
+              <a:solidFill>
+                <a:srgbClr val="FFFFFF">
+                  <a:tint val="75000"/>
+                  <a:alpha val="70000"/>
+                </a:srgbClr>
+              </a:solidFill>
+              <a:effectLst/>
+              <a:uLnTx/>
+              <a:uFillTx/>
+              <a:latin typeface="Avenir Next LT Pro"/>
+              <a:ea typeface="+mn-ea"/>
+              <a:cs typeface="+mn-cs"/>
+            </a:endParaRPr>
+          </a:p>
+        </p:txBody>
+      </p:sp>
+      <p:sp>
+        <p:nvSpPr>
+          <p:cNvPr id="5" name="Foliennummernplatzhalter 4">
+            <a:extLst>
+              <a:ext uri="{FF2B5EF4-FFF2-40B4-BE49-F238E27FC236}">
+                <a16:creationId xmlns:a16="http://schemas.microsoft.com/office/drawing/2014/main" id="{574F4C5D-53C4-AF6F-8676-A07AF5A9C890}"/>
+              </a:ext>
+            </a:extLst>
+          </p:cNvPr>
+          <p:cNvSpPr>
+            <a:spLocks noGrp="1"/>
+          </p:cNvSpPr>
+          <p:nvPr>
+            <p:ph type="sldNum" sz="quarter" idx="12"/>
+          </p:nvPr>
+        </p:nvSpPr>
+        <p:spPr/>
+        <p:txBody>
+          <a:bodyPr/>
+          <a:lstStyle/>
+          <a:p>
+            <a:pPr marL="0" marR="0" lvl="0" indent="0" algn="r" defTabSz="914400" rtl="0" eaLnBrk="1" fontAlgn="auto" latinLnBrk="0" hangingPunct="1">
+              <a:lnSpc>
+                <a:spcPct val="100000"/>
+              </a:lnSpc>
+              <a:spcBef>
+                <a:spcPts val="0"/>
+              </a:spcBef>
+              <a:spcAft>
+                <a:spcPts val="0"/>
+              </a:spcAft>
+              <a:buClrTx/>
+              <a:buSzTx/>
+              <a:buFontTx/>
+              <a:buNone/>
+              <a:tabLst/>
+              <a:defRPr/>
+            </a:pPr>
+            <a:fld id="{07CE569E-9B7C-4CB9-AB80-C0841F922CFF}" type="slidenum">
+              <a:rPr kumimoji="0" lang="en-US" sz="1200" b="0" i="0" u="none" strike="noStrike" kern="1200" cap="none" spc="0" normalizeH="0" baseline="0" noProof="0" smtClean="0">
+                <a:ln>
+                  <a:noFill/>
+                </a:ln>
+                <a:solidFill>
+                  <a:srgbClr val="FFFFFF">
+                    <a:tint val="75000"/>
+                    <a:alpha val="70000"/>
+                  </a:srgbClr>
+                </a:solidFill>
+                <a:effectLst/>
+                <a:uLnTx/>
+                <a:uFillTx/>
+                <a:latin typeface="Avenir Next LT Pro"/>
+                <a:ea typeface="+mn-ea"/>
+                <a:cs typeface="+mn-cs"/>
+              </a:rPr>
+              <a:pPr marL="0" marR="0" lvl="0" indent="0" algn="r" defTabSz="914400" rtl="0" eaLnBrk="1" fontAlgn="auto" latinLnBrk="0" hangingPunct="1">
+                <a:lnSpc>
+                  <a:spcPct val="100000"/>
+                </a:lnSpc>
+                <a:spcBef>
+                  <a:spcPts val="0"/>
+                </a:spcBef>
+                <a:spcAft>
+                  <a:spcPts val="0"/>
+                </a:spcAft>
+                <a:buClrTx/>
+                <a:buSzTx/>
+                <a:buFontTx/>
+                <a:buNone/>
+                <a:tabLst/>
+                <a:defRPr/>
+              </a:pPr>
+              <a:t>20</a:t>
+            </a:fld>
+            <a:endParaRPr kumimoji="0" lang="en-US" sz="1200" b="0" i="0" u="none" strike="noStrike" kern="1200" cap="none" spc="0" normalizeH="0" baseline="0" noProof="0">
+              <a:ln>
+                <a:noFill/>
+              </a:ln>
+              <a:solidFill>
+                <a:srgbClr val="FFFFFF">
+                  <a:tint val="75000"/>
+                  <a:alpha val="70000"/>
+                </a:srgbClr>
+              </a:solidFill>
+              <a:effectLst/>
+              <a:uLnTx/>
+              <a:uFillTx/>
+              <a:latin typeface="Avenir Next LT Pro"/>
+              <a:ea typeface="+mn-ea"/>
+              <a:cs typeface="+mn-cs"/>
+            </a:endParaRPr>
+          </a:p>
+        </p:txBody>
+      </p:sp>
+      <p:graphicFrame>
+        <p:nvGraphicFramePr>
+          <p:cNvPr id="3" name="Inhaltsplatzhalter 2">
+            <a:extLst>
+              <a:ext uri="{FF2B5EF4-FFF2-40B4-BE49-F238E27FC236}">
+                <a16:creationId xmlns:a16="http://schemas.microsoft.com/office/drawing/2014/main" id="{5F2698D9-4327-57B7-2C1D-6CF407017E47}"/>
+              </a:ext>
+            </a:extLst>
+          </p:cNvPr>
+          <p:cNvGraphicFramePr>
+            <a:graphicFrameLocks noGrp="1"/>
+          </p:cNvGraphicFramePr>
+          <p:nvPr>
+            <p:ph idx="1"/>
+            <p:extLst>
+              <p:ext uri="{D42A27DB-BD31-4B8C-83A1-F6EECF244321}">
+                <p14:modId xmlns:p14="http://schemas.microsoft.com/office/powerpoint/2010/main" val="1752711689"/>
+              </p:ext>
+            </p:extLst>
+          </p:nvPr>
+        </p:nvGraphicFramePr>
+        <p:xfrm>
+          <a:off x="762000" y="1860487"/>
+          <a:ext cx="8961423" cy="4467451"/>
+        </p:xfrm>
+        <a:graphic>
+          <a:graphicData uri="http://schemas.openxmlformats.org/drawingml/2006/table">
+            <a:tbl>
+              <a:tblPr firstRow="1" bandRow="1">
+                <a:tableStyleId>{5C22544A-7EE6-4342-B048-85BDC9FD1C3A}</a:tableStyleId>
+              </a:tblPr>
+              <a:tblGrid>
+                <a:gridCol w="3810675">
+                  <a:extLst>
+                    <a:ext uri="{9D8B030D-6E8A-4147-A177-3AD203B41FA5}">
+                      <a16:colId xmlns:a16="http://schemas.microsoft.com/office/drawing/2014/main" val="230851902"/>
+                    </a:ext>
+                  </a:extLst>
+                </a:gridCol>
+                <a:gridCol w="2321893">
+                  <a:extLst>
+                    <a:ext uri="{9D8B030D-6E8A-4147-A177-3AD203B41FA5}">
+                      <a16:colId xmlns:a16="http://schemas.microsoft.com/office/drawing/2014/main" val="2657664356"/>
+                    </a:ext>
+                  </a:extLst>
+                </a:gridCol>
+                <a:gridCol w="1733814">
+                  <a:extLst>
+                    <a:ext uri="{9D8B030D-6E8A-4147-A177-3AD203B41FA5}">
+                      <a16:colId xmlns:a16="http://schemas.microsoft.com/office/drawing/2014/main" val="4098082685"/>
+                    </a:ext>
+                  </a:extLst>
+                </a:gridCol>
+                <a:gridCol w="1095041">
+                  <a:extLst>
+                    <a:ext uri="{9D8B030D-6E8A-4147-A177-3AD203B41FA5}">
+                      <a16:colId xmlns:a16="http://schemas.microsoft.com/office/drawing/2014/main" val="2360363224"/>
+                    </a:ext>
+                  </a:extLst>
+                </a:gridCol>
+              </a:tblGrid>
+              <a:tr h="364002">
+                <a:tc>
+                  <a:txBody>
+                    <a:bodyPr/>
+                    <a:lstStyle/>
+                    <a:p>
+                      <a:r>
+                        <a:rPr lang="en-US" sz="1400"/>
+                        <a:t>Aufgabe</a:t>
+                      </a:r>
+                      <a:endParaRPr lang="de-DE" sz="1400" dirty="0"/>
+                    </a:p>
+                  </a:txBody>
+                  <a:tcPr/>
+                </a:tc>
+                <a:tc>
+                  <a:txBody>
+                    <a:bodyPr/>
+                    <a:lstStyle/>
+                    <a:p>
+                      <a:r>
+                        <a:rPr lang="en-US" sz="1400"/>
+                        <a:t>Zuständigkeit</a:t>
+                      </a:r>
+                      <a:endParaRPr lang="de-DE" sz="1400" dirty="0"/>
+                    </a:p>
+                  </a:txBody>
+                  <a:tcPr/>
+                </a:tc>
+                <a:tc>
+                  <a:txBody>
+                    <a:bodyPr/>
+                    <a:lstStyle/>
+                    <a:p>
+                      <a:r>
+                        <a:rPr lang="en-US" sz="1400"/>
+                        <a:t>Aufwand</a:t>
+                      </a:r>
+                      <a:endParaRPr lang="de-DE" sz="1400" dirty="0"/>
+                    </a:p>
+                  </a:txBody>
+                  <a:tcPr/>
+                </a:tc>
+                <a:tc>
+                  <a:txBody>
+                    <a:bodyPr/>
+                    <a:lstStyle/>
+                    <a:p>
+                      <a:r>
+                        <a:rPr lang="en-US" sz="1400"/>
+                        <a:t>Status</a:t>
+                      </a:r>
+                      <a:endParaRPr lang="de-DE" sz="1400" dirty="0"/>
+                    </a:p>
+                  </a:txBody>
+                  <a:tcPr/>
+                </a:tc>
+                <a:extLst>
+                  <a:ext uri="{0D108BD9-81ED-4DB2-BD59-A6C34878D82A}">
+                    <a16:rowId xmlns:a16="http://schemas.microsoft.com/office/drawing/2014/main" val="2749238170"/>
+                  </a:ext>
+                </a:extLst>
+              </a:tr>
+              <a:tr h="926116">
+                <a:tc>
+                  <a:txBody>
+                    <a:bodyPr/>
+                    <a:lstStyle/>
+                    <a:p>
+                      <a:r>
+                        <a:rPr lang="en-US" sz="1400"/>
+                        <a:t>Dokumentation + Project Managment</a:t>
+                      </a:r>
+                      <a:endParaRPr lang="de-DE" sz="1400" dirty="0"/>
+                    </a:p>
+                  </a:txBody>
+                  <a:tcPr/>
+                </a:tc>
+                <a:tc>
+                  <a:txBody>
+                    <a:bodyPr/>
+                    <a:lstStyle/>
+                    <a:p>
+                      <a:r>
+                        <a:rPr lang="en-US" sz="1400"/>
+                        <a:t>Alle</a:t>
+                      </a:r>
+                      <a:endParaRPr lang="de-DE" sz="1400" dirty="0"/>
+                    </a:p>
+                  </a:txBody>
+                  <a:tcPr/>
+                </a:tc>
+                <a:tc>
+                  <a:txBody>
+                    <a:bodyPr/>
+                    <a:lstStyle/>
+                    <a:p>
+                      <a:r>
+                        <a:rPr lang="en-US" sz="1400" dirty="0"/>
+                        <a:t>14</a:t>
+                      </a:r>
+                    </a:p>
+                    <a:p>
+                      <a:r>
+                        <a:rPr lang="en-US" sz="1050" dirty="0"/>
+                        <a:t>(6h </a:t>
+                      </a:r>
+                      <a:r>
+                        <a:rPr lang="en-US" sz="1050" dirty="0" err="1"/>
+                        <a:t>Vorbereitung</a:t>
+                      </a:r>
+                      <a:r>
+                        <a:rPr lang="en-US" sz="1050" dirty="0"/>
+                        <a:t> des Sprint)</a:t>
+                      </a:r>
+                      <a:endParaRPr lang="de-DE" sz="1050" dirty="0"/>
+                    </a:p>
+                  </a:txBody>
+                  <a:tcPr/>
+                </a:tc>
+                <a:tc>
+                  <a:txBody>
+                    <a:bodyPr/>
+                    <a:lstStyle/>
+                    <a:p>
+                      <a:r>
+                        <a:rPr lang="en-US" sz="1400" dirty="0" err="1"/>
+                        <a:t>Erledigt</a:t>
+                      </a:r>
+                      <a:endParaRPr lang="de-DE" sz="1400" dirty="0"/>
+                    </a:p>
+                  </a:txBody>
+                  <a:tcPr/>
+                </a:tc>
+                <a:extLst>
+                  <a:ext uri="{0D108BD9-81ED-4DB2-BD59-A6C34878D82A}">
+                    <a16:rowId xmlns:a16="http://schemas.microsoft.com/office/drawing/2014/main" val="432160553"/>
+                  </a:ext>
+                </a:extLst>
+              </a:tr>
+              <a:tr h="408804">
+                <a:tc>
+                  <a:txBody>
+                    <a:bodyPr/>
+                    <a:lstStyle/>
+                    <a:p>
+                      <a:r>
+                        <a:rPr lang="en-US" sz="1400"/>
+                        <a:t>Erstellen Mockups u. Wireframes</a:t>
+                      </a:r>
+                      <a:endParaRPr lang="de-DE" sz="1400" dirty="0"/>
+                    </a:p>
+                  </a:txBody>
+                  <a:tcPr/>
+                </a:tc>
+                <a:tc>
+                  <a:txBody>
+                    <a:bodyPr/>
+                    <a:lstStyle/>
+                    <a:p>
+                      <a:r>
+                        <a:rPr lang="en-US" sz="1400" kern="1200">
+                          <a:solidFill>
+                            <a:schemeClr val="dk1"/>
+                          </a:solidFill>
+                          <a:latin typeface="+mn-lt"/>
+                          <a:ea typeface="+mn-ea"/>
+                          <a:cs typeface="+mn-cs"/>
+                        </a:rPr>
+                        <a:t>Vincent Knapp</a:t>
+                      </a:r>
+                      <a:endParaRPr lang="de-DE" sz="1400" kern="1200" dirty="0">
+                        <a:solidFill>
+                          <a:schemeClr val="dk1"/>
+                        </a:solidFill>
+                        <a:latin typeface="+mn-lt"/>
+                        <a:ea typeface="+mn-ea"/>
+                        <a:cs typeface="+mn-cs"/>
+                      </a:endParaRPr>
+                    </a:p>
+                  </a:txBody>
+                  <a:tcPr/>
+                </a:tc>
+                <a:tc>
+                  <a:txBody>
+                    <a:bodyPr/>
+                    <a:lstStyle/>
+                    <a:p>
+                      <a:r>
+                        <a:rPr lang="en-US" sz="1400" kern="1200" dirty="0">
+                          <a:solidFill>
+                            <a:schemeClr val="dk1"/>
+                          </a:solidFill>
+                          <a:latin typeface="+mn-lt"/>
+                          <a:ea typeface="+mn-ea"/>
+                          <a:cs typeface="+mn-cs"/>
+                        </a:rPr>
+                        <a:t>2</a:t>
+                      </a:r>
+                      <a:endParaRPr lang="de-DE" sz="1400" kern="1200" dirty="0">
+                        <a:solidFill>
+                          <a:schemeClr val="dk1"/>
+                        </a:solidFill>
+                        <a:latin typeface="+mn-lt"/>
+                        <a:ea typeface="+mn-ea"/>
+                        <a:cs typeface="+mn-cs"/>
+                      </a:endParaRPr>
+                    </a:p>
+                  </a:txBody>
+                  <a:tcPr/>
+                </a:tc>
+                <a:tc>
+                  <a:txBody>
+                    <a:bodyPr/>
+                    <a:lstStyle/>
+                    <a:p>
+                      <a:r>
+                        <a:rPr lang="en-US" sz="1400"/>
+                        <a:t>Erledigt</a:t>
+                      </a:r>
+                      <a:endParaRPr lang="de-DE" sz="1400" dirty="0"/>
+                    </a:p>
+                  </a:txBody>
+                  <a:tcPr/>
+                </a:tc>
+                <a:extLst>
+                  <a:ext uri="{0D108BD9-81ED-4DB2-BD59-A6C34878D82A}">
+                    <a16:rowId xmlns:a16="http://schemas.microsoft.com/office/drawing/2014/main" val="739622510"/>
+                  </a:ext>
+                </a:extLst>
+              </a:tr>
+              <a:tr h="506337">
+                <a:tc>
+                  <a:txBody>
+                    <a:bodyPr/>
+                    <a:lstStyle/>
+                    <a:p>
+                      <a:pPr marL="0" marR="0" lvl="0" indent="0" algn="l" defTabSz="914400" rtl="0" eaLnBrk="1" fontAlgn="auto" latinLnBrk="0" hangingPunct="1">
+                        <a:lnSpc>
+                          <a:spcPct val="100000"/>
+                        </a:lnSpc>
+                        <a:spcBef>
+                          <a:spcPts val="0"/>
+                        </a:spcBef>
+                        <a:spcAft>
+                          <a:spcPts val="0"/>
+                        </a:spcAft>
+                        <a:buClrTx/>
+                        <a:buSzTx/>
+                        <a:buFontTx/>
+                        <a:buNone/>
+                        <a:tabLst/>
+                        <a:defRPr/>
+                      </a:pPr>
+                      <a:r>
+                        <a:rPr lang="en-US" sz="1400" dirty="0"/>
+                        <a:t>Website “Menu-Karte” </a:t>
+                      </a:r>
+                      <a:r>
+                        <a:rPr lang="en-US" sz="1400" dirty="0" err="1"/>
+                        <a:t>erstellen</a:t>
+                      </a:r>
+                      <a:endParaRPr lang="en-US" sz="1400" dirty="0"/>
+                    </a:p>
+                  </a:txBody>
+                  <a:tcPr/>
+                </a:tc>
+                <a:tc>
+                  <a:txBody>
+                    <a:bodyPr/>
+                    <a:lstStyle/>
+                    <a:p>
+                      <a:r>
+                        <a:rPr lang="en-US" sz="1400" dirty="0"/>
+                        <a:t>Dennis Haaf</a:t>
+                      </a:r>
+                      <a:br>
+                        <a:rPr lang="en-US" sz="1400" dirty="0"/>
+                      </a:br>
+                      <a:r>
+                        <a:rPr lang="en-US" sz="1400" dirty="0"/>
+                        <a:t>Vincent Knapp</a:t>
+                      </a:r>
+                      <a:endParaRPr lang="de-DE" sz="1400" dirty="0"/>
+                    </a:p>
+                  </a:txBody>
+                  <a:tcPr/>
+                </a:tc>
+                <a:tc>
+                  <a:txBody>
+                    <a:bodyPr/>
+                    <a:lstStyle/>
+                    <a:p>
+                      <a:r>
+                        <a:rPr lang="en-US" sz="1400" dirty="0"/>
+                        <a:t>8</a:t>
+                      </a:r>
+                      <a:endParaRPr lang="de-DE" sz="1400" dirty="0"/>
+                    </a:p>
+                  </a:txBody>
+                  <a:tcPr/>
+                </a:tc>
+                <a:tc>
+                  <a:txBody>
+                    <a:bodyPr/>
+                    <a:lstStyle/>
+                    <a:p>
+                      <a:r>
+                        <a:rPr lang="en-US" sz="1400" dirty="0" err="1"/>
+                        <a:t>Erledigt</a:t>
+                      </a:r>
+                      <a:endParaRPr lang="de-DE" sz="1400" dirty="0"/>
+                    </a:p>
+                  </a:txBody>
+                  <a:tcPr/>
+                </a:tc>
+                <a:extLst>
+                  <a:ext uri="{0D108BD9-81ED-4DB2-BD59-A6C34878D82A}">
+                    <a16:rowId xmlns:a16="http://schemas.microsoft.com/office/drawing/2014/main" val="740267785"/>
+                  </a:ext>
+                </a:extLst>
+              </a:tr>
+              <a:tr h="628278">
+                <a:tc>
+                  <a:txBody>
+                    <a:bodyPr/>
+                    <a:lstStyle/>
+                    <a:p>
+                      <a:r>
+                        <a:rPr lang="en-US" sz="1400" dirty="0" err="1"/>
+                        <a:t>Datenbank</a:t>
+                      </a:r>
+                      <a:r>
+                        <a:rPr lang="en-US" sz="1400" dirty="0"/>
+                        <a:t> “Menu-Karte”</a:t>
+                      </a:r>
+                      <a:endParaRPr lang="de-DE" sz="1400" dirty="0"/>
+                    </a:p>
+                  </a:txBody>
+                  <a:tcPr/>
+                </a:tc>
+                <a:tc>
+                  <a:txBody>
+                    <a:bodyPr/>
+                    <a:lstStyle/>
+                    <a:p>
+                      <a:r>
+                        <a:rPr lang="en-US" sz="1400"/>
+                        <a:t>Vincent Knapp</a:t>
+                      </a:r>
+                    </a:p>
+                    <a:p>
+                      <a:r>
+                        <a:rPr lang="en-US" sz="1400"/>
+                        <a:t>Hans Bloching</a:t>
+                      </a:r>
+                    </a:p>
+                    <a:p>
+                      <a:r>
+                        <a:rPr lang="en-US" sz="1400"/>
+                        <a:t>Rene Weber</a:t>
+                      </a:r>
+                      <a:endParaRPr lang="de-DE" sz="1400" dirty="0"/>
+                    </a:p>
+                  </a:txBody>
+                  <a:tcPr/>
+                </a:tc>
+                <a:tc>
+                  <a:txBody>
+                    <a:bodyPr/>
+                    <a:lstStyle/>
+                    <a:p>
+                      <a:r>
+                        <a:rPr lang="en-US" sz="1400" dirty="0"/>
+                        <a:t>1,5</a:t>
+                      </a:r>
+                      <a:endParaRPr lang="de-DE" sz="1400" dirty="0"/>
+                    </a:p>
+                  </a:txBody>
+                  <a:tcPr/>
+                </a:tc>
+                <a:tc>
+                  <a:txBody>
+                    <a:bodyPr/>
+                    <a:lstStyle/>
+                    <a:p>
+                      <a:r>
+                        <a:rPr lang="en-US" sz="1400" dirty="0" err="1"/>
+                        <a:t>Erledigt</a:t>
+                      </a:r>
+                      <a:endParaRPr lang="de-DE" sz="1400" dirty="0"/>
+                    </a:p>
+                  </a:txBody>
+                  <a:tcPr/>
+                </a:tc>
+                <a:extLst>
+                  <a:ext uri="{0D108BD9-81ED-4DB2-BD59-A6C34878D82A}">
+                    <a16:rowId xmlns:a16="http://schemas.microsoft.com/office/drawing/2014/main" val="2603736860"/>
+                  </a:ext>
+                </a:extLst>
+              </a:tr>
+              <a:tr h="482529">
+                <a:tc>
+                  <a:txBody>
+                    <a:bodyPr/>
+                    <a:lstStyle/>
+                    <a:p>
+                      <a:r>
+                        <a:rPr lang="en-US" sz="1400"/>
+                        <a:t>Einführung in Blazor und C# Coding</a:t>
+                      </a:r>
+                      <a:endParaRPr lang="de-DE" sz="1400" dirty="0"/>
+                    </a:p>
+                  </a:txBody>
+                  <a:tcPr/>
+                </a:tc>
+                <a:tc>
+                  <a:txBody>
+                    <a:bodyPr/>
+                    <a:lstStyle/>
+                    <a:p>
+                      <a:r>
+                        <a:rPr lang="en-US" sz="1400" dirty="0"/>
+                        <a:t>Alle</a:t>
+                      </a:r>
+                    </a:p>
+                  </a:txBody>
+                  <a:tcPr/>
+                </a:tc>
+                <a:tc>
+                  <a:txBody>
+                    <a:bodyPr/>
+                    <a:lstStyle/>
+                    <a:p>
+                      <a:r>
+                        <a:rPr lang="en-US" sz="1400" dirty="0"/>
+                        <a:t>4</a:t>
+                      </a:r>
+                      <a:endParaRPr lang="de-DE" sz="1400" dirty="0"/>
+                    </a:p>
+                  </a:txBody>
+                  <a:tcPr/>
+                </a:tc>
+                <a:tc>
+                  <a:txBody>
+                    <a:bodyPr/>
+                    <a:lstStyle/>
+                    <a:p>
+                      <a:r>
+                        <a:rPr lang="en-US" sz="1400"/>
+                        <a:t>Erledigt</a:t>
+                      </a:r>
+                      <a:endParaRPr lang="de-DE" sz="1400" dirty="0"/>
+                    </a:p>
+                  </a:txBody>
+                  <a:tcPr/>
+                </a:tc>
+                <a:extLst>
+                  <a:ext uri="{0D108BD9-81ED-4DB2-BD59-A6C34878D82A}">
+                    <a16:rowId xmlns:a16="http://schemas.microsoft.com/office/drawing/2014/main" val="4252090113"/>
+                  </a:ext>
+                </a:extLst>
+              </a:tr>
+              <a:tr h="488887">
+                <a:tc>
+                  <a:txBody>
+                    <a:bodyPr/>
+                    <a:lstStyle/>
+                    <a:p>
+                      <a:r>
+                        <a:rPr lang="en-US" sz="1400"/>
+                        <a:t>Website “Warenkorb”</a:t>
+                      </a:r>
+                      <a:endParaRPr lang="de-DE" sz="1400" dirty="0"/>
+                    </a:p>
+                  </a:txBody>
+                  <a:tcPr/>
+                </a:tc>
+                <a:tc>
+                  <a:txBody>
+                    <a:bodyPr/>
+                    <a:lstStyle/>
+                    <a:p>
+                      <a:r>
+                        <a:rPr lang="en-US" sz="1400"/>
+                        <a:t>Hans Bloching</a:t>
+                      </a:r>
+                    </a:p>
+                    <a:p>
+                      <a:r>
+                        <a:rPr lang="en-US" sz="1400"/>
+                        <a:t>Rene Weber</a:t>
+                      </a:r>
+                      <a:endParaRPr lang="de-DE" sz="1400" dirty="0"/>
+                    </a:p>
+                  </a:txBody>
+                  <a:tcPr/>
+                </a:tc>
+                <a:tc>
+                  <a:txBody>
+                    <a:bodyPr/>
+                    <a:lstStyle/>
+                    <a:p>
+                      <a:r>
+                        <a:rPr lang="en-US" sz="1400" dirty="0"/>
+                        <a:t>4</a:t>
+                      </a:r>
+                      <a:endParaRPr lang="de-DE" sz="1400" dirty="0"/>
+                    </a:p>
+                  </a:txBody>
+                  <a:tcPr/>
+                </a:tc>
+                <a:tc>
+                  <a:txBody>
+                    <a:bodyPr/>
+                    <a:lstStyle/>
+                    <a:p>
+                      <a:r>
+                        <a:rPr lang="en-US" sz="1400" dirty="0"/>
+                        <a:t>In Arbeit</a:t>
+                      </a:r>
+                      <a:endParaRPr lang="de-DE" sz="1400" dirty="0"/>
+                    </a:p>
+                  </a:txBody>
+                  <a:tcPr/>
+                </a:tc>
+                <a:extLst>
+                  <a:ext uri="{0D108BD9-81ED-4DB2-BD59-A6C34878D82A}">
+                    <a16:rowId xmlns:a16="http://schemas.microsoft.com/office/drawing/2014/main" val="1091053033"/>
+                  </a:ext>
+                </a:extLst>
+              </a:tr>
+              <a:tr h="450561">
+                <a:tc>
+                  <a:txBody>
+                    <a:bodyPr/>
+                    <a:lstStyle/>
+                    <a:p>
+                      <a:r>
+                        <a:rPr lang="en-US" sz="1400" dirty="0" err="1"/>
+                        <a:t>Datenbank</a:t>
+                      </a:r>
+                      <a:r>
+                        <a:rPr lang="en-US" sz="1400" dirty="0"/>
+                        <a:t> “</a:t>
+                      </a:r>
+                      <a:r>
+                        <a:rPr lang="en-US" sz="1400" dirty="0" err="1"/>
+                        <a:t>Warenkorb</a:t>
+                      </a:r>
+                      <a:r>
+                        <a:rPr lang="en-US" sz="1400" dirty="0"/>
+                        <a:t>/</a:t>
+                      </a:r>
+                      <a:r>
+                        <a:rPr lang="en-US" sz="1400" dirty="0" err="1"/>
+                        <a:t>Bestellungen</a:t>
+                      </a:r>
+                      <a:r>
+                        <a:rPr lang="en-US" sz="1400" dirty="0"/>
+                        <a:t>”</a:t>
+                      </a:r>
+                      <a:endParaRPr lang="de-DE" sz="1400" dirty="0"/>
+                    </a:p>
+                  </a:txBody>
+                  <a:tcPr/>
+                </a:tc>
+                <a:tc>
+                  <a:txBody>
+                    <a:bodyPr/>
+                    <a:lstStyle/>
+                    <a:p>
+                      <a:r>
+                        <a:rPr lang="en-US" sz="1400" dirty="0"/>
+                        <a:t>Hans </a:t>
+                      </a:r>
+                      <a:r>
+                        <a:rPr lang="en-US" sz="1400" dirty="0" err="1"/>
+                        <a:t>Bloching</a:t>
+                      </a:r>
+                      <a:endParaRPr lang="en-US" sz="1400" dirty="0"/>
+                    </a:p>
+                    <a:p>
+                      <a:r>
+                        <a:rPr lang="en-US" sz="1400" dirty="0"/>
+                        <a:t>Rene Weber</a:t>
+                      </a:r>
+                      <a:endParaRPr lang="de-DE" sz="1400" dirty="0"/>
+                    </a:p>
+                  </a:txBody>
+                  <a:tcPr/>
+                </a:tc>
+                <a:tc>
+                  <a:txBody>
+                    <a:bodyPr/>
+                    <a:lstStyle/>
+                    <a:p>
+                      <a:r>
+                        <a:rPr lang="en-US" sz="1400" dirty="0"/>
+                        <a:t>0,5</a:t>
+                      </a:r>
+                      <a:endParaRPr lang="de-DE" sz="1400" dirty="0"/>
+                    </a:p>
+                  </a:txBody>
+                  <a:tcPr/>
+                </a:tc>
+                <a:tc>
+                  <a:txBody>
+                    <a:bodyPr/>
+                    <a:lstStyle/>
+                    <a:p>
+                      <a:r>
+                        <a:rPr lang="en-US" sz="1400" dirty="0"/>
+                        <a:t>In Arbeit</a:t>
+                      </a:r>
+                      <a:endParaRPr lang="de-DE" sz="1400" dirty="0"/>
+                    </a:p>
+                  </a:txBody>
+                  <a:tcPr/>
+                </a:tc>
+                <a:extLst>
+                  <a:ext uri="{0D108BD9-81ED-4DB2-BD59-A6C34878D82A}">
+                    <a16:rowId xmlns:a16="http://schemas.microsoft.com/office/drawing/2014/main" val="2446957633"/>
+                  </a:ext>
+                </a:extLst>
+              </a:tr>
+            </a:tbl>
+          </a:graphicData>
+        </a:graphic>
+      </p:graphicFrame>
+      <p:pic>
+        <p:nvPicPr>
+          <p:cNvPr id="7" name="Grafik 6">
+            <a:extLst>
+              <a:ext uri="{FF2B5EF4-FFF2-40B4-BE49-F238E27FC236}">
+                <a16:creationId xmlns:a16="http://schemas.microsoft.com/office/drawing/2014/main" id="{B19F4647-42D3-96AA-571E-B5F63F9ABC18}"/>
+              </a:ext>
+            </a:extLst>
+          </p:cNvPr>
+          <p:cNvPicPr>
+            <a:picLocks noChangeAspect="1"/>
+          </p:cNvPicPr>
+          <p:nvPr/>
+        </p:nvPicPr>
+        <p:blipFill>
+          <a:blip r:embed="rId2"/>
+          <a:stretch>
+            <a:fillRect/>
+          </a:stretch>
+        </p:blipFill>
+        <p:spPr>
+          <a:xfrm>
+            <a:off x="6884925" y="6278906"/>
+            <a:ext cx="1738967" cy="451906"/>
+          </a:xfrm>
+          <a:prstGeom prst="rect">
+            <a:avLst/>
+          </a:prstGeom>
+        </p:spPr>
+      </p:pic>
+      <p:sp>
+        <p:nvSpPr>
+          <p:cNvPr id="12" name="Textfeld 11">
+            <a:extLst>
+              <a:ext uri="{FF2B5EF4-FFF2-40B4-BE49-F238E27FC236}">
+                <a16:creationId xmlns:a16="http://schemas.microsoft.com/office/drawing/2014/main" id="{71644E0E-780A-3A6B-636B-4E077AB50B8C}"/>
+              </a:ext>
+            </a:extLst>
+          </p:cNvPr>
+          <p:cNvSpPr txBox="1"/>
+          <p:nvPr/>
+        </p:nvSpPr>
+        <p:spPr>
+          <a:xfrm>
+            <a:off x="6884925" y="6327056"/>
+            <a:ext cx="1524000" cy="369332"/>
+          </a:xfrm>
+          <a:prstGeom prst="rect">
+            <a:avLst/>
+          </a:prstGeom>
+          <a:noFill/>
+        </p:spPr>
+        <p:txBody>
+          <a:bodyPr wrap="square" rtlCol="0">
+            <a:spAutoFit/>
+          </a:bodyPr>
+          <a:lstStyle/>
+          <a:p>
+            <a:pPr marL="0" marR="0" lvl="0" indent="0" algn="l" defTabSz="914400" rtl="0" eaLnBrk="1" fontAlgn="auto" latinLnBrk="0" hangingPunct="1">
+              <a:lnSpc>
+                <a:spcPct val="100000"/>
+              </a:lnSpc>
+              <a:spcBef>
+                <a:spcPts val="0"/>
+              </a:spcBef>
+              <a:spcAft>
+                <a:spcPts val="0"/>
+              </a:spcAft>
+              <a:buClrTx/>
+              <a:buSzTx/>
+              <a:buFontTx/>
+              <a:buNone/>
+              <a:tabLst/>
+              <a:defRPr/>
+            </a:pPr>
+            <a:r>
+              <a:rPr kumimoji="0" lang="en-US" sz="1800" b="0" i="0" u="none" strike="noStrike" kern="1200" cap="none" spc="0" normalizeH="0" baseline="0" noProof="0" dirty="0">
+                <a:ln>
+                  <a:noFill/>
+                </a:ln>
+                <a:solidFill>
+                  <a:srgbClr val="000000"/>
+                </a:solidFill>
+                <a:effectLst/>
+                <a:uLnTx/>
+                <a:uFillTx/>
+                <a:latin typeface="Avenir Next LT Pro"/>
+                <a:ea typeface="+mn-ea"/>
+                <a:cs typeface="+mn-cs"/>
+              </a:rPr>
+              <a:t>34</a:t>
+            </a:r>
+            <a:endParaRPr kumimoji="0" lang="de-DE" sz="1800" b="0" i="0" u="none" strike="noStrike" kern="1200" cap="none" spc="0" normalizeH="0" baseline="0" noProof="0" dirty="0">
+              <a:ln>
+                <a:noFill/>
+              </a:ln>
+              <a:solidFill>
+                <a:srgbClr val="000000"/>
+              </a:solidFill>
+              <a:effectLst/>
+              <a:uLnTx/>
+              <a:uFillTx/>
+              <a:latin typeface="Avenir Next LT Pro"/>
+              <a:ea typeface="+mn-ea"/>
+              <a:cs typeface="+mn-cs"/>
+            </a:endParaRPr>
+          </a:p>
+        </p:txBody>
+      </p:sp>
+    </p:spTree>
+    <p:extLst>
+      <p:ext uri="{BB962C8B-B14F-4D97-AF65-F5344CB8AC3E}">
+        <p14:creationId xmlns:p14="http://schemas.microsoft.com/office/powerpoint/2010/main" val="1079743533"/>
       </p:ext>
     </p:extLst>
   </p:cSld>
@@ -10209,7 +11682,7 @@
           <a:p>
             <a:fld id="{97369AA5-895A-497C-8276-D01EA17DCACE}" type="datetime1">
               <a:rPr lang="de-DE" smtClean="0"/>
-              <a:t>28.11.2024</a:t>
+              <a:t>29.11.2024</a:t>
             </a:fld>
             <a:endParaRPr lang="en-US"/>
           </a:p>
@@ -10416,7 +11889,7 @@
           <a:p>
             <a:fld id="{42B45B56-1D88-4042-8DF0-EB6B41B710D3}" type="datetime1">
               <a:rPr lang="de-DE" smtClean="0"/>
-              <a:t>28.11.2024</a:t>
+              <a:t>29.11.2024</a:t>
             </a:fld>
             <a:endParaRPr lang="en-US"/>
           </a:p>
@@ -10578,7 +12051,7 @@
           <a:p>
             <a:fld id="{42B45B56-1D88-4042-8DF0-EB6B41B710D3}" type="datetime1">
               <a:rPr lang="de-DE" smtClean="0"/>
-              <a:t>28.11.2024</a:t>
+              <a:t>29.11.2024</a:t>
             </a:fld>
             <a:endParaRPr lang="en-US"/>
           </a:p>
@@ -10988,7 +12461,7 @@
           <a:p>
             <a:fld id="{42B45B56-1D88-4042-8DF0-EB6B41B710D3}" type="datetime1">
               <a:rPr lang="de-DE" smtClean="0"/>
-              <a:t>28.11.2024</a:t>
+              <a:t>29.11.2024</a:t>
             </a:fld>
             <a:endParaRPr lang="en-US"/>
           </a:p>
@@ -11400,7 +12873,7 @@
           <a:p>
             <a:fld id="{42B45B56-1D88-4042-8DF0-EB6B41B710D3}" type="datetime1">
               <a:rPr lang="de-DE" smtClean="0"/>
-              <a:t>28.11.2024</a:t>
+              <a:t>29.11.2024</a:t>
             </a:fld>
             <a:endParaRPr lang="en-US"/>
           </a:p>
@@ -11657,10 +13130,10 @@
       </p:sp>
       <p:pic>
         <p:nvPicPr>
-          <p:cNvPr id="11" name="Grafik 10">
-            <a:extLst>
-              <a:ext uri="{FF2B5EF4-FFF2-40B4-BE49-F238E27FC236}">
-                <a16:creationId xmlns:a16="http://schemas.microsoft.com/office/drawing/2014/main" id="{B51891C7-09E0-A78E-ABFF-F73E33EB50B2}"/>
+          <p:cNvPr id="7" name="Grafik 6">
+            <a:extLst>
+              <a:ext uri="{FF2B5EF4-FFF2-40B4-BE49-F238E27FC236}">
+                <a16:creationId xmlns:a16="http://schemas.microsoft.com/office/drawing/2014/main" id="{3D155758-761A-4764-897D-9C5DDD1DC36C}"/>
               </a:ext>
             </a:extLst>
           </p:cNvPr>
@@ -11677,8 +13150,8 @@
         </p:blipFill>
         <p:spPr>
           <a:xfrm>
-            <a:off x="3440317" y="1811025"/>
-            <a:ext cx="3854467" cy="4931698"/>
+            <a:off x="3082764" y="1865014"/>
+            <a:ext cx="8521363" cy="4992986"/>
           </a:xfrm>
           <a:prstGeom prst="rect">
             <a:avLst/>
@@ -11820,7 +13293,7 @@
           <a:p>
             <a:fld id="{42B45B56-1D88-4042-8DF0-EB6B41B710D3}" type="datetime1">
               <a:rPr lang="de-DE" smtClean="0"/>
-              <a:t>28.11.2024</a:t>
+              <a:t>29.11.2024</a:t>
             </a:fld>
             <a:endParaRPr lang="en-US"/>
           </a:p>
@@ -12236,7 +13709,7 @@
           <a:p>
             <a:fld id="{42B45B56-1D88-4042-8DF0-EB6B41B710D3}" type="datetime1">
               <a:rPr lang="de-DE" smtClean="0"/>
-              <a:t>28.11.2024</a:t>
+              <a:t>29.11.2024</a:t>
             </a:fld>
             <a:endParaRPr lang="en-US"/>
           </a:p>

</xml_diff>

<commit_message>
Erweiterung Screenshots "Zu Warenkorb hinzufügen"
</commit_message>
<xml_diff>
--- a/Dokumente/Sprint-Backlog/Sprint-Backlog1.pptx
+++ b/Dokumente/Sprint-Backlog/Sprint-Backlog1.pptx
@@ -13164,6 +13164,104 @@
           </a:prstGeom>
         </p:spPr>
       </p:pic>
+      <p:pic>
+        <p:nvPicPr>
+          <p:cNvPr id="7" name="Grafik 6" descr="Ein Bild, das Text, Screenshot, Schrift enthält.&#10;&#10;Automatisch generierte Beschreibung">
+            <a:extLst>
+              <a:ext uri="{FF2B5EF4-FFF2-40B4-BE49-F238E27FC236}">
+                <a16:creationId xmlns:a16="http://schemas.microsoft.com/office/drawing/2014/main" id="{47A382CA-973E-61C7-8906-046EC3DC3B90}"/>
+              </a:ext>
+            </a:extLst>
+          </p:cNvPr>
+          <p:cNvPicPr>
+            <a:picLocks noChangeAspect="1"/>
+          </p:cNvPicPr>
+          <p:nvPr/>
+        </p:nvPicPr>
+        <p:blipFill>
+          <a:blip r:embed="rId3">
+            <a:extLst>
+              <a:ext uri="{28A0092B-C50C-407E-A947-70E740481C1C}">
+                <a14:useLocalDpi xmlns:a14="http://schemas.microsoft.com/office/drawing/2010/main" val="0"/>
+              </a:ext>
+            </a:extLst>
+          </a:blip>
+          <a:stretch>
+            <a:fillRect/>
+          </a:stretch>
+        </p:blipFill>
+        <p:spPr>
+          <a:xfrm>
+            <a:off x="4724841" y="3989824"/>
+            <a:ext cx="5258534" cy="2152950"/>
+          </a:xfrm>
+          <a:prstGeom prst="rect">
+            <a:avLst/>
+          </a:prstGeom>
+          <a:ln w="19050" cap="sq">
+            <a:solidFill>
+              <a:srgbClr val="000000"/>
+            </a:solidFill>
+            <a:miter lim="800000"/>
+          </a:ln>
+          <a:effectLst>
+            <a:outerShdw blurRad="57150" dist="50800" dir="2700000" algn="tl" rotWithShape="0">
+              <a:srgbClr val="000000">
+                <a:alpha val="40000"/>
+              </a:srgbClr>
+            </a:outerShdw>
+          </a:effectLst>
+        </p:spPr>
+      </p:pic>
+      <p:pic>
+        <p:nvPicPr>
+          <p:cNvPr id="11" name="Grafik 10" descr="Ein Bild, das Text, Screenshot, Schrift, Logo enthält.&#10;&#10;Automatisch generierte Beschreibung">
+            <a:extLst>
+              <a:ext uri="{FF2B5EF4-FFF2-40B4-BE49-F238E27FC236}">
+                <a16:creationId xmlns:a16="http://schemas.microsoft.com/office/drawing/2014/main" id="{D25C1E67-3623-94ED-1867-908E72DC56B8}"/>
+              </a:ext>
+            </a:extLst>
+          </p:cNvPr>
+          <p:cNvPicPr>
+            <a:picLocks noChangeAspect="1"/>
+          </p:cNvPicPr>
+          <p:nvPr/>
+        </p:nvPicPr>
+        <p:blipFill>
+          <a:blip r:embed="rId4">
+            <a:extLst>
+              <a:ext uri="{28A0092B-C50C-407E-A947-70E740481C1C}">
+                <a14:useLocalDpi xmlns:a14="http://schemas.microsoft.com/office/drawing/2010/main" val="0"/>
+              </a:ext>
+            </a:extLst>
+          </a:blip>
+          <a:stretch>
+            <a:fillRect/>
+          </a:stretch>
+        </p:blipFill>
+        <p:spPr>
+          <a:xfrm>
+            <a:off x="914604" y="4523298"/>
+            <a:ext cx="3219899" cy="1086002"/>
+          </a:xfrm>
+          <a:prstGeom prst="rect">
+            <a:avLst/>
+          </a:prstGeom>
+          <a:ln w="19050" cap="sq">
+            <a:solidFill>
+              <a:srgbClr val="000000"/>
+            </a:solidFill>
+            <a:miter lim="800000"/>
+          </a:ln>
+          <a:effectLst>
+            <a:outerShdw blurRad="57150" dist="50800" dir="2700000" algn="tl" rotWithShape="0">
+              <a:srgbClr val="000000">
+                <a:alpha val="40000"/>
+              </a:srgbClr>
+            </a:outerShdw>
+          </a:effectLst>
+        </p:spPr>
+      </p:pic>
     </p:spTree>
     <p:extLst>
       <p:ext uri="{BB962C8B-B14F-4D97-AF65-F5344CB8AC3E}">
@@ -13174,6 +13272,135 @@
   <p:clrMapOvr>
     <a:masterClrMapping/>
   </p:clrMapOvr>
+  <p:timing>
+    <p:tnLst>
+      <p:par>
+        <p:cTn id="1" dur="indefinite" restart="never" nodeType="tmRoot">
+          <p:childTnLst>
+            <p:seq concurrent="1" nextAc="seek">
+              <p:cTn id="2" dur="indefinite" nodeType="mainSeq">
+                <p:childTnLst>
+                  <p:par>
+                    <p:cTn id="3" fill="hold">
+                      <p:stCondLst>
+                        <p:cond delay="indefinite"/>
+                      </p:stCondLst>
+                      <p:childTnLst>
+                        <p:par>
+                          <p:cTn id="4" fill="hold">
+                            <p:stCondLst>
+                              <p:cond delay="0"/>
+                            </p:stCondLst>
+                            <p:childTnLst>
+                              <p:par>
+                                <p:cTn id="5" presetID="1" presetClass="exit" presetSubtype="0" fill="hold" nodeType="clickEffect">
+                                  <p:stCondLst>
+                                    <p:cond delay="0"/>
+                                  </p:stCondLst>
+                                  <p:childTnLst>
+                                    <p:set>
+                                      <p:cBhvr>
+                                        <p:cTn id="6" dur="1" fill="hold">
+                                          <p:stCondLst>
+                                            <p:cond delay="0"/>
+                                          </p:stCondLst>
+                                        </p:cTn>
+                                        <p:tgtEl>
+                                          <p:spTgt spid="8"/>
+                                        </p:tgtEl>
+                                        <p:attrNameLst>
+                                          <p:attrName>style.visibility</p:attrName>
+                                        </p:attrNameLst>
+                                      </p:cBhvr>
+                                      <p:to>
+                                        <p:strVal val="hidden"/>
+                                      </p:to>
+                                    </p:set>
+                                  </p:childTnLst>
+                                </p:cTn>
+                              </p:par>
+                              <p:par>
+                                <p:cTn id="7" presetID="1" presetClass="entr" presetSubtype="0" fill="hold" nodeType="withEffect">
+                                  <p:stCondLst>
+                                    <p:cond delay="0"/>
+                                  </p:stCondLst>
+                                  <p:childTnLst>
+                                    <p:set>
+                                      <p:cBhvr>
+                                        <p:cTn id="8" dur="1" fill="hold">
+                                          <p:stCondLst>
+                                            <p:cond delay="0"/>
+                                          </p:stCondLst>
+                                        </p:cTn>
+                                        <p:tgtEl>
+                                          <p:spTgt spid="7"/>
+                                        </p:tgtEl>
+                                        <p:attrNameLst>
+                                          <p:attrName>style.visibility</p:attrName>
+                                        </p:attrNameLst>
+                                      </p:cBhvr>
+                                      <p:to>
+                                        <p:strVal val="visible"/>
+                                      </p:to>
+                                    </p:set>
+                                  </p:childTnLst>
+                                </p:cTn>
+                              </p:par>
+                              <p:par>
+                                <p:cTn id="9" presetID="1" presetClass="entr" presetSubtype="0" fill="hold" nodeType="withEffect">
+                                  <p:stCondLst>
+                                    <p:cond delay="0"/>
+                                  </p:stCondLst>
+                                  <p:childTnLst>
+                                    <p:set>
+                                      <p:cBhvr>
+                                        <p:cTn id="10" dur="1" fill="hold">
+                                          <p:stCondLst>
+                                            <p:cond delay="0"/>
+                                          </p:stCondLst>
+                                        </p:cTn>
+                                        <p:tgtEl>
+                                          <p:spTgt spid="11"/>
+                                        </p:tgtEl>
+                                        <p:attrNameLst>
+                                          <p:attrName>style.visibility</p:attrName>
+                                        </p:attrNameLst>
+                                      </p:cBhvr>
+                                      <p:to>
+                                        <p:strVal val="visible"/>
+                                      </p:to>
+                                    </p:set>
+                                  </p:childTnLst>
+                                </p:cTn>
+                              </p:par>
+                            </p:childTnLst>
+                          </p:cTn>
+                        </p:par>
+                      </p:childTnLst>
+                    </p:cTn>
+                  </p:par>
+                </p:childTnLst>
+              </p:cTn>
+              <p:prevCondLst>
+                <p:cond evt="onPrev" delay="0">
+                  <p:tgtEl>
+                    <p:sldTgt/>
+                  </p:tgtEl>
+                </p:cond>
+              </p:prevCondLst>
+              <p:nextCondLst>
+                <p:cond evt="onNext" delay="0">
+                  <p:tgtEl>
+                    <p:sldTgt/>
+                  </p:tgtEl>
+                </p:cond>
+              </p:nextCondLst>
+            </p:seq>
+          </p:childTnLst>
+        </p:cTn>
+      </p:par>
+    </p:tnLst>
+  </p:timing>
 </p:sld>
 </file>
 

</xml_diff>